<commit_message>
creation semaine 0bis pour l'introduction des notions de base nécessaire à l'écriture de petits programmes
semaine 0 : DONE
semaine 0bis : en cours
</commit_message>
<xml_diff>
--- a/semaine2/semaine2-0.pptx
+++ b/semaine2/semaine2-0.pptx
@@ -5,21 +5,25 @@
     <p:sldMasterId id="2147483649" r:id="rId1"/>
   </p:sldMasterIdLst>
   <p:notesMasterIdLst>
-    <p:notesMasterId r:id="rId11"/>
+    <p:notesMasterId r:id="rId15"/>
   </p:notesMasterIdLst>
   <p:handoutMasterIdLst>
-    <p:handoutMasterId r:id="rId12"/>
+    <p:handoutMasterId r:id="rId16"/>
   </p:handoutMasterIdLst>
   <p:sldIdLst>
     <p:sldId id="893" r:id="rId2"/>
     <p:sldId id="895" r:id="rId3"/>
-    <p:sldId id="896" r:id="rId4"/>
-    <p:sldId id="898" r:id="rId5"/>
-    <p:sldId id="900" r:id="rId6"/>
-    <p:sldId id="899" r:id="rId7"/>
-    <p:sldId id="897" r:id="rId8"/>
-    <p:sldId id="901" r:id="rId9"/>
-    <p:sldId id="902" r:id="rId10"/>
+    <p:sldId id="903" r:id="rId4"/>
+    <p:sldId id="907" r:id="rId5"/>
+    <p:sldId id="896" r:id="rId6"/>
+    <p:sldId id="904" r:id="rId7"/>
+    <p:sldId id="905" r:id="rId8"/>
+    <p:sldId id="898" r:id="rId9"/>
+    <p:sldId id="900" r:id="rId10"/>
+    <p:sldId id="899" r:id="rId11"/>
+    <p:sldId id="897" r:id="rId12"/>
+    <p:sldId id="906" r:id="rId13"/>
+    <p:sldId id="908" r:id="rId14"/>
   </p:sldIdLst>
   <p:sldSz cx="9144000" cy="6858000" type="screen4x3"/>
   <p:notesSz cx="7099300" cy="10234613"/>
@@ -155,13 +159,17 @@
           <p14:sldIdLst>
             <p14:sldId id="893"/>
             <p14:sldId id="895"/>
+            <p14:sldId id="903"/>
+            <p14:sldId id="907"/>
             <p14:sldId id="896"/>
+            <p14:sldId id="904"/>
+            <p14:sldId id="905"/>
             <p14:sldId id="898"/>
             <p14:sldId id="900"/>
             <p14:sldId id="899"/>
             <p14:sldId id="897"/>
-            <p14:sldId id="901"/>
-            <p14:sldId id="902"/>
+            <p14:sldId id="906"/>
+            <p14:sldId id="908"/>
           </p14:sldIdLst>
         </p14:section>
       </p14:sectionLst>
@@ -1141,19 +1149,126 @@
           <a:bodyPr/>
           <a:lstStyle/>
           <a:p>
+            <a:endParaRPr lang="fr-FR" dirty="0"/>
+          </a:p>
+        </p:txBody>
+      </p:sp>
+      <p:sp>
+        <p:nvSpPr>
+          <p:cNvPr id="4" name="Espace réservé du numéro de diapositive 3"/>
+          <p:cNvSpPr>
+            <a:spLocks noGrp="1"/>
+          </p:cNvSpPr>
+          <p:nvPr>
+            <p:ph type="sldNum" sz="quarter" idx="10"/>
+          </p:nvPr>
+        </p:nvSpPr>
+        <p:spPr/>
+        <p:txBody>
+          <a:bodyPr/>
+          <a:lstStyle/>
+          <a:p>
+            <a:pPr>
+              <a:defRPr/>
+            </a:pPr>
+            <a:fld id="{9E8EB9F5-F2F7-4A48-A943-9B409357C15C}" type="slidenum">
+              <a:rPr lang="en-US" smtClean="0"/>
+              <a:pPr>
+                <a:defRPr/>
+              </a:pPr>
+              <a:t>3</a:t>
+            </a:fld>
+            <a:endParaRPr lang="en-US"/>
+          </a:p>
+        </p:txBody>
+      </p:sp>
+    </p:spTree>
+    <p:extLst>
+      <p:ext uri="{BB962C8B-B14F-4D97-AF65-F5344CB8AC3E}">
+        <p14:creationId xmlns:p14="http://schemas.microsoft.com/office/powerpoint/2010/main" val="4254458590"/>
+      </p:ext>
+    </p:extLst>
+  </p:cSld>
+  <p:clrMapOvr>
+    <a:masterClrMapping/>
+  </p:clrMapOvr>
+</p:notes>
+</file>
+
+<file path=ppt/notesSlides/notesSlide4.xml><?xml version="1.0" encoding="utf-8"?>
+<p:notes xmlns:a="http://schemas.openxmlformats.org/drawingml/2006/main" xmlns:r="http://schemas.openxmlformats.org/officeDocument/2006/relationships" xmlns:p="http://schemas.openxmlformats.org/presentationml/2006/main">
+  <p:cSld>
+    <p:spTree>
+      <p:nvGrpSpPr>
+        <p:cNvPr id="1" name=""/>
+        <p:cNvGrpSpPr/>
+        <p:nvPr/>
+      </p:nvGrpSpPr>
+      <p:grpSpPr>
+        <a:xfrm>
+          <a:off x="0" y="0"/>
+          <a:ext cx="0" cy="0"/>
+          <a:chOff x="0" y="0"/>
+          <a:chExt cx="0" cy="0"/>
+        </a:xfrm>
+      </p:grpSpPr>
+      <p:sp>
+        <p:nvSpPr>
+          <p:cNvPr id="2" name="Espace réservé de l'image des diapositives 1"/>
+          <p:cNvSpPr>
+            <a:spLocks noGrp="1" noRot="1" noChangeAspect="1"/>
+          </p:cNvSpPr>
+          <p:nvPr>
+            <p:ph type="sldImg"/>
+          </p:nvPr>
+        </p:nvSpPr>
+        <p:spPr/>
+      </p:sp>
+      <p:sp>
+        <p:nvSpPr>
+          <p:cNvPr id="3" name="Espace réservé des commentaires 2"/>
+          <p:cNvSpPr>
+            <a:spLocks noGrp="1"/>
+          </p:cNvSpPr>
+          <p:nvPr>
+            <p:ph type="body" idx="1"/>
+          </p:nvPr>
+        </p:nvSpPr>
+        <p:spPr/>
+        <p:txBody>
+          <a:bodyPr/>
+          <a:lstStyle/>
+          <a:p>
+            <a:r>
+              <a:rPr lang="fr-FR" u="sng" dirty="0" smtClean="0"/>
+              <a:t>En surimpression pendant que je</a:t>
+            </a:r>
+            <a:r>
+              <a:rPr lang="fr-FR" u="sng" baseline="0" dirty="0" smtClean="0"/>
+              <a:t> parle</a:t>
+            </a:r>
+            <a:endParaRPr lang="fr-FR" u="sng" dirty="0" smtClean="0"/>
+          </a:p>
+          <a:p>
             <a:r>
               <a:rPr lang="fr-FR" dirty="0" smtClean="0"/>
-              <a:t>Comment manipule-t-on</a:t>
+              <a:t>Objet</a:t>
+            </a:r>
+          </a:p>
+          <a:p>
+            <a:r>
+              <a:rPr lang="fr-FR" dirty="0" smtClean="0"/>
+              <a:t>	stockage d</a:t>
             </a:r>
             <a:r>
               <a:rPr lang="fr-FR" baseline="0" dirty="0" smtClean="0"/>
-              <a:t> des objets en Python ?</a:t>
+              <a:t>’information</a:t>
             </a:r>
           </a:p>
           <a:p>
             <a:r>
               <a:rPr lang="fr-FR" baseline="0" dirty="0" smtClean="0"/>
-              <a:t>Comme dans tous les langages de programmation on peut donner un nom, on appelle ce nom une variable. </a:t>
+              <a:t>	méthodes</a:t>
             </a:r>
           </a:p>
           <a:p>
@@ -1162,16 +1277,107 @@
           <a:p>
             <a:r>
               <a:rPr lang="fr-FR" baseline="0" dirty="0" smtClean="0"/>
-              <a:t>Expliquer l’animation.</a:t>
-            </a:r>
-          </a:p>
-          <a:p>
-            <a:endParaRPr lang="fr-FR" baseline="0" dirty="0" smtClean="0"/>
+              <a:t>Type</a:t>
+            </a:r>
           </a:p>
           <a:p>
             <a:r>
               <a:rPr lang="fr-FR" baseline="0" dirty="0" smtClean="0"/>
-              <a:t>À la fin noter le typage dynamique, l’objet à un type, la variable donne juste un lien vers un objet. </a:t>
+              <a:t>	information et méthodes par défaut</a:t>
+            </a:r>
+            <a:endParaRPr lang="fr-FR" dirty="0"/>
+          </a:p>
+        </p:txBody>
+      </p:sp>
+      <p:sp>
+        <p:nvSpPr>
+          <p:cNvPr id="4" name="Espace réservé du numéro de diapositive 3"/>
+          <p:cNvSpPr>
+            <a:spLocks noGrp="1"/>
+          </p:cNvSpPr>
+          <p:nvPr>
+            <p:ph type="sldNum" sz="quarter" idx="10"/>
+          </p:nvPr>
+        </p:nvSpPr>
+        <p:spPr/>
+        <p:txBody>
+          <a:bodyPr/>
+          <a:lstStyle/>
+          <a:p>
+            <a:pPr>
+              <a:defRPr/>
+            </a:pPr>
+            <a:fld id="{9E8EB9F5-F2F7-4A48-A943-9B409357C15C}" type="slidenum">
+              <a:rPr lang="en-US" smtClean="0"/>
+              <a:pPr>
+                <a:defRPr/>
+              </a:pPr>
+              <a:t>6</a:t>
+            </a:fld>
+            <a:endParaRPr lang="en-US"/>
+          </a:p>
+        </p:txBody>
+      </p:sp>
+    </p:spTree>
+    <p:extLst>
+      <p:ext uri="{BB962C8B-B14F-4D97-AF65-F5344CB8AC3E}">
+        <p14:creationId xmlns:p14="http://schemas.microsoft.com/office/powerpoint/2010/main" val="2284023044"/>
+      </p:ext>
+    </p:extLst>
+  </p:cSld>
+  <p:clrMapOvr>
+    <a:masterClrMapping/>
+  </p:clrMapOvr>
+</p:notes>
+</file>
+
+<file path=ppt/notesSlides/notesSlide5.xml><?xml version="1.0" encoding="utf-8"?>
+<p:notes xmlns:a="http://schemas.openxmlformats.org/drawingml/2006/main" xmlns:r="http://schemas.openxmlformats.org/officeDocument/2006/relationships" xmlns:p="http://schemas.openxmlformats.org/presentationml/2006/main">
+  <p:cSld>
+    <p:spTree>
+      <p:nvGrpSpPr>
+        <p:cNvPr id="1" name=""/>
+        <p:cNvGrpSpPr/>
+        <p:nvPr/>
+      </p:nvGrpSpPr>
+      <p:grpSpPr>
+        <a:xfrm>
+          <a:off x="0" y="0"/>
+          <a:ext cx="0" cy="0"/>
+          <a:chOff x="0" y="0"/>
+          <a:chExt cx="0" cy="0"/>
+        </a:xfrm>
+      </p:grpSpPr>
+      <p:sp>
+        <p:nvSpPr>
+          <p:cNvPr id="2" name="Espace réservé de l'image des diapositives 1"/>
+          <p:cNvSpPr>
+            <a:spLocks noGrp="1" noRot="1" noChangeAspect="1"/>
+          </p:cNvSpPr>
+          <p:nvPr>
+            <p:ph type="sldImg"/>
+          </p:nvPr>
+        </p:nvSpPr>
+        <p:spPr/>
+      </p:sp>
+      <p:sp>
+        <p:nvSpPr>
+          <p:cNvPr id="3" name="Espace réservé des commentaires 2"/>
+          <p:cNvSpPr>
+            <a:spLocks noGrp="1"/>
+          </p:cNvSpPr>
+          <p:nvPr>
+            <p:ph type="body" idx="1"/>
+          </p:nvPr>
+        </p:nvSpPr>
+        <p:spPr/>
+        <p:txBody>
+          <a:bodyPr/>
+          <a:lstStyle/>
+          <a:p>
+            <a:r>
+              <a:rPr lang="fr-FR" dirty="0" smtClean="0"/>
+              <a:t>(43s)</a:t>
             </a:r>
             <a:endParaRPr lang="fr-FR" dirty="0"/>
           </a:p>
@@ -1201,6 +1407,449 @@
                 <a:defRPr/>
               </a:pPr>
               <a:t>7</a:t>
+            </a:fld>
+            <a:endParaRPr lang="en-US"/>
+          </a:p>
+        </p:txBody>
+      </p:sp>
+    </p:spTree>
+    <p:extLst>
+      <p:ext uri="{BB962C8B-B14F-4D97-AF65-F5344CB8AC3E}">
+        <p14:creationId xmlns:p14="http://schemas.microsoft.com/office/powerpoint/2010/main" val="4085880631"/>
+      </p:ext>
+    </p:extLst>
+  </p:cSld>
+  <p:clrMapOvr>
+    <a:masterClrMapping/>
+  </p:clrMapOvr>
+</p:notes>
+</file>
+
+<file path=ppt/notesSlides/notesSlide6.xml><?xml version="1.0" encoding="utf-8"?>
+<p:notes xmlns:a="http://schemas.openxmlformats.org/drawingml/2006/main" xmlns:r="http://schemas.openxmlformats.org/officeDocument/2006/relationships" xmlns:p="http://schemas.openxmlformats.org/presentationml/2006/main">
+  <p:cSld>
+    <p:spTree>
+      <p:nvGrpSpPr>
+        <p:cNvPr id="1" name=""/>
+        <p:cNvGrpSpPr/>
+        <p:nvPr/>
+      </p:nvGrpSpPr>
+      <p:grpSpPr>
+        <a:xfrm>
+          <a:off x="0" y="0"/>
+          <a:ext cx="0" cy="0"/>
+          <a:chOff x="0" y="0"/>
+          <a:chExt cx="0" cy="0"/>
+        </a:xfrm>
+      </p:grpSpPr>
+      <p:sp>
+        <p:nvSpPr>
+          <p:cNvPr id="2" name="Espace réservé de l'image des diapositives 1"/>
+          <p:cNvSpPr>
+            <a:spLocks noGrp="1" noRot="1" noChangeAspect="1"/>
+          </p:cNvSpPr>
+          <p:nvPr>
+            <p:ph type="sldImg"/>
+          </p:nvPr>
+        </p:nvSpPr>
+        <p:spPr/>
+      </p:sp>
+      <p:sp>
+        <p:nvSpPr>
+          <p:cNvPr id="3" name="Espace réservé des commentaires 2"/>
+          <p:cNvSpPr>
+            <a:spLocks noGrp="1"/>
+          </p:cNvSpPr>
+          <p:nvPr>
+            <p:ph type="body" idx="1"/>
+          </p:nvPr>
+        </p:nvSpPr>
+        <p:spPr/>
+        <p:txBody>
+          <a:bodyPr/>
+          <a:lstStyle/>
+          <a:p>
+            <a:pPr marL="0" marR="0" indent="0" algn="l" defTabSz="914400" rtl="0" eaLnBrk="0" fontAlgn="base" latinLnBrk="0" hangingPunct="0">
+              <a:lnSpc>
+                <a:spcPct val="100000"/>
+              </a:lnSpc>
+              <a:spcBef>
+                <a:spcPct val="30000"/>
+              </a:spcBef>
+              <a:spcAft>
+                <a:spcPct val="0"/>
+              </a:spcAft>
+              <a:buClrTx/>
+              <a:buSzTx/>
+              <a:buFontTx/>
+              <a:buNone/>
+              <a:tabLst/>
+              <a:defRPr/>
+            </a:pPr>
+            <a:r>
+              <a:rPr lang="fr-FR" u="sng" dirty="0" smtClean="0"/>
+              <a:t>En surimpression pendant que je</a:t>
+            </a:r>
+            <a:r>
+              <a:rPr lang="fr-FR" u="sng" baseline="0" dirty="0" smtClean="0"/>
+              <a:t> parle</a:t>
+            </a:r>
+            <a:endParaRPr lang="fr-FR" u="sng" dirty="0" smtClean="0"/>
+          </a:p>
+          <a:p>
+            <a:r>
+              <a:rPr lang="fr-FR" dirty="0" smtClean="0"/>
+              <a:t>a = 1</a:t>
+            </a:r>
+            <a:endParaRPr lang="fr-FR" dirty="0"/>
+          </a:p>
+        </p:txBody>
+      </p:sp>
+      <p:sp>
+        <p:nvSpPr>
+          <p:cNvPr id="4" name="Espace réservé du numéro de diapositive 3"/>
+          <p:cNvSpPr>
+            <a:spLocks noGrp="1"/>
+          </p:cNvSpPr>
+          <p:nvPr>
+            <p:ph type="sldNum" sz="quarter" idx="10"/>
+          </p:nvPr>
+        </p:nvSpPr>
+        <p:spPr/>
+        <p:txBody>
+          <a:bodyPr/>
+          <a:lstStyle/>
+          <a:p>
+            <a:pPr>
+              <a:defRPr/>
+            </a:pPr>
+            <a:fld id="{9E8EB9F5-F2F7-4A48-A943-9B409357C15C}" type="slidenum">
+              <a:rPr lang="en-US" smtClean="0"/>
+              <a:pPr>
+                <a:defRPr/>
+              </a:pPr>
+              <a:t>8</a:t>
+            </a:fld>
+            <a:endParaRPr lang="en-US"/>
+          </a:p>
+        </p:txBody>
+      </p:sp>
+    </p:spTree>
+    <p:extLst>
+      <p:ext uri="{BB962C8B-B14F-4D97-AF65-F5344CB8AC3E}">
+        <p14:creationId xmlns:p14="http://schemas.microsoft.com/office/powerpoint/2010/main" val="3249037592"/>
+      </p:ext>
+    </p:extLst>
+  </p:cSld>
+  <p:clrMapOvr>
+    <a:masterClrMapping/>
+  </p:clrMapOvr>
+</p:notes>
+</file>
+
+<file path=ppt/notesSlides/notesSlide7.xml><?xml version="1.0" encoding="utf-8"?>
+<p:notes xmlns:a="http://schemas.openxmlformats.org/drawingml/2006/main" xmlns:r="http://schemas.openxmlformats.org/officeDocument/2006/relationships" xmlns:p="http://schemas.openxmlformats.org/presentationml/2006/main">
+  <p:cSld>
+    <p:spTree>
+      <p:nvGrpSpPr>
+        <p:cNvPr id="1" name=""/>
+        <p:cNvGrpSpPr/>
+        <p:nvPr/>
+      </p:nvGrpSpPr>
+      <p:grpSpPr>
+        <a:xfrm>
+          <a:off x="0" y="0"/>
+          <a:ext cx="0" cy="0"/>
+          <a:chOff x="0" y="0"/>
+          <a:chExt cx="0" cy="0"/>
+        </a:xfrm>
+      </p:grpSpPr>
+      <p:sp>
+        <p:nvSpPr>
+          <p:cNvPr id="2" name="Espace réservé de l'image des diapositives 1"/>
+          <p:cNvSpPr>
+            <a:spLocks noGrp="1" noRot="1" noChangeAspect="1"/>
+          </p:cNvSpPr>
+          <p:nvPr>
+            <p:ph type="sldImg"/>
+          </p:nvPr>
+        </p:nvSpPr>
+        <p:spPr/>
+      </p:sp>
+      <p:sp>
+        <p:nvSpPr>
+          <p:cNvPr id="3" name="Espace réservé des commentaires 2"/>
+          <p:cNvSpPr>
+            <a:spLocks noGrp="1"/>
+          </p:cNvSpPr>
+          <p:nvPr>
+            <p:ph type="body" idx="1"/>
+          </p:nvPr>
+        </p:nvSpPr>
+        <p:spPr/>
+        <p:txBody>
+          <a:bodyPr/>
+          <a:lstStyle/>
+          <a:p>
+            <a:pPr marL="0" marR="0" indent="0" algn="l" defTabSz="914400" rtl="0" eaLnBrk="0" fontAlgn="base" latinLnBrk="0" hangingPunct="0">
+              <a:lnSpc>
+                <a:spcPct val="100000"/>
+              </a:lnSpc>
+              <a:spcBef>
+                <a:spcPct val="30000"/>
+              </a:spcBef>
+              <a:spcAft>
+                <a:spcPct val="0"/>
+              </a:spcAft>
+              <a:buClrTx/>
+              <a:buSzTx/>
+              <a:buFontTx/>
+              <a:buNone/>
+              <a:tabLst/>
+              <a:defRPr/>
+            </a:pPr>
+            <a:r>
+              <a:rPr lang="fr-FR" u="sng" dirty="0" smtClean="0"/>
+              <a:t>En surimpression pendant que je</a:t>
+            </a:r>
+            <a:r>
+              <a:rPr lang="fr-FR" u="sng" baseline="0" dirty="0" smtClean="0"/>
+              <a:t> parle (utiliser la police courrier new)</a:t>
+            </a:r>
+            <a:endParaRPr lang="fr-FR" u="sng" dirty="0" smtClean="0"/>
+          </a:p>
+          <a:p>
+            <a:r>
+              <a:rPr lang="fr-FR" dirty="0" err="1" smtClean="0"/>
+              <a:t>abcdefghijklmnopqrstuvwxyz</a:t>
+            </a:r>
+            <a:endParaRPr lang="fr-FR" dirty="0" smtClean="0"/>
+          </a:p>
+          <a:p>
+            <a:r>
+              <a:rPr lang="fr-FR" dirty="0" smtClean="0"/>
+              <a:t>ABCDEFGHIJKLMNOPQRSTUVWXYZ</a:t>
+            </a:r>
+          </a:p>
+          <a:p>
+            <a:r>
+              <a:rPr lang="fr-FR" dirty="0" smtClean="0"/>
+              <a:t>0123456789</a:t>
+            </a:r>
+          </a:p>
+          <a:p>
+            <a:r>
+              <a:rPr lang="fr-FR" dirty="0" smtClean="0"/>
+              <a:t>_</a:t>
+            </a:r>
+          </a:p>
+          <a:p>
+            <a:endParaRPr lang="fr-FR" dirty="0" smtClean="0"/>
+          </a:p>
+          <a:p>
+            <a:r>
+              <a:rPr lang="fr-FR" dirty="0" err="1" smtClean="0"/>
+              <a:t>ma_variable</a:t>
+            </a:r>
+            <a:r>
+              <a:rPr lang="fr-FR" dirty="0" smtClean="0"/>
+              <a:t> (vert)</a:t>
+            </a:r>
+          </a:p>
+          <a:p>
+            <a:r>
+              <a:rPr lang="fr-FR" dirty="0" smtClean="0"/>
+              <a:t>_</a:t>
+            </a:r>
+            <a:r>
+              <a:rPr lang="fr-FR" dirty="0" err="1" smtClean="0"/>
+              <a:t>ma_variable</a:t>
+            </a:r>
+            <a:r>
+              <a:rPr lang="fr-FR" dirty="0" smtClean="0"/>
+              <a:t> (vert)</a:t>
+            </a:r>
+          </a:p>
+          <a:p>
+            <a:r>
+              <a:rPr lang="fr-FR" dirty="0" smtClean="0"/>
+              <a:t>1variable</a:t>
+            </a:r>
+            <a:r>
+              <a:rPr lang="fr-FR" baseline="0" dirty="0" smtClean="0"/>
+              <a:t> (barrer en rouge)</a:t>
+            </a:r>
+          </a:p>
+          <a:p>
+            <a:endParaRPr lang="fr-FR" baseline="0" dirty="0" smtClean="0"/>
+          </a:p>
+          <a:p>
+            <a:r>
+              <a:rPr lang="fr-FR" baseline="0" dirty="0" err="1" smtClean="0"/>
+              <a:t>Ma_variable</a:t>
+            </a:r>
+            <a:r>
+              <a:rPr lang="fr-FR" baseline="0" dirty="0" smtClean="0"/>
+              <a:t> est différent de </a:t>
+            </a:r>
+            <a:r>
+              <a:rPr lang="fr-FR" baseline="0" dirty="0" err="1" smtClean="0"/>
+              <a:t>ma_variable</a:t>
+            </a:r>
+            <a:endParaRPr lang="fr-FR" baseline="0" dirty="0" smtClean="0"/>
+          </a:p>
+          <a:p>
+            <a:endParaRPr lang="fr-FR" baseline="0" dirty="0" smtClean="0"/>
+          </a:p>
+          <a:p>
+            <a:r>
+              <a:rPr lang="fr-FR" baseline="0" dirty="0" smtClean="0"/>
+              <a:t>Utiliser </a:t>
+            </a:r>
+            <a:r>
+              <a:rPr lang="fr-FR" i="1" baseline="0" dirty="0" err="1" smtClean="0"/>
+              <a:t>moyenne_age_francais</a:t>
+            </a:r>
+            <a:r>
+              <a:rPr lang="fr-FR" baseline="0" dirty="0" smtClean="0"/>
+              <a:t> plutôt que </a:t>
+            </a:r>
+            <a:r>
+              <a:rPr lang="fr-FR" i="1" baseline="0" dirty="0" err="1" smtClean="0"/>
+              <a:t>moy_age_f</a:t>
+            </a:r>
+            <a:r>
+              <a:rPr lang="fr-FR" baseline="0" dirty="0" smtClean="0"/>
+              <a:t> ou pire </a:t>
+            </a:r>
+            <a:r>
+              <a:rPr lang="fr-FR" i="1" baseline="0" dirty="0" smtClean="0"/>
+              <a:t>x</a:t>
+            </a:r>
+          </a:p>
+          <a:p>
+            <a:endParaRPr lang="fr-FR" dirty="0"/>
+          </a:p>
+        </p:txBody>
+      </p:sp>
+      <p:sp>
+        <p:nvSpPr>
+          <p:cNvPr id="4" name="Espace réservé du numéro de diapositive 3"/>
+          <p:cNvSpPr>
+            <a:spLocks noGrp="1"/>
+          </p:cNvSpPr>
+          <p:nvPr>
+            <p:ph type="sldNum" sz="quarter" idx="10"/>
+          </p:nvPr>
+        </p:nvSpPr>
+        <p:spPr/>
+        <p:txBody>
+          <a:bodyPr/>
+          <a:lstStyle/>
+          <a:p>
+            <a:pPr>
+              <a:defRPr/>
+            </a:pPr>
+            <a:fld id="{9E8EB9F5-F2F7-4A48-A943-9B409357C15C}" type="slidenum">
+              <a:rPr lang="en-US" smtClean="0"/>
+              <a:pPr>
+                <a:defRPr/>
+              </a:pPr>
+              <a:t>9</a:t>
+            </a:fld>
+            <a:endParaRPr lang="en-US"/>
+          </a:p>
+        </p:txBody>
+      </p:sp>
+    </p:spTree>
+    <p:extLst>
+      <p:ext uri="{BB962C8B-B14F-4D97-AF65-F5344CB8AC3E}">
+        <p14:creationId xmlns:p14="http://schemas.microsoft.com/office/powerpoint/2010/main" val="3529004839"/>
+      </p:ext>
+    </p:extLst>
+  </p:cSld>
+  <p:clrMapOvr>
+    <a:masterClrMapping/>
+  </p:clrMapOvr>
+</p:notes>
+</file>
+
+<file path=ppt/notesSlides/notesSlide8.xml><?xml version="1.0" encoding="utf-8"?>
+<p:notes xmlns:a="http://schemas.openxmlformats.org/drawingml/2006/main" xmlns:r="http://schemas.openxmlformats.org/officeDocument/2006/relationships" xmlns:p="http://schemas.openxmlformats.org/presentationml/2006/main">
+  <p:cSld>
+    <p:spTree>
+      <p:nvGrpSpPr>
+        <p:cNvPr id="1" name=""/>
+        <p:cNvGrpSpPr/>
+        <p:nvPr/>
+      </p:nvGrpSpPr>
+      <p:grpSpPr>
+        <a:xfrm>
+          <a:off x="0" y="0"/>
+          <a:ext cx="0" cy="0"/>
+          <a:chOff x="0" y="0"/>
+          <a:chExt cx="0" cy="0"/>
+        </a:xfrm>
+      </p:grpSpPr>
+      <p:sp>
+        <p:nvSpPr>
+          <p:cNvPr id="2" name="Espace réservé de l'image des diapositives 1"/>
+          <p:cNvSpPr>
+            <a:spLocks noGrp="1" noRot="1" noChangeAspect="1"/>
+          </p:cNvSpPr>
+          <p:nvPr>
+            <p:ph type="sldImg"/>
+          </p:nvPr>
+        </p:nvSpPr>
+        <p:spPr/>
+      </p:sp>
+      <p:sp>
+        <p:nvSpPr>
+          <p:cNvPr id="3" name="Espace réservé des commentaires 2"/>
+          <p:cNvSpPr>
+            <a:spLocks noGrp="1"/>
+          </p:cNvSpPr>
+          <p:nvPr>
+            <p:ph type="body" idx="1"/>
+          </p:nvPr>
+        </p:nvSpPr>
+        <p:spPr/>
+        <p:txBody>
+          <a:bodyPr/>
+          <a:lstStyle/>
+          <a:p>
+            <a:r>
+              <a:rPr lang="fr-FR" dirty="0" smtClean="0"/>
+              <a:t>(60s)</a:t>
+            </a:r>
+            <a:endParaRPr lang="fr-FR" dirty="0"/>
+          </a:p>
+        </p:txBody>
+      </p:sp>
+      <p:sp>
+        <p:nvSpPr>
+          <p:cNvPr id="4" name="Espace réservé du numéro de diapositive 3"/>
+          <p:cNvSpPr>
+            <a:spLocks noGrp="1"/>
+          </p:cNvSpPr>
+          <p:nvPr>
+            <p:ph type="sldNum" sz="quarter" idx="10"/>
+          </p:nvPr>
+        </p:nvSpPr>
+        <p:spPr/>
+        <p:txBody>
+          <a:bodyPr/>
+          <a:lstStyle/>
+          <a:p>
+            <a:pPr>
+              <a:defRPr/>
+            </a:pPr>
+            <a:fld id="{9E8EB9F5-F2F7-4A48-A943-9B409357C15C}" type="slidenum">
+              <a:rPr lang="en-US" smtClean="0"/>
+              <a:pPr>
+                <a:defRPr/>
+              </a:pPr>
+              <a:t>11</a:t>
             </a:fld>
             <a:endParaRPr lang="en-US"/>
           </a:p>
@@ -4533,7 +5182,11 @@
           <a:p>
             <a:r>
               <a:rPr lang="fr-FR" dirty="0" smtClean="0"/>
-              <a:t>Sujet de la semaine</a:t>
+              <a:t>Sujet de la </a:t>
+            </a:r>
+            <a:r>
+              <a:rPr lang="fr-FR" dirty="0" smtClean="0"/>
+              <a:t>semaine (18s)</a:t>
             </a:r>
             <a:endParaRPr lang="fr-FR" dirty="0"/>
           </a:p>
@@ -4556,50 +5209,59 @@
           <a:p>
             <a:r>
               <a:rPr lang="fr-FR" dirty="0" smtClean="0"/>
-              <a:t>Cette </a:t>
+              <a:t>Cette semaine nous allons </a:t>
             </a:r>
             <a:r>
               <a:rPr lang="fr-FR" dirty="0" smtClean="0"/>
-              <a:t>semaine nous allons parler </a:t>
-            </a:r>
+              <a:t>aborder deux sujets importants</a:t>
+            </a:r>
+            <a:endParaRPr lang="fr-FR" dirty="0" smtClean="0"/>
           </a:p>
           <a:p>
             <a:pPr lvl="1"/>
             <a:r>
-              <a:rPr lang="fr-FR" dirty="0"/>
-              <a:t>D</a:t>
-            </a:r>
-            <a:r>
               <a:rPr lang="fr-FR" dirty="0" smtClean="0"/>
-              <a:t>es types de base en Python</a:t>
-            </a:r>
-          </a:p>
-          <a:p>
-            <a:pPr lvl="2"/>
+              <a:t>Le premier sujet est sur la présentation des </a:t>
+            </a:r>
             <a:r>
               <a:rPr lang="fr-FR" dirty="0" smtClean="0"/>
-              <a:t>Comportement uniforme </a:t>
-            </a:r>
-          </a:p>
-          <a:p>
-            <a:pPr lvl="2"/>
+              <a:t>types </a:t>
+            </a:r>
             <a:r>
               <a:rPr lang="fr-FR" dirty="0" smtClean="0"/>
-              <a:t>Objets très puissants et polyvalents </a:t>
-            </a:r>
+              <a:t>de base en </a:t>
+            </a:r>
+            <a:r>
+              <a:rPr lang="fr-FR" dirty="0" smtClean="0"/>
+              <a:t>Python qui sont des objets puissants, polyvalents, mais très souple et facile à utiliser</a:t>
+            </a:r>
+            <a:endParaRPr lang="fr-FR" dirty="0" smtClean="0"/>
           </a:p>
           <a:p>
             <a:pPr lvl="1"/>
             <a:r>
               <a:rPr lang="fr-FR" dirty="0" smtClean="0"/>
-              <a:t>Du typage dynamique et des références partagés</a:t>
-            </a:r>
-          </a:p>
-          <a:p>
-            <a:pPr lvl="2"/>
+              <a:t>Le deuxième sujet est sur le </a:t>
+            </a:r>
             <a:r>
               <a:rPr lang="fr-FR" dirty="0" smtClean="0"/>
-              <a:t>Une des trois clefs de la compréhension de Python</a:t>
+              <a:t>typage dynamique et </a:t>
+            </a:r>
+            <a:r>
+              <a:rPr lang="fr-FR" dirty="0" smtClean="0"/>
+              <a:t>les </a:t>
+            </a:r>
+            <a:r>
+              <a:rPr lang="fr-FR" dirty="0" smtClean="0"/>
+              <a:t>références </a:t>
+            </a:r>
+            <a:r>
+              <a:rPr lang="fr-FR" dirty="0" smtClean="0"/>
+              <a:t>partagés qui représentent une des </a:t>
+            </a:r>
+            <a:r>
+              <a:rPr lang="fr-FR" dirty="0" smtClean="0"/>
+              <a:t>trois clefs de la compréhension de Python</a:t>
             </a:r>
           </a:p>
           <a:p>
@@ -4672,7 +5334,7 @@
 </p:sld>
 </file>
 
-<file path=ppt/slides/slide2.xml><?xml version="1.0" encoding="utf-8"?>
+<file path=ppt/slides/slide10.xml><?xml version="1.0" encoding="utf-8"?>
 <p:sld xmlns:a="http://schemas.openxmlformats.org/drawingml/2006/main" xmlns:r="http://schemas.openxmlformats.org/officeDocument/2006/relationships" xmlns:p="http://schemas.openxmlformats.org/presentationml/2006/main">
   <p:cSld>
     <p:spTree>
@@ -4706,7 +5368,11 @@
           <a:p>
             <a:r>
               <a:rPr lang="fr-FR" dirty="0" smtClean="0"/>
-              <a:t>Résumé de la séquence</a:t>
+              <a:t>Typage </a:t>
+            </a:r>
+            <a:r>
+              <a:rPr lang="fr-FR" dirty="0" smtClean="0"/>
+              <a:t>dynamique (20s)</a:t>
             </a:r>
             <a:endParaRPr lang="fr-FR" dirty="0"/>
           </a:p>
@@ -4728,626 +5394,27 @@
           <a:lstStyle/>
           <a:p>
             <a:r>
-              <a:rPr lang="fr-FR" dirty="0"/>
-              <a:t>Aperçu</a:t>
-            </a:r>
-          </a:p>
-          <a:p>
-            <a:pPr lvl="1"/>
-            <a:r>
               <a:rPr lang="fr-FR" dirty="0" smtClean="0"/>
-              <a:t>Typage dynamique</a:t>
-            </a:r>
-          </a:p>
-          <a:p>
-            <a:pPr lvl="1"/>
+              <a:t>Maintenant que nous avons vu les notions d’objets et de variables, parlons du typage dynamique</a:t>
+            </a:r>
+          </a:p>
+          <a:p>
             <a:r>
               <a:rPr lang="fr-FR" dirty="0" smtClean="0"/>
-              <a:t>Types numériques et </a:t>
-            </a:r>
-            <a:r>
-              <a:rPr lang="fr-FR" dirty="0"/>
-              <a:t>l</a:t>
+              <a:t>Python </a:t>
             </a:r>
             <a:r>
               <a:rPr lang="fr-FR" dirty="0" smtClean="0"/>
-              <a:t>istes</a:t>
-            </a:r>
-          </a:p>
-          <a:p>
-            <a:pPr lvl="1"/>
+              <a:t>utilise le typage </a:t>
+            </a:r>
             <a:r>
               <a:rPr lang="fr-FR" dirty="0" smtClean="0"/>
-              <a:t>Conditions if</a:t>
-            </a:r>
-          </a:p>
-          <a:p>
-            <a:pPr lvl="1"/>
+              <a:t>dynamique c’est-à-dire que le type des variables n’est pas spécifié lors de l’écriture du programme, mais automatiquement à l’exécution. En fait, les variables </a:t>
+            </a:r>
             <a:r>
               <a:rPr lang="fr-FR" dirty="0" smtClean="0"/>
-              <a:t>Boucle for</a:t>
-            </a:r>
-            <a:endParaRPr lang="fr-FR" dirty="0"/>
-          </a:p>
-          <a:p>
-            <a:pPr lvl="1"/>
-            <a:r>
-              <a:rPr lang="fr-FR" dirty="0"/>
-              <a:t>Fonctions </a:t>
-            </a:r>
-          </a:p>
-          <a:p>
-            <a:pPr lvl="1"/>
-            <a:r>
-              <a:rPr lang="fr-FR" dirty="0"/>
-              <a:t>M</a:t>
-            </a:r>
-            <a:r>
-              <a:rPr lang="fr-FR" dirty="0" smtClean="0"/>
-              <a:t>odules</a:t>
-            </a:r>
-          </a:p>
-          <a:p>
-            <a:r>
-              <a:rPr lang="fr-FR" dirty="0" smtClean="0"/>
-              <a:t>À </a:t>
-            </a:r>
-            <a:r>
-              <a:rPr lang="fr-FR" dirty="0" smtClean="0"/>
-              <a:t>la fin de cette vidéo vous connaitrez </a:t>
-            </a:r>
-            <a:r>
-              <a:rPr lang="fr-FR" dirty="0" smtClean="0"/>
-              <a:t>le minimum pour commencer à jouer avec Python</a:t>
-            </a:r>
-            <a:endParaRPr lang="fr-FR" dirty="0"/>
-          </a:p>
-        </p:txBody>
-      </p:sp>
-      <p:sp>
-        <p:nvSpPr>
-          <p:cNvPr id="4" name="ZoneTexte 3"/>
-          <p:cNvSpPr txBox="1"/>
-          <p:nvPr/>
-        </p:nvSpPr>
-        <p:spPr>
-          <a:xfrm>
-            <a:off x="0" y="92076"/>
-            <a:ext cx="1537855" cy="400110"/>
-          </a:xfrm>
-          <a:prstGeom prst="rect">
-            <a:avLst/>
-          </a:prstGeom>
-          <a:noFill/>
-          <a:ln>
-            <a:solidFill>
-              <a:srgbClr val="FF0000"/>
-            </a:solidFill>
-          </a:ln>
-        </p:spPr>
-        <p:txBody>
-          <a:bodyPr wrap="square" rtlCol="0">
-            <a:spAutoFit/>
-          </a:bodyPr>
-          <a:lstStyle/>
-          <a:p>
-            <a:r>
-              <a:rPr lang="fr-FR" sz="2000" dirty="0" smtClean="0">
-                <a:solidFill>
-                  <a:srgbClr val="FF0000"/>
-                </a:solidFill>
-                <a:latin typeface="Calibri" panose="020F0502020204030204" pitchFamily="34" charset="0"/>
-              </a:rPr>
-              <a:t>prompteur</a:t>
-            </a:r>
-            <a:endParaRPr lang="fr-FR" sz="2000" dirty="0">
-              <a:solidFill>
-                <a:srgbClr val="FF0000"/>
-              </a:solidFill>
-              <a:latin typeface="Calibri" panose="020F0502020204030204" pitchFamily="34" charset="0"/>
-            </a:endParaRPr>
-          </a:p>
-        </p:txBody>
-      </p:sp>
-    </p:spTree>
-    <p:extLst>
-      <p:ext uri="{BB962C8B-B14F-4D97-AF65-F5344CB8AC3E}">
-        <p14:creationId xmlns:p14="http://schemas.microsoft.com/office/powerpoint/2010/main" val="1143164526"/>
-      </p:ext>
-    </p:extLst>
-  </p:cSld>
-  <p:clrMapOvr>
-    <a:masterClrMapping/>
-  </p:clrMapOvr>
-  <p:timing>
-    <p:tnLst>
-      <p:par>
-        <p:cTn id="1" dur="indefinite" restart="never" nodeType="tmRoot"/>
-      </p:par>
-    </p:tnLst>
-  </p:timing>
-</p:sld>
-</file>
-
-<file path=ppt/slides/slide3.xml><?xml version="1.0" encoding="utf-8"?>
-<p:sld xmlns:a="http://schemas.openxmlformats.org/drawingml/2006/main" xmlns:r="http://schemas.openxmlformats.org/officeDocument/2006/relationships" xmlns:p="http://schemas.openxmlformats.org/presentationml/2006/main">
-  <p:cSld>
-    <p:spTree>
-      <p:nvGrpSpPr>
-        <p:cNvPr id="1" name=""/>
-        <p:cNvGrpSpPr/>
-        <p:nvPr/>
-      </p:nvGrpSpPr>
-      <p:grpSpPr>
-        <a:xfrm>
-          <a:off x="0" y="0"/>
-          <a:ext cx="0" cy="0"/>
-          <a:chOff x="0" y="0"/>
-          <a:chExt cx="0" cy="0"/>
-        </a:xfrm>
-      </p:grpSpPr>
-      <p:sp>
-        <p:nvSpPr>
-          <p:cNvPr id="2" name="Titre 1"/>
-          <p:cNvSpPr>
-            <a:spLocks noGrp="1"/>
-          </p:cNvSpPr>
-          <p:nvPr>
-            <p:ph type="title"/>
-          </p:nvPr>
-        </p:nvSpPr>
-        <p:spPr/>
-        <p:txBody>
-          <a:bodyPr/>
-          <a:lstStyle/>
-          <a:p>
-            <a:r>
-              <a:rPr lang="fr-FR" dirty="0" smtClean="0"/>
-              <a:t>Nouvelle séquence</a:t>
-            </a:r>
-            <a:endParaRPr lang="fr-FR" dirty="0"/>
-          </a:p>
-        </p:txBody>
-      </p:sp>
-      <p:sp>
-        <p:nvSpPr>
-          <p:cNvPr id="3" name="Espace réservé du contenu 2"/>
-          <p:cNvSpPr>
-            <a:spLocks noGrp="1"/>
-          </p:cNvSpPr>
-          <p:nvPr>
-            <p:ph idx="1"/>
-          </p:nvPr>
-        </p:nvSpPr>
-        <p:spPr/>
-        <p:txBody>
-          <a:bodyPr/>
-          <a:lstStyle/>
-          <a:p>
-            <a:endParaRPr lang="fr-FR"/>
-          </a:p>
-        </p:txBody>
-      </p:sp>
-    </p:spTree>
-    <p:extLst>
-      <p:ext uri="{BB962C8B-B14F-4D97-AF65-F5344CB8AC3E}">
-        <p14:creationId xmlns:p14="http://schemas.microsoft.com/office/powerpoint/2010/main" val="3107198915"/>
-      </p:ext>
-    </p:extLst>
-  </p:cSld>
-  <p:clrMapOvr>
-    <a:masterClrMapping/>
-  </p:clrMapOvr>
-  <p:timing>
-    <p:tnLst>
-      <p:par>
-        <p:cTn id="1" dur="indefinite" restart="never" nodeType="tmRoot"/>
-      </p:par>
-    </p:tnLst>
-  </p:timing>
-</p:sld>
-</file>
-
-<file path=ppt/slides/slide4.xml><?xml version="1.0" encoding="utf-8"?>
-<p:sld xmlns:a="http://schemas.openxmlformats.org/drawingml/2006/main" xmlns:r="http://schemas.openxmlformats.org/officeDocument/2006/relationships" xmlns:p="http://schemas.openxmlformats.org/presentationml/2006/main">
-  <p:cSld>
-    <p:spTree>
-      <p:nvGrpSpPr>
-        <p:cNvPr id="1" name=""/>
-        <p:cNvGrpSpPr/>
-        <p:nvPr/>
-      </p:nvGrpSpPr>
-      <p:grpSpPr>
-        <a:xfrm>
-          <a:off x="0" y="0"/>
-          <a:ext cx="0" cy="0"/>
-          <a:chOff x="0" y="0"/>
-          <a:chExt cx="0" cy="0"/>
-        </a:xfrm>
-      </p:grpSpPr>
-      <p:sp>
-        <p:nvSpPr>
-          <p:cNvPr id="2" name="Titre 1"/>
-          <p:cNvSpPr>
-            <a:spLocks noGrp="1"/>
-          </p:cNvSpPr>
-          <p:nvPr>
-            <p:ph type="title"/>
-          </p:nvPr>
-        </p:nvSpPr>
-        <p:spPr/>
-        <p:txBody>
-          <a:bodyPr/>
-          <a:lstStyle/>
-          <a:p>
-            <a:r>
-              <a:rPr lang="fr-FR" dirty="0" smtClean="0"/>
-              <a:t>En Python, tout est un objet</a:t>
-            </a:r>
-            <a:endParaRPr lang="fr-FR" dirty="0"/>
-          </a:p>
-        </p:txBody>
-      </p:sp>
-      <p:sp>
-        <p:nvSpPr>
-          <p:cNvPr id="3" name="Espace réservé du contenu 2"/>
-          <p:cNvSpPr>
-            <a:spLocks noGrp="1"/>
-          </p:cNvSpPr>
-          <p:nvPr>
-            <p:ph idx="1"/>
-          </p:nvPr>
-        </p:nvSpPr>
-        <p:spPr/>
-        <p:txBody>
-          <a:bodyPr/>
-          <a:lstStyle/>
-          <a:p>
-            <a:r>
-              <a:rPr lang="fr-FR" dirty="0" smtClean="0"/>
-              <a:t>Grande uniformité qui simplifie et accélère le développement </a:t>
-            </a:r>
-          </a:p>
-          <a:p>
-            <a:r>
-              <a:rPr lang="fr-FR" dirty="0" smtClean="0"/>
-              <a:t>On accède à tous les objets par leur référence en mémoire</a:t>
-            </a:r>
-          </a:p>
-          <a:p>
-            <a:pPr lvl="1"/>
-            <a:r>
-              <a:rPr lang="fr-FR" dirty="0" smtClean="0"/>
-              <a:t>Mais on ne manipule jamais directement les références mémoires</a:t>
-            </a:r>
-          </a:p>
-          <a:p>
-            <a:pPr lvl="1"/>
-            <a:r>
-              <a:rPr lang="fr-FR" dirty="0" smtClean="0"/>
-              <a:t>On utilise en général </a:t>
-            </a:r>
-            <a:r>
-              <a:rPr lang="fr-FR" dirty="0" smtClean="0"/>
-              <a:t>l’affectation à une variable</a:t>
-            </a:r>
-            <a:endParaRPr lang="fr-FR" dirty="0" smtClean="0"/>
-          </a:p>
-          <a:p>
-            <a:endParaRPr lang="fr-FR" dirty="0"/>
-          </a:p>
-        </p:txBody>
-      </p:sp>
-      <p:sp>
-        <p:nvSpPr>
-          <p:cNvPr id="4" name="ZoneTexte 3"/>
-          <p:cNvSpPr txBox="1"/>
-          <p:nvPr/>
-        </p:nvSpPr>
-        <p:spPr>
-          <a:xfrm>
-            <a:off x="0" y="92076"/>
-            <a:ext cx="1537855" cy="400110"/>
-          </a:xfrm>
-          <a:prstGeom prst="rect">
-            <a:avLst/>
-          </a:prstGeom>
-          <a:noFill/>
-          <a:ln>
-            <a:solidFill>
-              <a:srgbClr val="FF0000"/>
-            </a:solidFill>
-          </a:ln>
-        </p:spPr>
-        <p:txBody>
-          <a:bodyPr wrap="square" rtlCol="0">
-            <a:spAutoFit/>
-          </a:bodyPr>
-          <a:lstStyle/>
-          <a:p>
-            <a:r>
-              <a:rPr lang="fr-FR" sz="2000" dirty="0" smtClean="0">
-                <a:solidFill>
-                  <a:srgbClr val="FF0000"/>
-                </a:solidFill>
-                <a:latin typeface="Calibri" panose="020F0502020204030204" pitchFamily="34" charset="0"/>
-              </a:rPr>
-              <a:t>prompteur</a:t>
-            </a:r>
-            <a:endParaRPr lang="fr-FR" sz="2000" dirty="0">
-              <a:solidFill>
-                <a:srgbClr val="FF0000"/>
-              </a:solidFill>
-              <a:latin typeface="Calibri" panose="020F0502020204030204" pitchFamily="34" charset="0"/>
-            </a:endParaRPr>
-          </a:p>
-        </p:txBody>
-      </p:sp>
-    </p:spTree>
-    <p:extLst>
-      <p:ext uri="{BB962C8B-B14F-4D97-AF65-F5344CB8AC3E}">
-        <p14:creationId xmlns:p14="http://schemas.microsoft.com/office/powerpoint/2010/main" val="567329468"/>
-      </p:ext>
-    </p:extLst>
-  </p:cSld>
-  <p:clrMapOvr>
-    <a:masterClrMapping/>
-  </p:clrMapOvr>
-  <p:timing>
-    <p:tnLst>
-      <p:par>
-        <p:cTn id="1" dur="indefinite" restart="never" nodeType="tmRoot"/>
-      </p:par>
-    </p:tnLst>
-  </p:timing>
-</p:sld>
-</file>
-
-<file path=ppt/slides/slide5.xml><?xml version="1.0" encoding="utf-8"?>
-<p:sld xmlns:a="http://schemas.openxmlformats.org/drawingml/2006/main" xmlns:r="http://schemas.openxmlformats.org/officeDocument/2006/relationships" xmlns:p="http://schemas.openxmlformats.org/presentationml/2006/main">
-  <p:cSld>
-    <p:spTree>
-      <p:nvGrpSpPr>
-        <p:cNvPr id="1" name=""/>
-        <p:cNvGrpSpPr/>
-        <p:nvPr/>
-      </p:nvGrpSpPr>
-      <p:grpSpPr>
-        <a:xfrm>
-          <a:off x="0" y="0"/>
-          <a:ext cx="0" cy="0"/>
-          <a:chOff x="0" y="0"/>
-          <a:chExt cx="0" cy="0"/>
-        </a:xfrm>
-      </p:grpSpPr>
-      <p:sp>
-        <p:nvSpPr>
-          <p:cNvPr id="2" name="Titre 1"/>
-          <p:cNvSpPr>
-            <a:spLocks noGrp="1"/>
-          </p:cNvSpPr>
-          <p:nvPr>
-            <p:ph type="title"/>
-          </p:nvPr>
-        </p:nvSpPr>
-        <p:spPr/>
-        <p:txBody>
-          <a:bodyPr/>
-          <a:lstStyle/>
-          <a:p>
-            <a:r>
-              <a:rPr lang="fr-FR" dirty="0" smtClean="0"/>
-              <a:t>Notion de variables</a:t>
-            </a:r>
-            <a:endParaRPr lang="fr-FR" dirty="0"/>
-          </a:p>
-        </p:txBody>
-      </p:sp>
-      <p:sp>
-        <p:nvSpPr>
-          <p:cNvPr id="3" name="Espace réservé du contenu 2"/>
-          <p:cNvSpPr>
-            <a:spLocks noGrp="1"/>
-          </p:cNvSpPr>
-          <p:nvPr>
-            <p:ph idx="1"/>
-          </p:nvPr>
-        </p:nvSpPr>
-        <p:spPr>
-          <a:xfrm>
-            <a:off x="457200" y="1600200"/>
-            <a:ext cx="8686800" cy="4525963"/>
-          </a:xfrm>
-        </p:spPr>
-        <p:txBody>
-          <a:bodyPr/>
-          <a:lstStyle/>
-          <a:p>
-            <a:r>
-              <a:rPr lang="fr-FR" dirty="0" smtClean="0"/>
-              <a:t>Une variable est un nom que l’on donne à un objet pour le retrouver en mémoire</a:t>
-            </a:r>
-          </a:p>
-          <a:p>
-            <a:pPr lvl="1"/>
-            <a:r>
-              <a:rPr lang="fr-FR" dirty="0"/>
-              <a:t>Il y a deux règles importantes pour le nom d’une </a:t>
-            </a:r>
-            <a:r>
-              <a:rPr lang="fr-FR" dirty="0" smtClean="0"/>
-              <a:t>variable en Python</a:t>
-            </a:r>
-            <a:endParaRPr lang="fr-FR" dirty="0"/>
-          </a:p>
-          <a:p>
-            <a:pPr lvl="2"/>
-            <a:r>
-              <a:rPr lang="fr-FR" dirty="0" smtClean="0"/>
-              <a:t>Une variable peut être une suite quelconque de caractères alphanumériques et de tirets bas, mais une </a:t>
-            </a:r>
-            <a:r>
-              <a:rPr lang="fr-FR" dirty="0"/>
-              <a:t>variable commence soit par une lettre soit pas un tiret bas, mais jamais par un chiffre </a:t>
-            </a:r>
-          </a:p>
-          <a:p>
-            <a:pPr lvl="2"/>
-            <a:r>
-              <a:rPr lang="fr-FR" dirty="0" smtClean="0"/>
-              <a:t>Les majuscules et minuscules sont prises en compte</a:t>
-            </a:r>
-          </a:p>
-          <a:p>
-            <a:r>
-              <a:rPr lang="fr-FR" dirty="0" smtClean="0"/>
-              <a:t>La convention est d’écrire une variable en minuscule et de séparer les mots par un tiret bas</a:t>
-            </a:r>
-          </a:p>
-        </p:txBody>
-      </p:sp>
-      <p:sp>
-        <p:nvSpPr>
-          <p:cNvPr id="4" name="ZoneTexte 3"/>
-          <p:cNvSpPr txBox="1"/>
-          <p:nvPr/>
-        </p:nvSpPr>
-        <p:spPr>
-          <a:xfrm>
-            <a:off x="0" y="92076"/>
-            <a:ext cx="1537855" cy="400110"/>
-          </a:xfrm>
-          <a:prstGeom prst="rect">
-            <a:avLst/>
-          </a:prstGeom>
-          <a:noFill/>
-          <a:ln>
-            <a:solidFill>
-              <a:srgbClr val="FF0000"/>
-            </a:solidFill>
-          </a:ln>
-        </p:spPr>
-        <p:txBody>
-          <a:bodyPr wrap="square" rtlCol="0">
-            <a:spAutoFit/>
-          </a:bodyPr>
-          <a:lstStyle/>
-          <a:p>
-            <a:r>
-              <a:rPr lang="fr-FR" sz="2000" dirty="0" smtClean="0">
-                <a:solidFill>
-                  <a:srgbClr val="FF0000"/>
-                </a:solidFill>
-                <a:latin typeface="Calibri" panose="020F0502020204030204" pitchFamily="34" charset="0"/>
-              </a:rPr>
-              <a:t>prompteur</a:t>
-            </a:r>
-            <a:endParaRPr lang="fr-FR" sz="2000" dirty="0">
-              <a:solidFill>
-                <a:srgbClr val="FF0000"/>
-              </a:solidFill>
-              <a:latin typeface="Calibri" panose="020F0502020204030204" pitchFamily="34" charset="0"/>
-            </a:endParaRPr>
-          </a:p>
-        </p:txBody>
-      </p:sp>
-    </p:spTree>
-    <p:extLst>
-      <p:ext uri="{BB962C8B-B14F-4D97-AF65-F5344CB8AC3E}">
-        <p14:creationId xmlns:p14="http://schemas.microsoft.com/office/powerpoint/2010/main" val="2819011811"/>
-      </p:ext>
-    </p:extLst>
-  </p:cSld>
-  <p:clrMapOvr>
-    <a:masterClrMapping/>
-  </p:clrMapOvr>
-  <p:timing>
-    <p:tnLst>
-      <p:par>
-        <p:cTn id="1" dur="indefinite" restart="never" nodeType="tmRoot"/>
-      </p:par>
-    </p:tnLst>
-  </p:timing>
-</p:sld>
-</file>
-
-<file path=ppt/slides/slide6.xml><?xml version="1.0" encoding="utf-8"?>
-<p:sld xmlns:a="http://schemas.openxmlformats.org/drawingml/2006/main" xmlns:r="http://schemas.openxmlformats.org/officeDocument/2006/relationships" xmlns:p="http://schemas.openxmlformats.org/presentationml/2006/main">
-  <p:cSld>
-    <p:spTree>
-      <p:nvGrpSpPr>
-        <p:cNvPr id="1" name=""/>
-        <p:cNvGrpSpPr/>
-        <p:nvPr/>
-      </p:nvGrpSpPr>
-      <p:grpSpPr>
-        <a:xfrm>
-          <a:off x="0" y="0"/>
-          <a:ext cx="0" cy="0"/>
-          <a:chOff x="0" y="0"/>
-          <a:chExt cx="0" cy="0"/>
-        </a:xfrm>
-      </p:grpSpPr>
-      <p:sp>
-        <p:nvSpPr>
-          <p:cNvPr id="2" name="Titre 1"/>
-          <p:cNvSpPr>
-            <a:spLocks noGrp="1"/>
-          </p:cNvSpPr>
-          <p:nvPr>
-            <p:ph type="title"/>
-          </p:nvPr>
-        </p:nvSpPr>
-        <p:spPr/>
-        <p:txBody>
-          <a:bodyPr/>
-          <a:lstStyle/>
-          <a:p>
-            <a:r>
-              <a:rPr lang="fr-FR" dirty="0" smtClean="0"/>
-              <a:t>Typage dynamique</a:t>
-            </a:r>
-            <a:endParaRPr lang="fr-FR" dirty="0"/>
-          </a:p>
-        </p:txBody>
-      </p:sp>
-      <p:sp>
-        <p:nvSpPr>
-          <p:cNvPr id="3" name="Espace réservé du contenu 2"/>
-          <p:cNvSpPr>
-            <a:spLocks noGrp="1"/>
-          </p:cNvSpPr>
-          <p:nvPr>
-            <p:ph idx="1"/>
-          </p:nvPr>
-        </p:nvSpPr>
-        <p:spPr/>
-        <p:txBody>
-          <a:bodyPr/>
-          <a:lstStyle/>
-          <a:p>
-            <a:r>
-              <a:rPr lang="fr-FR" dirty="0" smtClean="0"/>
-              <a:t>Python utilise le typage dynamique</a:t>
-            </a:r>
-          </a:p>
-          <a:p>
-            <a:pPr lvl="1"/>
-            <a:r>
-              <a:rPr lang="fr-FR" dirty="0" smtClean="0"/>
-              <a:t>Les variables n’ont pas de type, c’est l’objet qui a un type</a:t>
-            </a:r>
-          </a:p>
-          <a:p>
-            <a:pPr lvl="1"/>
-            <a:r>
-              <a:rPr lang="fr-FR" dirty="0" smtClean="0"/>
-              <a:t>On ne définit pas le type à l’écriture du programme, il est déterminé automatiquement à l’exécution</a:t>
-            </a:r>
-          </a:p>
-          <a:p>
-            <a:pPr lvl="1"/>
-            <a:endParaRPr lang="fr-FR" dirty="0" smtClean="0"/>
+              <a:t>n’ont pas de type, ce sont les objets qu’elles référencent qui ont un type. Prenons un exemple…</a:t>
+            </a:r>
           </a:p>
         </p:txBody>
       </p:sp>
@@ -5416,7 +5483,7 @@
 </p:sld>
 </file>
 
-<file path=ppt/slides/slide7.xml><?xml version="1.0" encoding="utf-8"?>
+<file path=ppt/slides/slide11.xml><?xml version="1.0" encoding="utf-8"?>
 <p:sld xmlns:a="http://schemas.openxmlformats.org/drawingml/2006/main" xmlns:r="http://schemas.openxmlformats.org/officeDocument/2006/relationships" xmlns:p="http://schemas.openxmlformats.org/presentationml/2006/main">
   <p:cSld>
     <p:spTree>
@@ -5441,8 +5508,8 @@
         </p:nvSpPr>
         <p:spPr bwMode="auto">
           <a:xfrm>
-            <a:off x="4622800" y="2036617"/>
-            <a:ext cx="4064000" cy="4525963"/>
+            <a:off x="4622800" y="2379784"/>
+            <a:ext cx="3548185" cy="3948335"/>
           </a:xfrm>
           <a:prstGeom prst="rect">
             <a:avLst/>
@@ -5450,7 +5517,7 @@
           <a:noFill/>
           <a:ln w="38100" cap="flat" cmpd="sng" algn="ctr">
             <a:solidFill>
-              <a:srgbClr val="FF0000"/>
+              <a:schemeClr val="tx1"/>
             </a:solidFill>
             <a:prstDash val="solid"/>
             <a:round/>
@@ -5460,7 +5527,7 @@
           <a:effectLst/>
         </p:spPr>
         <p:txBody>
-          <a:bodyPr vert="horz" wrap="none" lIns="90000" tIns="46800" rIns="90000" bIns="46800" numCol="1" rtlCol="0" anchor="ctr" anchorCtr="0" compatLnSpc="1">
+          <a:bodyPr vert="horz" wrap="square" lIns="90000" tIns="46800" rIns="90000" bIns="46800" numCol="1" rtlCol="0" anchor="ctr" anchorCtr="0" compatLnSpc="1">
             <a:prstTxWarp prst="textNoShape">
               <a:avLst/>
             </a:prstTxWarp>
@@ -5505,7 +5572,7 @@
         </p:nvSpPr>
         <p:spPr>
           <a:xfrm>
-            <a:off x="5493327" y="1113287"/>
+            <a:off x="5188527" y="1456454"/>
             <a:ext cx="3454400" cy="923330"/>
           </a:xfrm>
           <a:prstGeom prst="rect">
@@ -5539,8 +5606,8 @@
         </p:nvSpPr>
         <p:spPr bwMode="auto">
           <a:xfrm>
-            <a:off x="457200" y="2036618"/>
-            <a:ext cx="4064000" cy="4525963"/>
+            <a:off x="457200" y="2379785"/>
+            <a:ext cx="3548185" cy="3948335"/>
           </a:xfrm>
           <a:prstGeom prst="rect">
             <a:avLst/>
@@ -5548,7 +5615,7 @@
           <a:noFill/>
           <a:ln w="38100" cap="flat" cmpd="sng" algn="ctr">
             <a:solidFill>
-              <a:srgbClr val="FF0000"/>
+              <a:schemeClr val="tx1"/>
             </a:solidFill>
             <a:prstDash val="solid"/>
             <a:round/>
@@ -5558,7 +5625,7 @@
           <a:effectLst/>
         </p:spPr>
         <p:txBody>
-          <a:bodyPr vert="horz" wrap="none" lIns="90000" tIns="46800" rIns="90000" bIns="46800" numCol="1" rtlCol="0" anchor="ctr" anchorCtr="0" compatLnSpc="1">
+          <a:bodyPr vert="horz" wrap="square" lIns="90000" tIns="46800" rIns="90000" bIns="46800" numCol="1" rtlCol="0" anchor="ctr" anchorCtr="0" compatLnSpc="1">
             <a:prstTxWarp prst="textNoShape">
               <a:avLst/>
             </a:prstTxWarp>
@@ -5603,7 +5670,7 @@
         </p:nvSpPr>
         <p:spPr>
           <a:xfrm>
-            <a:off x="1248064" y="1113287"/>
+            <a:off x="859693" y="1485232"/>
             <a:ext cx="3454400" cy="923330"/>
           </a:xfrm>
           <a:prstGeom prst="rect">
@@ -5638,7 +5705,7 @@
         <p:spPr>
           <a:xfrm>
             <a:off x="457200" y="322926"/>
-            <a:ext cx="6669809" cy="707886"/>
+            <a:ext cx="6669809" cy="1323439"/>
           </a:xfrm>
           <a:prstGeom prst="rect">
             <a:avLst/>
@@ -5656,7 +5723,23 @@
                 <a:latin typeface="Courier New" panose="02070309020205020404" pitchFamily="49" charset="0"/>
                 <a:cs typeface="Courier New" panose="02070309020205020404" pitchFamily="49" charset="0"/>
               </a:rPr>
-              <a:t>&gt;&gt;&gt; a = 3</a:t>
+              <a:t>&gt;&gt;&gt; a = </a:t>
+            </a:r>
+            <a:r>
+              <a:rPr lang="fr-FR" sz="4000" dirty="0" smtClean="0">
+                <a:latin typeface="Courier New" panose="02070309020205020404" pitchFamily="49" charset="0"/>
+                <a:cs typeface="Courier New" panose="02070309020205020404" pitchFamily="49" charset="0"/>
+              </a:rPr>
+              <a:t>3</a:t>
+            </a:r>
+          </a:p>
+          <a:p>
+            <a:r>
+              <a:rPr lang="fr-FR" sz="4000" dirty="0">
+                <a:latin typeface="Courier New" panose="02070309020205020404" pitchFamily="49" charset="0"/>
+                <a:cs typeface="Courier New" panose="02070309020205020404" pitchFamily="49" charset="0"/>
+              </a:rPr>
+              <a:t>&gt;&gt;&gt; a = 'spam'</a:t>
             </a:r>
             <a:endParaRPr lang="fr-FR" sz="4000" dirty="0">
               <a:latin typeface="Courier New" panose="02070309020205020404" pitchFamily="49" charset="0"/>
@@ -5747,8 +5830,8 @@
         </p:nvSpPr>
         <p:spPr bwMode="auto">
           <a:xfrm>
-            <a:off x="2348346" y="3075378"/>
-            <a:ext cx="3595254" cy="1101768"/>
+            <a:off x="2348346" y="3400332"/>
+            <a:ext cx="3595254" cy="776814"/>
           </a:xfrm>
           <a:custGeom>
             <a:avLst/>
@@ -5830,6 +5913,160 @@
           </a:p>
         </p:txBody>
       </p:sp>
+      <p:sp>
+        <p:nvSpPr>
+          <p:cNvPr id="10" name="ZoneTexte 9"/>
+          <p:cNvSpPr txBox="1"/>
+          <p:nvPr/>
+        </p:nvSpPr>
+        <p:spPr>
+          <a:xfrm>
+            <a:off x="5243678" y="4810726"/>
+            <a:ext cx="2168770" cy="923330"/>
+          </a:xfrm>
+          <a:prstGeom prst="rect">
+            <a:avLst/>
+          </a:prstGeom>
+          <a:noFill/>
+          <a:ln w="38100">
+            <a:solidFill>
+              <a:schemeClr val="tx1"/>
+            </a:solidFill>
+          </a:ln>
+        </p:spPr>
+        <p:txBody>
+          <a:bodyPr wrap="square" rtlCol="0">
+            <a:spAutoFit/>
+          </a:bodyPr>
+          <a:lstStyle/>
+          <a:p>
+            <a:pPr algn="ctr"/>
+            <a:r>
+              <a:rPr lang="fr-FR" sz="5400" dirty="0">
+                <a:latin typeface="Calibri" panose="020F0502020204030204" pitchFamily="34" charset="0"/>
+                <a:cs typeface="Courier New" panose="02070309020205020404" pitchFamily="49" charset="0"/>
+              </a:rPr>
+              <a:t>'spam'</a:t>
+            </a:r>
+            <a:endParaRPr lang="fr-FR" sz="5400" dirty="0">
+              <a:latin typeface="Calibri" panose="020F0502020204030204" pitchFamily="34" charset="0"/>
+            </a:endParaRPr>
+          </a:p>
+        </p:txBody>
+      </p:sp>
+      <p:sp>
+        <p:nvSpPr>
+          <p:cNvPr id="13" name="Forme libre 12"/>
+          <p:cNvSpPr/>
+          <p:nvPr/>
+        </p:nvSpPr>
+        <p:spPr bwMode="auto">
+          <a:xfrm>
+            <a:off x="2321169" y="4255477"/>
+            <a:ext cx="2872154" cy="1370054"/>
+          </a:xfrm>
+          <a:custGeom>
+            <a:avLst/>
+            <a:gdLst>
+              <a:gd name="connsiteX0" fmla="*/ 0 w 2872154"/>
+              <a:gd name="connsiteY0" fmla="*/ 0 h 1370054"/>
+              <a:gd name="connsiteX1" fmla="*/ 1207477 w 2872154"/>
+              <a:gd name="connsiteY1" fmla="*/ 1289538 h 1370054"/>
+              <a:gd name="connsiteX2" fmla="*/ 2872154 w 2872154"/>
+              <a:gd name="connsiteY2" fmla="*/ 1125415 h 1370054"/>
+            </a:gdLst>
+            <a:ahLst/>
+            <a:cxnLst>
+              <a:cxn ang="0">
+                <a:pos x="connsiteX0" y="connsiteY0"/>
+              </a:cxn>
+              <a:cxn ang="0">
+                <a:pos x="connsiteX1" y="connsiteY1"/>
+              </a:cxn>
+              <a:cxn ang="0">
+                <a:pos x="connsiteX2" y="connsiteY2"/>
+              </a:cxn>
+            </a:cxnLst>
+            <a:rect l="l" t="t" r="r" b="b"/>
+            <a:pathLst>
+              <a:path w="2872154" h="1370054">
+                <a:moveTo>
+                  <a:pt x="0" y="0"/>
+                </a:moveTo>
+                <a:cubicBezTo>
+                  <a:pt x="364392" y="550984"/>
+                  <a:pt x="728785" y="1101969"/>
+                  <a:pt x="1207477" y="1289538"/>
+                </a:cubicBezTo>
+                <a:cubicBezTo>
+                  <a:pt x="1686169" y="1477107"/>
+                  <a:pt x="2279161" y="1301261"/>
+                  <a:pt x="2872154" y="1125415"/>
+                </a:cubicBezTo>
+              </a:path>
+            </a:pathLst>
+          </a:custGeom>
+          <a:noFill/>
+          <a:ln w="38100" cap="flat" cmpd="sng" algn="ctr">
+            <a:solidFill>
+              <a:schemeClr val="tx1"/>
+            </a:solidFill>
+            <a:prstDash val="solid"/>
+            <a:round/>
+            <a:headEnd type="none" w="med" len="med"/>
+            <a:tailEnd type="triangle" w="lg" len="lg"/>
+          </a:ln>
+          <a:effectLst/>
+        </p:spPr>
+        <p:txBody>
+          <a:bodyPr rtlCol="0" anchor="ctr"/>
+          <a:lstStyle/>
+          <a:p>
+            <a:pPr algn="ctr"/>
+            <a:endParaRPr lang="fr-FR"/>
+          </a:p>
+        </p:txBody>
+      </p:sp>
+      <p:sp>
+        <p:nvSpPr>
+          <p:cNvPr id="14" name="ZoneTexte 13"/>
+          <p:cNvSpPr txBox="1"/>
+          <p:nvPr/>
+        </p:nvSpPr>
+        <p:spPr>
+          <a:xfrm>
+            <a:off x="4021326" y="2938667"/>
+            <a:ext cx="585532" cy="923330"/>
+          </a:xfrm>
+          <a:prstGeom prst="rect">
+            <a:avLst/>
+          </a:prstGeom>
+          <a:noFill/>
+        </p:spPr>
+        <p:txBody>
+          <a:bodyPr wrap="square" rtlCol="0">
+            <a:spAutoFit/>
+          </a:bodyPr>
+          <a:lstStyle/>
+          <a:p>
+            <a:r>
+              <a:rPr lang="fr-FR" sz="5400" dirty="0" smtClean="0">
+                <a:solidFill>
+                  <a:srgbClr val="FF0000"/>
+                </a:solidFill>
+                <a:latin typeface="Calibri" panose="020F0502020204030204" pitchFamily="34" charset="0"/>
+              </a:rPr>
+              <a:t>X</a:t>
+            </a:r>
+            <a:endParaRPr lang="fr-FR" sz="5400" dirty="0">
+              <a:solidFill>
+                <a:srgbClr val="FF0000"/>
+              </a:solidFill>
+              <a:latin typeface="Calibri" panose="020F0502020204030204" pitchFamily="34" charset="0"/>
+            </a:endParaRPr>
+          </a:p>
+        </p:txBody>
+      </p:sp>
     </p:spTree>
     <p:extLst>
       <p:ext uri="{BB962C8B-B14F-4D97-AF65-F5344CB8AC3E}">
@@ -5852,6 +6089,9 @@
                     <p:cTn id="3" fill="hold">
                       <p:stCondLst>
                         <p:cond delay="indefinite"/>
+                        <p:cond evt="onBegin" delay="0">
+                          <p:tn val="2"/>
+                        </p:cond>
                       </p:stCondLst>
                       <p:childTnLst>
                         <p:par>
@@ -5861,7 +6101,7 @@
                             </p:stCondLst>
                             <p:childTnLst>
                               <p:par>
-                                <p:cTn id="5" presetID="10" presetClass="entr" presetSubtype="0" fill="hold" grpId="0" nodeType="clickEffect">
+                                <p:cTn id="5" presetID="10" presetClass="entr" presetSubtype="0" fill="hold" grpId="0" nodeType="withEffect">
                                   <p:stCondLst>
                                     <p:cond delay="0"/>
                                   </p:stCondLst>
@@ -6218,6 +6458,314 @@
                       </p:childTnLst>
                     </p:cTn>
                   </p:par>
+                  <p:par>
+                    <p:cTn id="37" fill="hold">
+                      <p:stCondLst>
+                        <p:cond delay="indefinite"/>
+                      </p:stCondLst>
+                      <p:childTnLst>
+                        <p:par>
+                          <p:cTn id="38" fill="hold">
+                            <p:stCondLst>
+                              <p:cond delay="0"/>
+                            </p:stCondLst>
+                            <p:childTnLst>
+                              <p:par>
+                                <p:cTn id="39" presetID="10" presetClass="entr" presetSubtype="0" fill="hold" nodeType="clickEffect">
+                                  <p:stCondLst>
+                                    <p:cond delay="0"/>
+                                  </p:stCondLst>
+                                  <p:childTnLst>
+                                    <p:set>
+                                      <p:cBhvr>
+                                        <p:cTn id="40" dur="1" fill="hold">
+                                          <p:stCondLst>
+                                            <p:cond delay="0"/>
+                                          </p:stCondLst>
+                                        </p:cTn>
+                                        <p:tgtEl>
+                                          <p:spTgt spid="2">
+                                            <p:txEl>
+                                              <p:pRg st="1" end="1"/>
+                                            </p:txEl>
+                                          </p:spTgt>
+                                        </p:tgtEl>
+                                        <p:attrNameLst>
+                                          <p:attrName>style.visibility</p:attrName>
+                                        </p:attrNameLst>
+                                      </p:cBhvr>
+                                      <p:to>
+                                        <p:strVal val="visible"/>
+                                      </p:to>
+                                    </p:set>
+                                    <p:animEffect transition="in" filter="fade">
+                                      <p:cBhvr>
+                                        <p:cTn id="41" dur="500"/>
+                                        <p:tgtEl>
+                                          <p:spTgt spid="2">
+                                            <p:txEl>
+                                              <p:pRg st="1" end="1"/>
+                                            </p:txEl>
+                                          </p:spTgt>
+                                        </p:tgtEl>
+                                      </p:cBhvr>
+                                    </p:animEffect>
+                                  </p:childTnLst>
+                                </p:cTn>
+                              </p:par>
+                            </p:childTnLst>
+                          </p:cTn>
+                        </p:par>
+                      </p:childTnLst>
+                    </p:cTn>
+                  </p:par>
+                  <p:par>
+                    <p:cTn id="42" fill="hold">
+                      <p:stCondLst>
+                        <p:cond delay="indefinite"/>
+                      </p:stCondLst>
+                      <p:childTnLst>
+                        <p:par>
+                          <p:cTn id="43" fill="hold">
+                            <p:stCondLst>
+                              <p:cond delay="0"/>
+                            </p:stCondLst>
+                            <p:childTnLst>
+                              <p:par>
+                                <p:cTn id="44" presetID="10" presetClass="entr" presetSubtype="0" fill="hold" grpId="0" nodeType="clickEffect">
+                                  <p:stCondLst>
+                                    <p:cond delay="0"/>
+                                  </p:stCondLst>
+                                  <p:childTnLst>
+                                    <p:set>
+                                      <p:cBhvr>
+                                        <p:cTn id="45" dur="1" fill="hold">
+                                          <p:stCondLst>
+                                            <p:cond delay="0"/>
+                                          </p:stCondLst>
+                                        </p:cTn>
+                                        <p:tgtEl>
+                                          <p:spTgt spid="10"/>
+                                        </p:tgtEl>
+                                        <p:attrNameLst>
+                                          <p:attrName>style.visibility</p:attrName>
+                                        </p:attrNameLst>
+                                      </p:cBhvr>
+                                      <p:to>
+                                        <p:strVal val="visible"/>
+                                      </p:to>
+                                    </p:set>
+                                    <p:animEffect transition="in" filter="fade">
+                                      <p:cBhvr>
+                                        <p:cTn id="46" dur="500"/>
+                                        <p:tgtEl>
+                                          <p:spTgt spid="10"/>
+                                        </p:tgtEl>
+                                      </p:cBhvr>
+                                    </p:animEffect>
+                                  </p:childTnLst>
+                                </p:cTn>
+                              </p:par>
+                            </p:childTnLst>
+                          </p:cTn>
+                        </p:par>
+                      </p:childTnLst>
+                    </p:cTn>
+                  </p:par>
+                  <p:par>
+                    <p:cTn id="47" fill="hold">
+                      <p:stCondLst>
+                        <p:cond delay="indefinite"/>
+                      </p:stCondLst>
+                      <p:childTnLst>
+                        <p:par>
+                          <p:cTn id="48" fill="hold">
+                            <p:stCondLst>
+                              <p:cond delay="0"/>
+                            </p:stCondLst>
+                            <p:childTnLst>
+                              <p:par>
+                                <p:cTn id="49" presetID="10" presetClass="entr" presetSubtype="0" fill="hold" grpId="0" nodeType="clickEffect">
+                                  <p:stCondLst>
+                                    <p:cond delay="0"/>
+                                  </p:stCondLst>
+                                  <p:childTnLst>
+                                    <p:set>
+                                      <p:cBhvr>
+                                        <p:cTn id="50" dur="1" fill="hold">
+                                          <p:stCondLst>
+                                            <p:cond delay="0"/>
+                                          </p:stCondLst>
+                                        </p:cTn>
+                                        <p:tgtEl>
+                                          <p:spTgt spid="14"/>
+                                        </p:tgtEl>
+                                        <p:attrNameLst>
+                                          <p:attrName>style.visibility</p:attrName>
+                                        </p:attrNameLst>
+                                      </p:cBhvr>
+                                      <p:to>
+                                        <p:strVal val="visible"/>
+                                      </p:to>
+                                    </p:set>
+                                    <p:animEffect transition="in" filter="fade">
+                                      <p:cBhvr>
+                                        <p:cTn id="51" dur="500"/>
+                                        <p:tgtEl>
+                                          <p:spTgt spid="14"/>
+                                        </p:tgtEl>
+                                      </p:cBhvr>
+                                    </p:animEffect>
+                                  </p:childTnLst>
+                                </p:cTn>
+                              </p:par>
+                            </p:childTnLst>
+                          </p:cTn>
+                        </p:par>
+                      </p:childTnLst>
+                    </p:cTn>
+                  </p:par>
+                  <p:par>
+                    <p:cTn id="52" fill="hold">
+                      <p:stCondLst>
+                        <p:cond delay="indefinite"/>
+                      </p:stCondLst>
+                      <p:childTnLst>
+                        <p:par>
+                          <p:cTn id="53" fill="hold">
+                            <p:stCondLst>
+                              <p:cond delay="0"/>
+                            </p:stCondLst>
+                            <p:childTnLst>
+                              <p:par>
+                                <p:cTn id="54" presetID="10" presetClass="exit" presetSubtype="0" fill="hold" grpId="1" nodeType="clickEffect">
+                                  <p:stCondLst>
+                                    <p:cond delay="0"/>
+                                  </p:stCondLst>
+                                  <p:childTnLst>
+                                    <p:animEffect transition="out" filter="fade">
+                                      <p:cBhvr>
+                                        <p:cTn id="55" dur="500"/>
+                                        <p:tgtEl>
+                                          <p:spTgt spid="12"/>
+                                        </p:tgtEl>
+                                      </p:cBhvr>
+                                    </p:animEffect>
+                                    <p:set>
+                                      <p:cBhvr>
+                                        <p:cTn id="56" dur="1" fill="hold">
+                                          <p:stCondLst>
+                                            <p:cond delay="499"/>
+                                          </p:stCondLst>
+                                        </p:cTn>
+                                        <p:tgtEl>
+                                          <p:spTgt spid="12"/>
+                                        </p:tgtEl>
+                                        <p:attrNameLst>
+                                          <p:attrName>style.visibility</p:attrName>
+                                        </p:attrNameLst>
+                                      </p:cBhvr>
+                                      <p:to>
+                                        <p:strVal val="hidden"/>
+                                      </p:to>
+                                    </p:set>
+                                  </p:childTnLst>
+                                </p:cTn>
+                              </p:par>
+                              <p:par>
+                                <p:cTn id="57" presetID="10" presetClass="exit" presetSubtype="0" fill="hold" grpId="1" nodeType="withEffect">
+                                  <p:stCondLst>
+                                    <p:cond delay="0"/>
+                                  </p:stCondLst>
+                                  <p:childTnLst>
+                                    <p:animEffect transition="out" filter="fade">
+                                      <p:cBhvr>
+                                        <p:cTn id="58" dur="500"/>
+                                        <p:tgtEl>
+                                          <p:spTgt spid="14"/>
+                                        </p:tgtEl>
+                                      </p:cBhvr>
+                                    </p:animEffect>
+                                    <p:set>
+                                      <p:cBhvr>
+                                        <p:cTn id="59" dur="1" fill="hold">
+                                          <p:stCondLst>
+                                            <p:cond delay="499"/>
+                                          </p:stCondLst>
+                                        </p:cTn>
+                                        <p:tgtEl>
+                                          <p:spTgt spid="14"/>
+                                        </p:tgtEl>
+                                        <p:attrNameLst>
+                                          <p:attrName>style.visibility</p:attrName>
+                                        </p:attrNameLst>
+                                      </p:cBhvr>
+                                      <p:to>
+                                        <p:strVal val="hidden"/>
+                                      </p:to>
+                                    </p:set>
+                                  </p:childTnLst>
+                                </p:cTn>
+                              </p:par>
+                            </p:childTnLst>
+                          </p:cTn>
+                        </p:par>
+                      </p:childTnLst>
+                    </p:cTn>
+                  </p:par>
+                  <p:par>
+                    <p:cTn id="60" fill="hold">
+                      <p:stCondLst>
+                        <p:cond delay="indefinite"/>
+                      </p:stCondLst>
+                      <p:childTnLst>
+                        <p:par>
+                          <p:cTn id="61" fill="hold">
+                            <p:stCondLst>
+                              <p:cond delay="0"/>
+                            </p:stCondLst>
+                            <p:childTnLst>
+                              <p:par>
+                                <p:cTn id="62" presetID="10" presetClass="entr" presetSubtype="0" fill="hold" grpId="0" nodeType="clickEffect">
+                                  <p:stCondLst>
+                                    <p:cond delay="0"/>
+                                  </p:stCondLst>
+                                  <p:childTnLst>
+                                    <p:set>
+                                      <p:cBhvr>
+                                        <p:cTn id="63" dur="1" fill="hold">
+                                          <p:stCondLst>
+                                            <p:cond delay="0"/>
+                                          </p:stCondLst>
+                                        </p:cTn>
+                                        <p:tgtEl>
+                                          <p:spTgt spid="13"/>
+                                        </p:tgtEl>
+                                        <p:attrNameLst>
+                                          <p:attrName>style.visibility</p:attrName>
+                                        </p:attrNameLst>
+                                      </p:cBhvr>
+                                      <p:to>
+                                        <p:strVal val="visible"/>
+                                      </p:to>
+                                    </p:set>
+                                    <p:animEffect transition="in" filter="fade">
+                                      <p:cBhvr>
+                                        <p:cTn id="64" dur="500"/>
+                                        <p:tgtEl>
+                                          <p:spTgt spid="13"/>
+                                        </p:tgtEl>
+                                      </p:cBhvr>
+                                    </p:animEffect>
+                                  </p:childTnLst>
+                                </p:cTn>
+                              </p:par>
+                            </p:childTnLst>
+                          </p:cTn>
+                        </p:par>
+                      </p:childTnLst>
+                    </p:cTn>
+                  </p:par>
                 </p:childTnLst>
               </p:cTn>
               <p:prevCondLst>
@@ -6248,6 +6796,1592 @@
       <p:bldP spid="8" grpId="0" animBg="1"/>
       <p:bldP spid="9" grpId="0"/>
       <p:bldP spid="12" grpId="0" animBg="1"/>
+      <p:bldP spid="12" grpId="1" animBg="1"/>
+      <p:bldP spid="10" grpId="0" animBg="1"/>
+      <p:bldP spid="13" grpId="0" animBg="1"/>
+      <p:bldP spid="14" grpId="0"/>
+      <p:bldP spid="14" grpId="1"/>
+    </p:bldLst>
+  </p:timing>
+</p:sld>
+</file>
+
+<file path=ppt/slides/slide12.xml><?xml version="1.0" encoding="utf-8"?>
+<p:sld xmlns:a="http://schemas.openxmlformats.org/drawingml/2006/main" xmlns:r="http://schemas.openxmlformats.org/officeDocument/2006/relationships" xmlns:p="http://schemas.openxmlformats.org/presentationml/2006/main">
+  <p:cSld>
+    <p:spTree>
+      <p:nvGrpSpPr>
+        <p:cNvPr id="1" name=""/>
+        <p:cNvGrpSpPr/>
+        <p:nvPr/>
+      </p:nvGrpSpPr>
+      <p:grpSpPr>
+        <a:xfrm>
+          <a:off x="0" y="0"/>
+          <a:ext cx="0" cy="0"/>
+          <a:chOff x="0" y="0"/>
+          <a:chExt cx="0" cy="0"/>
+        </a:xfrm>
+      </p:grpSpPr>
+      <p:sp>
+        <p:nvSpPr>
+          <p:cNvPr id="2" name="Titre 1"/>
+          <p:cNvSpPr>
+            <a:spLocks noGrp="1"/>
+          </p:cNvSpPr>
+          <p:nvPr>
+            <p:ph type="title"/>
+          </p:nvPr>
+        </p:nvSpPr>
+        <p:spPr/>
+        <p:txBody>
+          <a:bodyPr/>
+          <a:lstStyle/>
+          <a:p>
+            <a:r>
+              <a:rPr lang="fr-FR" dirty="0"/>
+              <a:t>Typage </a:t>
+            </a:r>
+            <a:r>
+              <a:rPr lang="fr-FR" dirty="0" smtClean="0"/>
+              <a:t>dynamique (30s)</a:t>
+            </a:r>
+            <a:endParaRPr lang="fr-FR" dirty="0"/>
+          </a:p>
+        </p:txBody>
+      </p:sp>
+      <p:sp>
+        <p:nvSpPr>
+          <p:cNvPr id="3" name="Espace réservé du contenu 2"/>
+          <p:cNvSpPr>
+            <a:spLocks noGrp="1"/>
+          </p:cNvSpPr>
+          <p:nvPr>
+            <p:ph idx="1"/>
+          </p:nvPr>
+        </p:nvSpPr>
+        <p:spPr/>
+        <p:txBody>
+          <a:bodyPr/>
+          <a:lstStyle/>
+          <a:p>
+            <a:r>
+              <a:rPr lang="fr-FR" sz="2800" dirty="0" smtClean="0"/>
+              <a:t>Le typage dynamique offre beaucoup de flexibilité, facilite grandement l’écriture des programmes et permet d’écrire du code polymorphe, c’est-à-dire du code qui fonctionne automatiquement pour différent types d’objets. Nous reviendrons sur la notion de polymorphisme dans les semaines qui viennent.</a:t>
+            </a:r>
+          </a:p>
+          <a:p>
+            <a:r>
+              <a:rPr lang="fr-FR" sz="2800" dirty="0" smtClean="0"/>
+              <a:t>Dans cette vidéo, nous avons introduit la notion d’objet avec les variables et le typage dynamique. Dans la prochaine vidéo, nous introduirons les types de base,  et </a:t>
+            </a:r>
+            <a:r>
+              <a:rPr lang="fr-FR" sz="2800" dirty="0"/>
+              <a:t>les techniques de factorisation de code que sont les boucles, les fonctions et les modules</a:t>
+            </a:r>
+          </a:p>
+          <a:p>
+            <a:endParaRPr lang="fr-FR" sz="2800" dirty="0"/>
+          </a:p>
+        </p:txBody>
+      </p:sp>
+    </p:spTree>
+    <p:extLst>
+      <p:ext uri="{BB962C8B-B14F-4D97-AF65-F5344CB8AC3E}">
+        <p14:creationId xmlns:p14="http://schemas.microsoft.com/office/powerpoint/2010/main" val="118494192"/>
+      </p:ext>
+    </p:extLst>
+  </p:cSld>
+  <p:clrMapOvr>
+    <a:masterClrMapping/>
+  </p:clrMapOvr>
+  <p:timing>
+    <p:tnLst>
+      <p:par>
+        <p:cTn id="1" dur="indefinite" restart="never" nodeType="tmRoot"/>
+      </p:par>
+    </p:tnLst>
+  </p:timing>
+</p:sld>
+</file>
+
+<file path=ppt/slides/slide13.xml><?xml version="1.0" encoding="utf-8"?>
+<p:sld xmlns:a="http://schemas.openxmlformats.org/drawingml/2006/main" xmlns:r="http://schemas.openxmlformats.org/officeDocument/2006/relationships" xmlns:p="http://schemas.openxmlformats.org/presentationml/2006/main">
+  <p:cSld>
+    <p:spTree>
+      <p:nvGrpSpPr>
+        <p:cNvPr id="1" name=""/>
+        <p:cNvGrpSpPr/>
+        <p:nvPr/>
+      </p:nvGrpSpPr>
+      <p:grpSpPr>
+        <a:xfrm>
+          <a:off x="0" y="0"/>
+          <a:ext cx="0" cy="0"/>
+          <a:chOff x="0" y="0"/>
+          <a:chExt cx="0" cy="0"/>
+        </a:xfrm>
+      </p:grpSpPr>
+      <p:sp>
+        <p:nvSpPr>
+          <p:cNvPr id="4" name="Titre 3"/>
+          <p:cNvSpPr>
+            <a:spLocks noGrp="1"/>
+          </p:cNvSpPr>
+          <p:nvPr>
+            <p:ph type="ctrTitle"/>
+          </p:nvPr>
+        </p:nvSpPr>
+        <p:spPr/>
+        <p:txBody>
+          <a:bodyPr/>
+          <a:lstStyle/>
+          <a:p>
+            <a:r>
+              <a:rPr lang="fr-FR" dirty="0" smtClean="0"/>
+              <a:t>Total : 5 minutes 28 secondes</a:t>
+            </a:r>
+            <a:endParaRPr lang="fr-FR" dirty="0"/>
+          </a:p>
+        </p:txBody>
+      </p:sp>
+      <p:sp>
+        <p:nvSpPr>
+          <p:cNvPr id="5" name="Sous-titre 4"/>
+          <p:cNvSpPr>
+            <a:spLocks noGrp="1"/>
+          </p:cNvSpPr>
+          <p:nvPr>
+            <p:ph type="subTitle" idx="1"/>
+          </p:nvPr>
+        </p:nvSpPr>
+        <p:spPr/>
+        <p:txBody>
+          <a:bodyPr/>
+          <a:lstStyle/>
+          <a:p>
+            <a:endParaRPr lang="fr-FR"/>
+          </a:p>
+        </p:txBody>
+      </p:sp>
+    </p:spTree>
+    <p:extLst>
+      <p:ext uri="{BB962C8B-B14F-4D97-AF65-F5344CB8AC3E}">
+        <p14:creationId xmlns:p14="http://schemas.microsoft.com/office/powerpoint/2010/main" val="2203744170"/>
+      </p:ext>
+    </p:extLst>
+  </p:cSld>
+  <p:clrMapOvr>
+    <a:masterClrMapping/>
+  </p:clrMapOvr>
+  <p:timing>
+    <p:tnLst>
+      <p:par>
+        <p:cTn id="1" dur="indefinite" restart="never" nodeType="tmRoot"/>
+      </p:par>
+    </p:tnLst>
+  </p:timing>
+</p:sld>
+</file>
+
+<file path=ppt/slides/slide2.xml><?xml version="1.0" encoding="utf-8"?>
+<p:sld xmlns:a="http://schemas.openxmlformats.org/drawingml/2006/main" xmlns:r="http://schemas.openxmlformats.org/officeDocument/2006/relationships" xmlns:p="http://schemas.openxmlformats.org/presentationml/2006/main">
+  <p:cSld>
+    <p:spTree>
+      <p:nvGrpSpPr>
+        <p:cNvPr id="1" name=""/>
+        <p:cNvGrpSpPr/>
+        <p:nvPr/>
+      </p:nvGrpSpPr>
+      <p:grpSpPr>
+        <a:xfrm>
+          <a:off x="0" y="0"/>
+          <a:ext cx="0" cy="0"/>
+          <a:chOff x="0" y="0"/>
+          <a:chExt cx="0" cy="0"/>
+        </a:xfrm>
+      </p:grpSpPr>
+      <p:sp>
+        <p:nvSpPr>
+          <p:cNvPr id="2" name="Titre 1"/>
+          <p:cNvSpPr>
+            <a:spLocks noGrp="1"/>
+          </p:cNvSpPr>
+          <p:nvPr>
+            <p:ph type="title"/>
+          </p:nvPr>
+        </p:nvSpPr>
+        <p:spPr/>
+        <p:txBody>
+          <a:bodyPr/>
+          <a:lstStyle/>
+          <a:p>
+            <a:r>
+              <a:rPr lang="fr-FR" dirty="0" smtClean="0"/>
+              <a:t>Résumé de la </a:t>
+            </a:r>
+            <a:r>
+              <a:rPr lang="fr-FR" dirty="0" smtClean="0"/>
+              <a:t>séquence (27s)</a:t>
+            </a:r>
+            <a:endParaRPr lang="fr-FR" dirty="0"/>
+          </a:p>
+        </p:txBody>
+      </p:sp>
+      <p:sp>
+        <p:nvSpPr>
+          <p:cNvPr id="3" name="Espace réservé du contenu 2"/>
+          <p:cNvSpPr>
+            <a:spLocks noGrp="1"/>
+          </p:cNvSpPr>
+          <p:nvPr>
+            <p:ph idx="1"/>
+          </p:nvPr>
+        </p:nvSpPr>
+        <p:spPr/>
+        <p:txBody>
+          <a:bodyPr/>
+          <a:lstStyle/>
+          <a:p>
+            <a:r>
+              <a:rPr lang="fr-FR" sz="2800" dirty="0" smtClean="0"/>
+              <a:t>Mais avant de commencer l’exploration des types de base en python, j’aimerais introduire </a:t>
+            </a:r>
+            <a:r>
+              <a:rPr lang="fr-FR" sz="2800" dirty="0" smtClean="0"/>
+              <a:t>des notions que nous verrons dans les semaines qui suivent. En effet, notre but et de vous permettre, dès cette semaine, de jouer avec Python. Vous avez donc besoin de connaitre certaines notions nécessaire à l’écriture de petits programmes. Je vais présenter dans cette vidéo et la suivante le minimum dont vous aurez besoin cette semaine, on approfondira ensuite chaque notion dans les semaines suivantes jusqu’à une parfaite maitrise des notions introduites aujourd’hui. </a:t>
+            </a:r>
+            <a:endParaRPr lang="fr-FR" sz="2800" dirty="0" smtClean="0"/>
+          </a:p>
+        </p:txBody>
+      </p:sp>
+      <p:sp>
+        <p:nvSpPr>
+          <p:cNvPr id="4" name="ZoneTexte 3"/>
+          <p:cNvSpPr txBox="1"/>
+          <p:nvPr/>
+        </p:nvSpPr>
+        <p:spPr>
+          <a:xfrm>
+            <a:off x="0" y="92076"/>
+            <a:ext cx="1537855" cy="400110"/>
+          </a:xfrm>
+          <a:prstGeom prst="rect">
+            <a:avLst/>
+          </a:prstGeom>
+          <a:noFill/>
+          <a:ln>
+            <a:solidFill>
+              <a:srgbClr val="FF0000"/>
+            </a:solidFill>
+          </a:ln>
+        </p:spPr>
+        <p:txBody>
+          <a:bodyPr wrap="square" rtlCol="0">
+            <a:spAutoFit/>
+          </a:bodyPr>
+          <a:lstStyle/>
+          <a:p>
+            <a:r>
+              <a:rPr lang="fr-FR" sz="2000" dirty="0" smtClean="0">
+                <a:solidFill>
+                  <a:srgbClr val="FF0000"/>
+                </a:solidFill>
+                <a:latin typeface="Calibri" panose="020F0502020204030204" pitchFamily="34" charset="0"/>
+              </a:rPr>
+              <a:t>prompteur</a:t>
+            </a:r>
+            <a:endParaRPr lang="fr-FR" sz="2000" dirty="0">
+              <a:solidFill>
+                <a:srgbClr val="FF0000"/>
+              </a:solidFill>
+              <a:latin typeface="Calibri" panose="020F0502020204030204" pitchFamily="34" charset="0"/>
+            </a:endParaRPr>
+          </a:p>
+        </p:txBody>
+      </p:sp>
+    </p:spTree>
+    <p:extLst>
+      <p:ext uri="{BB962C8B-B14F-4D97-AF65-F5344CB8AC3E}">
+        <p14:creationId xmlns:p14="http://schemas.microsoft.com/office/powerpoint/2010/main" val="1143164526"/>
+      </p:ext>
+    </p:extLst>
+  </p:cSld>
+  <p:clrMapOvr>
+    <a:masterClrMapping/>
+  </p:clrMapOvr>
+  <p:timing>
+    <p:tnLst>
+      <p:par>
+        <p:cTn id="1" dur="indefinite" restart="never" nodeType="tmRoot"/>
+      </p:par>
+    </p:tnLst>
+  </p:timing>
+</p:sld>
+</file>
+
+<file path=ppt/slides/slide3.xml><?xml version="1.0" encoding="utf-8"?>
+<p:sld xmlns:a="http://schemas.openxmlformats.org/drawingml/2006/main" xmlns:r="http://schemas.openxmlformats.org/officeDocument/2006/relationships" xmlns:p="http://schemas.openxmlformats.org/presentationml/2006/main">
+  <p:cSld>
+    <p:spTree>
+      <p:nvGrpSpPr>
+        <p:cNvPr id="1" name=""/>
+        <p:cNvGrpSpPr/>
+        <p:nvPr/>
+      </p:nvGrpSpPr>
+      <p:grpSpPr>
+        <a:xfrm>
+          <a:off x="0" y="0"/>
+          <a:ext cx="0" cy="0"/>
+          <a:chOff x="0" y="0"/>
+          <a:chExt cx="0" cy="0"/>
+        </a:xfrm>
+      </p:grpSpPr>
+      <p:sp>
+        <p:nvSpPr>
+          <p:cNvPr id="2" name="Titre 1"/>
+          <p:cNvSpPr>
+            <a:spLocks noGrp="1"/>
+          </p:cNvSpPr>
+          <p:nvPr>
+            <p:ph type="title"/>
+          </p:nvPr>
+        </p:nvSpPr>
+        <p:spPr/>
+        <p:txBody>
+          <a:bodyPr/>
+          <a:lstStyle/>
+          <a:p>
+            <a:r>
+              <a:rPr lang="fr-FR" dirty="0" smtClean="0"/>
+              <a:t>Résumé de la </a:t>
+            </a:r>
+            <a:r>
+              <a:rPr lang="fr-FR" dirty="0" smtClean="0"/>
+              <a:t>séquence (20s)</a:t>
+            </a:r>
+            <a:endParaRPr lang="fr-FR" dirty="0"/>
+          </a:p>
+        </p:txBody>
+      </p:sp>
+      <p:sp>
+        <p:nvSpPr>
+          <p:cNvPr id="3" name="Espace réservé du contenu 2"/>
+          <p:cNvSpPr>
+            <a:spLocks noGrp="1"/>
+          </p:cNvSpPr>
+          <p:nvPr>
+            <p:ph idx="1"/>
+          </p:nvPr>
+        </p:nvSpPr>
+        <p:spPr/>
+        <p:txBody>
+          <a:bodyPr/>
+          <a:lstStyle/>
+          <a:p>
+            <a:r>
+              <a:rPr lang="fr-FR" dirty="0" smtClean="0"/>
+              <a:t>Nous allons introduire 3 notions importantes :  on va commencer par introduire la notion d’objet avec les variables et le </a:t>
+            </a:r>
+            <a:r>
+              <a:rPr lang="fr-FR" dirty="0" smtClean="0"/>
+              <a:t>t</a:t>
+            </a:r>
+            <a:r>
+              <a:rPr lang="fr-FR" dirty="0" smtClean="0"/>
+              <a:t>ypage dynamique. Puis nous parlerons des types de bases, et nous finirons avec les techniques de factorisation de code que sont les boucles, les fonctions et les modules</a:t>
+            </a:r>
+          </a:p>
+          <a:p>
+            <a:r>
+              <a:rPr lang="fr-FR" dirty="0" smtClean="0"/>
+              <a:t>À </a:t>
+            </a:r>
+            <a:r>
+              <a:rPr lang="fr-FR" dirty="0" smtClean="0"/>
+              <a:t>la fin de cette vidéo vous connaitrez le minimum pour commencer à jouer avec Python</a:t>
+            </a:r>
+            <a:endParaRPr lang="fr-FR" dirty="0"/>
+          </a:p>
+        </p:txBody>
+      </p:sp>
+      <p:sp>
+        <p:nvSpPr>
+          <p:cNvPr id="4" name="ZoneTexte 3"/>
+          <p:cNvSpPr txBox="1"/>
+          <p:nvPr/>
+        </p:nvSpPr>
+        <p:spPr>
+          <a:xfrm>
+            <a:off x="0" y="92076"/>
+            <a:ext cx="1537855" cy="400110"/>
+          </a:xfrm>
+          <a:prstGeom prst="rect">
+            <a:avLst/>
+          </a:prstGeom>
+          <a:noFill/>
+          <a:ln>
+            <a:solidFill>
+              <a:srgbClr val="FF0000"/>
+            </a:solidFill>
+          </a:ln>
+        </p:spPr>
+        <p:txBody>
+          <a:bodyPr wrap="square" rtlCol="0">
+            <a:spAutoFit/>
+          </a:bodyPr>
+          <a:lstStyle/>
+          <a:p>
+            <a:r>
+              <a:rPr lang="fr-FR" sz="2000" dirty="0" smtClean="0">
+                <a:solidFill>
+                  <a:srgbClr val="FF0000"/>
+                </a:solidFill>
+                <a:latin typeface="Calibri" panose="020F0502020204030204" pitchFamily="34" charset="0"/>
+              </a:rPr>
+              <a:t>prompteur</a:t>
+            </a:r>
+            <a:endParaRPr lang="fr-FR" sz="2000" dirty="0">
+              <a:solidFill>
+                <a:srgbClr val="FF0000"/>
+              </a:solidFill>
+              <a:latin typeface="Calibri" panose="020F0502020204030204" pitchFamily="34" charset="0"/>
+            </a:endParaRPr>
+          </a:p>
+        </p:txBody>
+      </p:sp>
+    </p:spTree>
+    <p:extLst>
+      <p:ext uri="{BB962C8B-B14F-4D97-AF65-F5344CB8AC3E}">
+        <p14:creationId xmlns:p14="http://schemas.microsoft.com/office/powerpoint/2010/main" val="3367709972"/>
+      </p:ext>
+    </p:extLst>
+  </p:cSld>
+  <p:clrMapOvr>
+    <a:masterClrMapping/>
+  </p:clrMapOvr>
+  <p:timing>
+    <p:tnLst>
+      <p:par>
+        <p:cTn id="1" dur="indefinite" restart="never" nodeType="tmRoot"/>
+      </p:par>
+    </p:tnLst>
+  </p:timing>
+</p:sld>
+</file>
+
+<file path=ppt/slides/slide4.xml><?xml version="1.0" encoding="utf-8"?>
+<p:sld xmlns:a="http://schemas.openxmlformats.org/drawingml/2006/main" xmlns:r="http://schemas.openxmlformats.org/officeDocument/2006/relationships" xmlns:p="http://schemas.openxmlformats.org/presentationml/2006/main">
+  <p:cSld>
+    <p:spTree>
+      <p:nvGrpSpPr>
+        <p:cNvPr id="1" name=""/>
+        <p:cNvGrpSpPr/>
+        <p:nvPr/>
+      </p:nvGrpSpPr>
+      <p:grpSpPr>
+        <a:xfrm>
+          <a:off x="0" y="0"/>
+          <a:ext cx="0" cy="0"/>
+          <a:chOff x="0" y="0"/>
+          <a:chExt cx="0" cy="0"/>
+        </a:xfrm>
+      </p:grpSpPr>
+      <p:sp>
+        <p:nvSpPr>
+          <p:cNvPr id="4" name="Titre 3"/>
+          <p:cNvSpPr>
+            <a:spLocks noGrp="1"/>
+          </p:cNvSpPr>
+          <p:nvPr>
+            <p:ph type="ctrTitle"/>
+          </p:nvPr>
+        </p:nvSpPr>
+        <p:spPr/>
+        <p:txBody>
+          <a:bodyPr/>
+          <a:lstStyle/>
+          <a:p>
+            <a:r>
+              <a:rPr lang="fr-FR" dirty="0" smtClean="0"/>
+              <a:t>Total : 1 minute 5 secondes</a:t>
+            </a:r>
+            <a:endParaRPr lang="fr-FR" dirty="0"/>
+          </a:p>
+        </p:txBody>
+      </p:sp>
+      <p:sp>
+        <p:nvSpPr>
+          <p:cNvPr id="5" name="Sous-titre 4"/>
+          <p:cNvSpPr>
+            <a:spLocks noGrp="1"/>
+          </p:cNvSpPr>
+          <p:nvPr>
+            <p:ph type="subTitle" idx="1"/>
+          </p:nvPr>
+        </p:nvSpPr>
+        <p:spPr/>
+        <p:txBody>
+          <a:bodyPr/>
+          <a:lstStyle/>
+          <a:p>
+            <a:endParaRPr lang="fr-FR"/>
+          </a:p>
+        </p:txBody>
+      </p:sp>
+    </p:spTree>
+    <p:extLst>
+      <p:ext uri="{BB962C8B-B14F-4D97-AF65-F5344CB8AC3E}">
+        <p14:creationId xmlns:p14="http://schemas.microsoft.com/office/powerpoint/2010/main" val="708715459"/>
+      </p:ext>
+    </p:extLst>
+  </p:cSld>
+  <p:clrMapOvr>
+    <a:masterClrMapping/>
+  </p:clrMapOvr>
+  <p:timing>
+    <p:tnLst>
+      <p:par>
+        <p:cTn id="1" dur="indefinite" restart="never" nodeType="tmRoot"/>
+      </p:par>
+    </p:tnLst>
+  </p:timing>
+</p:sld>
+</file>
+
+<file path=ppt/slides/slide5.xml><?xml version="1.0" encoding="utf-8"?>
+<p:sld xmlns:a="http://schemas.openxmlformats.org/drawingml/2006/main" xmlns:r="http://schemas.openxmlformats.org/officeDocument/2006/relationships" xmlns:p="http://schemas.openxmlformats.org/presentationml/2006/main">
+  <p:cSld>
+    <p:spTree>
+      <p:nvGrpSpPr>
+        <p:cNvPr id="1" name=""/>
+        <p:cNvGrpSpPr/>
+        <p:nvPr/>
+      </p:nvGrpSpPr>
+      <p:grpSpPr>
+        <a:xfrm>
+          <a:off x="0" y="0"/>
+          <a:ext cx="0" cy="0"/>
+          <a:chOff x="0" y="0"/>
+          <a:chExt cx="0" cy="0"/>
+        </a:xfrm>
+      </p:grpSpPr>
+      <p:sp>
+        <p:nvSpPr>
+          <p:cNvPr id="2" name="Titre 1"/>
+          <p:cNvSpPr>
+            <a:spLocks noGrp="1"/>
+          </p:cNvSpPr>
+          <p:nvPr>
+            <p:ph type="title"/>
+          </p:nvPr>
+        </p:nvSpPr>
+        <p:spPr/>
+        <p:txBody>
+          <a:bodyPr/>
+          <a:lstStyle/>
+          <a:p>
+            <a:r>
+              <a:rPr lang="fr-FR" dirty="0" smtClean="0"/>
+              <a:t>Nouvelle </a:t>
+            </a:r>
+            <a:r>
+              <a:rPr lang="fr-FR" dirty="0" smtClean="0"/>
+              <a:t>séquence</a:t>
+            </a:r>
+            <a:endParaRPr lang="fr-FR" dirty="0"/>
+          </a:p>
+        </p:txBody>
+      </p:sp>
+      <p:sp>
+        <p:nvSpPr>
+          <p:cNvPr id="3" name="Espace réservé du contenu 2"/>
+          <p:cNvSpPr>
+            <a:spLocks noGrp="1"/>
+          </p:cNvSpPr>
+          <p:nvPr>
+            <p:ph idx="1"/>
+          </p:nvPr>
+        </p:nvSpPr>
+        <p:spPr/>
+        <p:txBody>
+          <a:bodyPr/>
+          <a:lstStyle/>
+          <a:p>
+            <a:endParaRPr lang="fr-FR"/>
+          </a:p>
+        </p:txBody>
+      </p:sp>
+    </p:spTree>
+    <p:extLst>
+      <p:ext uri="{BB962C8B-B14F-4D97-AF65-F5344CB8AC3E}">
+        <p14:creationId xmlns:p14="http://schemas.microsoft.com/office/powerpoint/2010/main" val="3107198915"/>
+      </p:ext>
+    </p:extLst>
+  </p:cSld>
+  <p:clrMapOvr>
+    <a:masterClrMapping/>
+  </p:clrMapOvr>
+  <p:timing>
+    <p:tnLst>
+      <p:par>
+        <p:cTn id="1" dur="indefinite" restart="never" nodeType="tmRoot"/>
+      </p:par>
+    </p:tnLst>
+  </p:timing>
+</p:sld>
+</file>
+
+<file path=ppt/slides/slide6.xml><?xml version="1.0" encoding="utf-8"?>
+<p:sld xmlns:a="http://schemas.openxmlformats.org/drawingml/2006/main" xmlns:r="http://schemas.openxmlformats.org/officeDocument/2006/relationships" xmlns:p="http://schemas.openxmlformats.org/presentationml/2006/main">
+  <p:cSld>
+    <p:spTree>
+      <p:nvGrpSpPr>
+        <p:cNvPr id="1" name=""/>
+        <p:cNvGrpSpPr/>
+        <p:nvPr/>
+      </p:nvGrpSpPr>
+      <p:grpSpPr>
+        <a:xfrm>
+          <a:off x="0" y="0"/>
+          <a:ext cx="0" cy="0"/>
+          <a:chOff x="0" y="0"/>
+          <a:chExt cx="0" cy="0"/>
+        </a:xfrm>
+      </p:grpSpPr>
+      <p:sp>
+        <p:nvSpPr>
+          <p:cNvPr id="2" name="Titre 1"/>
+          <p:cNvSpPr>
+            <a:spLocks noGrp="1"/>
+          </p:cNvSpPr>
+          <p:nvPr>
+            <p:ph type="title"/>
+          </p:nvPr>
+        </p:nvSpPr>
+        <p:spPr/>
+        <p:txBody>
+          <a:bodyPr/>
+          <a:lstStyle/>
+          <a:p>
+            <a:r>
+              <a:rPr lang="fr-FR" dirty="0" smtClean="0"/>
+              <a:t>Définition d’un objet(27s)</a:t>
+            </a:r>
+            <a:endParaRPr lang="fr-FR" dirty="0"/>
+          </a:p>
+        </p:txBody>
+      </p:sp>
+      <p:sp>
+        <p:nvSpPr>
+          <p:cNvPr id="3" name="Espace réservé du contenu 2"/>
+          <p:cNvSpPr>
+            <a:spLocks noGrp="1"/>
+          </p:cNvSpPr>
+          <p:nvPr>
+            <p:ph idx="1"/>
+          </p:nvPr>
+        </p:nvSpPr>
+        <p:spPr/>
+        <p:txBody>
+          <a:bodyPr/>
+          <a:lstStyle/>
+          <a:p>
+            <a:r>
+              <a:rPr lang="fr-FR" sz="2800" dirty="0" smtClean="0"/>
+              <a:t>Nous allons voir dans le suite la notion d’objet, de variable et de typage dynamique. </a:t>
+            </a:r>
+          </a:p>
+          <a:p>
+            <a:r>
+              <a:rPr lang="fr-FR" sz="2800" dirty="0" smtClean="0"/>
+              <a:t>Je vais maintenir définir la notion d’</a:t>
+            </a:r>
+            <a:r>
+              <a:rPr lang="fr-FR" sz="2800" dirty="0" smtClean="0"/>
+              <a:t>objet. </a:t>
+            </a:r>
+            <a:r>
+              <a:rPr lang="fr-FR" sz="2800" dirty="0" smtClean="0"/>
+              <a:t>En informatique, un objet est un morceau de programme qui peut stocker de l’information et qui a un ensemble de mécanismes, que l’on appelle méthodes, qui permettent d’effectuer des taches. Le type de l’objet va définir les informations et les méthodes qui existent par défaut à la création de l’objet. Regardons maintenant un exemple de création d’objet…</a:t>
+            </a:r>
+            <a:endParaRPr lang="fr-FR" sz="2800" dirty="0"/>
+          </a:p>
+        </p:txBody>
+      </p:sp>
+      <p:sp>
+        <p:nvSpPr>
+          <p:cNvPr id="4" name="ZoneTexte 3"/>
+          <p:cNvSpPr txBox="1"/>
+          <p:nvPr/>
+        </p:nvSpPr>
+        <p:spPr>
+          <a:xfrm>
+            <a:off x="0" y="92076"/>
+            <a:ext cx="1537855" cy="400110"/>
+          </a:xfrm>
+          <a:prstGeom prst="rect">
+            <a:avLst/>
+          </a:prstGeom>
+          <a:noFill/>
+          <a:ln>
+            <a:solidFill>
+              <a:srgbClr val="FF0000"/>
+            </a:solidFill>
+          </a:ln>
+        </p:spPr>
+        <p:txBody>
+          <a:bodyPr wrap="square" rtlCol="0">
+            <a:spAutoFit/>
+          </a:bodyPr>
+          <a:lstStyle/>
+          <a:p>
+            <a:r>
+              <a:rPr lang="fr-FR" sz="2000" dirty="0" smtClean="0">
+                <a:solidFill>
+                  <a:srgbClr val="FF0000"/>
+                </a:solidFill>
+                <a:latin typeface="Calibri" panose="020F0502020204030204" pitchFamily="34" charset="0"/>
+              </a:rPr>
+              <a:t>prompteur</a:t>
+            </a:r>
+            <a:endParaRPr lang="fr-FR" sz="2000" dirty="0">
+              <a:solidFill>
+                <a:srgbClr val="FF0000"/>
+              </a:solidFill>
+              <a:latin typeface="Calibri" panose="020F0502020204030204" pitchFamily="34" charset="0"/>
+            </a:endParaRPr>
+          </a:p>
+        </p:txBody>
+      </p:sp>
+    </p:spTree>
+    <p:extLst>
+      <p:ext uri="{BB962C8B-B14F-4D97-AF65-F5344CB8AC3E}">
+        <p14:creationId xmlns:p14="http://schemas.microsoft.com/office/powerpoint/2010/main" val="3871509048"/>
+      </p:ext>
+    </p:extLst>
+  </p:cSld>
+  <p:clrMapOvr>
+    <a:masterClrMapping/>
+  </p:clrMapOvr>
+  <p:timing>
+    <p:tnLst>
+      <p:par>
+        <p:cTn id="1" dur="indefinite" restart="never" nodeType="tmRoot"/>
+      </p:par>
+    </p:tnLst>
+  </p:timing>
+</p:sld>
+</file>
+
+<file path=ppt/slides/slide7.xml><?xml version="1.0" encoding="utf-8"?>
+<p:sld xmlns:a="http://schemas.openxmlformats.org/drawingml/2006/main" xmlns:r="http://schemas.openxmlformats.org/officeDocument/2006/relationships" xmlns:p="http://schemas.openxmlformats.org/presentationml/2006/main">
+  <p:cSld>
+    <p:spTree>
+      <p:nvGrpSpPr>
+        <p:cNvPr id="1" name=""/>
+        <p:cNvGrpSpPr/>
+        <p:nvPr/>
+      </p:nvGrpSpPr>
+      <p:grpSpPr>
+        <a:xfrm>
+          <a:off x="0" y="0"/>
+          <a:ext cx="0" cy="0"/>
+          <a:chOff x="0" y="0"/>
+          <a:chExt cx="0" cy="0"/>
+        </a:xfrm>
+      </p:grpSpPr>
+      <p:sp>
+        <p:nvSpPr>
+          <p:cNvPr id="5" name="Rectangle 4"/>
+          <p:cNvSpPr/>
+          <p:nvPr/>
+        </p:nvSpPr>
+        <p:spPr bwMode="auto">
+          <a:xfrm>
+            <a:off x="984738" y="917331"/>
+            <a:ext cx="2510693" cy="2184400"/>
+          </a:xfrm>
+          <a:prstGeom prst="rect">
+            <a:avLst/>
+          </a:prstGeom>
+          <a:noFill/>
+          <a:ln w="38100" cap="flat" cmpd="sng" algn="ctr">
+            <a:solidFill>
+              <a:srgbClr val="FF0000"/>
+            </a:solidFill>
+            <a:prstDash val="solid"/>
+            <a:round/>
+            <a:headEnd type="none" w="med" len="med"/>
+            <a:tailEnd type="none" w="med" len="med"/>
+          </a:ln>
+          <a:effectLst/>
+        </p:spPr>
+        <p:txBody>
+          <a:bodyPr vert="horz" wrap="square" lIns="90000" tIns="46800" rIns="90000" bIns="46800" numCol="1" rtlCol="0" anchor="ctr" anchorCtr="0" compatLnSpc="1">
+            <a:prstTxWarp prst="textNoShape">
+              <a:avLst/>
+            </a:prstTxWarp>
+            <a:spAutoFit/>
+          </a:bodyPr>
+          <a:lstStyle/>
+          <a:p>
+            <a:pPr marL="0" marR="0" indent="0" algn="ctr" defTabSz="914400" rtl="0" eaLnBrk="1" fontAlgn="base" latinLnBrk="0" hangingPunct="1">
+              <a:lnSpc>
+                <a:spcPct val="100000"/>
+              </a:lnSpc>
+              <a:spcBef>
+                <a:spcPct val="50000"/>
+              </a:spcBef>
+              <a:spcAft>
+                <a:spcPct val="0"/>
+              </a:spcAft>
+              <a:buClrTx/>
+              <a:buSzTx/>
+              <a:buFontTx/>
+              <a:buNone/>
+              <a:tabLst/>
+            </a:pPr>
+            <a:endParaRPr kumimoji="0" lang="fr-FR" sz="2400" b="0" i="0" u="none" strike="noStrike" cap="none" normalizeH="0" baseline="0" smtClean="0">
+              <a:ln>
+                <a:noFill/>
+              </a:ln>
+              <a:solidFill>
+                <a:schemeClr val="tx1"/>
+              </a:solidFill>
+              <a:effectLst/>
+              <a:latin typeface="Comic Sans MS" pitchFamily="66" charset="0"/>
+            </a:endParaRPr>
+          </a:p>
+        </p:txBody>
+      </p:sp>
+      <p:sp>
+        <p:nvSpPr>
+          <p:cNvPr id="3" name="ZoneTexte 2"/>
+          <p:cNvSpPr txBox="1"/>
+          <p:nvPr/>
+        </p:nvSpPr>
+        <p:spPr>
+          <a:xfrm>
+            <a:off x="855785" y="4466492"/>
+            <a:ext cx="7514492" cy="830997"/>
+          </a:xfrm>
+          <a:prstGeom prst="rect">
+            <a:avLst/>
+          </a:prstGeom>
+          <a:solidFill>
+            <a:schemeClr val="bg1"/>
+          </a:solidFill>
+        </p:spPr>
+        <p:txBody>
+          <a:bodyPr wrap="square" rtlCol="0">
+            <a:spAutoFit/>
+          </a:bodyPr>
+          <a:lstStyle/>
+          <a:p>
+            <a:r>
+              <a:rPr lang="fr-FR" dirty="0" smtClean="0">
+                <a:latin typeface="Courier New" panose="02070309020205020404" pitchFamily="49" charset="0"/>
+                <a:cs typeface="Courier New" panose="02070309020205020404" pitchFamily="49" charset="0"/>
+              </a:rPr>
+              <a:t>'spam'.</a:t>
+            </a:r>
+            <a:r>
+              <a:rPr lang="fr-FR" dirty="0" err="1" smtClean="0">
+                <a:latin typeface="Courier New" panose="02070309020205020404" pitchFamily="49" charset="0"/>
+                <a:cs typeface="Courier New" panose="02070309020205020404" pitchFamily="49" charset="0"/>
+              </a:rPr>
+              <a:t>upper</a:t>
+            </a:r>
+            <a:r>
+              <a:rPr lang="fr-FR" dirty="0">
+                <a:latin typeface="Courier New" panose="02070309020205020404" pitchFamily="49" charset="0"/>
+                <a:cs typeface="Courier New" panose="02070309020205020404" pitchFamily="49" charset="0"/>
+              </a:rPr>
+              <a:t>()</a:t>
+            </a:r>
+          </a:p>
+          <a:p>
+            <a:endParaRPr lang="fr-FR" dirty="0">
+              <a:latin typeface="Courier New" panose="02070309020205020404" pitchFamily="49" charset="0"/>
+              <a:cs typeface="Courier New" panose="02070309020205020404" pitchFamily="49" charset="0"/>
+            </a:endParaRPr>
+          </a:p>
+        </p:txBody>
+      </p:sp>
+      <p:sp>
+        <p:nvSpPr>
+          <p:cNvPr id="10" name="ZoneTexte 9"/>
+          <p:cNvSpPr txBox="1"/>
+          <p:nvPr/>
+        </p:nvSpPr>
+        <p:spPr>
+          <a:xfrm>
+            <a:off x="984738" y="351550"/>
+            <a:ext cx="5061438" cy="461665"/>
+          </a:xfrm>
+          <a:prstGeom prst="rect">
+            <a:avLst/>
+          </a:prstGeom>
+          <a:noFill/>
+        </p:spPr>
+        <p:txBody>
+          <a:bodyPr wrap="square" rtlCol="0">
+            <a:spAutoFit/>
+          </a:bodyPr>
+          <a:lstStyle/>
+          <a:p>
+            <a:r>
+              <a:rPr lang="fr-FR" dirty="0" smtClean="0">
+                <a:latin typeface="Calibri" panose="020F0502020204030204" pitchFamily="34" charset="0"/>
+              </a:rPr>
+              <a:t>Objet de type chaîne de caractères</a:t>
+            </a:r>
+            <a:endParaRPr lang="fr-FR" dirty="0">
+              <a:latin typeface="Calibri" panose="020F0502020204030204" pitchFamily="34" charset="0"/>
+            </a:endParaRPr>
+          </a:p>
+        </p:txBody>
+      </p:sp>
+      <p:sp>
+        <p:nvSpPr>
+          <p:cNvPr id="13" name="ZoneTexte 12"/>
+          <p:cNvSpPr txBox="1"/>
+          <p:nvPr/>
+        </p:nvSpPr>
+        <p:spPr>
+          <a:xfrm>
+            <a:off x="1069730" y="1080239"/>
+            <a:ext cx="2341684" cy="830997"/>
+          </a:xfrm>
+          <a:prstGeom prst="rect">
+            <a:avLst/>
+          </a:prstGeom>
+          <a:noFill/>
+        </p:spPr>
+        <p:txBody>
+          <a:bodyPr wrap="square" rtlCol="0">
+            <a:spAutoFit/>
+          </a:bodyPr>
+          <a:lstStyle/>
+          <a:p>
+            <a:r>
+              <a:rPr lang="fr-FR" u="sng" dirty="0" smtClean="0">
+                <a:latin typeface="Calibri" panose="020F0502020204030204" pitchFamily="34" charset="0"/>
+              </a:rPr>
+              <a:t>Information:</a:t>
+            </a:r>
+          </a:p>
+          <a:p>
+            <a:r>
+              <a:rPr lang="fr-FR" dirty="0" smtClean="0">
+                <a:latin typeface="Calibri" panose="020F0502020204030204" pitchFamily="34" charset="0"/>
+              </a:rPr>
+              <a:t>'spam'</a:t>
+            </a:r>
+            <a:endParaRPr lang="fr-FR" dirty="0">
+              <a:latin typeface="Calibri" panose="020F0502020204030204" pitchFamily="34" charset="0"/>
+            </a:endParaRPr>
+          </a:p>
+        </p:txBody>
+      </p:sp>
+      <p:sp>
+        <p:nvSpPr>
+          <p:cNvPr id="14" name="ZoneTexte 13"/>
+          <p:cNvSpPr txBox="1"/>
+          <p:nvPr/>
+        </p:nvSpPr>
+        <p:spPr>
+          <a:xfrm>
+            <a:off x="1069242" y="1875119"/>
+            <a:ext cx="2341684" cy="1200329"/>
+          </a:xfrm>
+          <a:prstGeom prst="rect">
+            <a:avLst/>
+          </a:prstGeom>
+          <a:noFill/>
+        </p:spPr>
+        <p:txBody>
+          <a:bodyPr wrap="square" rtlCol="0">
+            <a:spAutoFit/>
+          </a:bodyPr>
+          <a:lstStyle/>
+          <a:p>
+            <a:r>
+              <a:rPr lang="fr-FR" u="sng" dirty="0" smtClean="0">
+                <a:latin typeface="Calibri" panose="020F0502020204030204" pitchFamily="34" charset="0"/>
+              </a:rPr>
+              <a:t>Méthodes</a:t>
+            </a:r>
+            <a:r>
+              <a:rPr lang="fr-FR" dirty="0" smtClean="0">
+                <a:latin typeface="Calibri" panose="020F0502020204030204" pitchFamily="34" charset="0"/>
+              </a:rPr>
+              <a:t>:</a:t>
+            </a:r>
+          </a:p>
+          <a:p>
+            <a:r>
+              <a:rPr lang="fr-FR" dirty="0" smtClean="0">
+                <a:latin typeface="Calibri" panose="020F0502020204030204" pitchFamily="34" charset="0"/>
+              </a:rPr>
+              <a:t>…</a:t>
+            </a:r>
+          </a:p>
+          <a:p>
+            <a:r>
+              <a:rPr lang="fr-FR" dirty="0" err="1" smtClean="0">
+                <a:latin typeface="Calibri" panose="020F0502020204030204" pitchFamily="34" charset="0"/>
+              </a:rPr>
+              <a:t>upper</a:t>
+            </a:r>
+            <a:r>
+              <a:rPr lang="fr-FR" dirty="0" smtClean="0">
+                <a:latin typeface="Calibri" panose="020F0502020204030204" pitchFamily="34" charset="0"/>
+              </a:rPr>
+              <a:t>()</a:t>
+            </a:r>
+            <a:endParaRPr lang="fr-FR" dirty="0">
+              <a:latin typeface="Calibri" panose="020F0502020204030204" pitchFamily="34" charset="0"/>
+            </a:endParaRPr>
+          </a:p>
+        </p:txBody>
+      </p:sp>
+      <p:cxnSp>
+        <p:nvCxnSpPr>
+          <p:cNvPr id="16" name="Connecteur droit avec flèche 15"/>
+          <p:cNvCxnSpPr/>
+          <p:nvPr/>
+        </p:nvCxnSpPr>
+        <p:spPr bwMode="auto">
+          <a:xfrm flipH="1">
+            <a:off x="2145323" y="4214445"/>
+            <a:ext cx="386862" cy="504093"/>
+          </a:xfrm>
+          <a:prstGeom prst="straightConnector1">
+            <a:avLst/>
+          </a:prstGeom>
+          <a:noFill/>
+          <a:ln w="53975" cap="flat" cmpd="sng" algn="ctr">
+            <a:solidFill>
+              <a:srgbClr val="FF0000"/>
+            </a:solidFill>
+            <a:prstDash val="solid"/>
+            <a:round/>
+            <a:headEnd type="none" w="med" len="med"/>
+            <a:tailEnd type="triangle" w="med" len="med"/>
+          </a:ln>
+          <a:effectLst/>
+        </p:spPr>
+      </p:cxnSp>
+      <p:sp>
+        <p:nvSpPr>
+          <p:cNvPr id="17" name="ZoneTexte 16"/>
+          <p:cNvSpPr txBox="1"/>
+          <p:nvPr/>
+        </p:nvSpPr>
+        <p:spPr>
+          <a:xfrm>
+            <a:off x="855785" y="4466491"/>
+            <a:ext cx="7514492" cy="830997"/>
+          </a:xfrm>
+          <a:prstGeom prst="rect">
+            <a:avLst/>
+          </a:prstGeom>
+          <a:noFill/>
+        </p:spPr>
+        <p:txBody>
+          <a:bodyPr wrap="square" rtlCol="0">
+            <a:spAutoFit/>
+          </a:bodyPr>
+          <a:lstStyle/>
+          <a:p>
+            <a:r>
+              <a:rPr lang="fr-FR" dirty="0" smtClean="0">
+                <a:latin typeface="Courier New" panose="02070309020205020404" pitchFamily="49" charset="0"/>
+                <a:cs typeface="Courier New" panose="02070309020205020404" pitchFamily="49" charset="0"/>
+              </a:rPr>
+              <a:t>'spam'</a:t>
+            </a:r>
+            <a:endParaRPr lang="fr-FR" dirty="0">
+              <a:latin typeface="Courier New" panose="02070309020205020404" pitchFamily="49" charset="0"/>
+              <a:cs typeface="Courier New" panose="02070309020205020404" pitchFamily="49" charset="0"/>
+            </a:endParaRPr>
+          </a:p>
+          <a:p>
+            <a:endParaRPr lang="fr-FR" dirty="0">
+              <a:latin typeface="Courier New" panose="02070309020205020404" pitchFamily="49" charset="0"/>
+              <a:cs typeface="Courier New" panose="02070309020205020404" pitchFamily="49" charset="0"/>
+            </a:endParaRPr>
+          </a:p>
+        </p:txBody>
+      </p:sp>
+      <p:sp>
+        <p:nvSpPr>
+          <p:cNvPr id="18" name="ZoneTexte 17"/>
+          <p:cNvSpPr txBox="1"/>
+          <p:nvPr/>
+        </p:nvSpPr>
+        <p:spPr>
+          <a:xfrm>
+            <a:off x="855785" y="5000255"/>
+            <a:ext cx="7514492" cy="830997"/>
+          </a:xfrm>
+          <a:prstGeom prst="rect">
+            <a:avLst/>
+          </a:prstGeom>
+          <a:noFill/>
+        </p:spPr>
+        <p:txBody>
+          <a:bodyPr wrap="square" rtlCol="0">
+            <a:spAutoFit/>
+          </a:bodyPr>
+          <a:lstStyle/>
+          <a:p>
+            <a:r>
+              <a:rPr lang="fr-FR" dirty="0" smtClean="0">
+                <a:latin typeface="Courier New" panose="02070309020205020404" pitchFamily="49" charset="0"/>
+                <a:cs typeface="Courier New" panose="02070309020205020404" pitchFamily="49" charset="0"/>
+              </a:rPr>
+              <a:t>'SPAM'</a:t>
+            </a:r>
+            <a:endParaRPr lang="fr-FR" dirty="0">
+              <a:latin typeface="Courier New" panose="02070309020205020404" pitchFamily="49" charset="0"/>
+              <a:cs typeface="Courier New" panose="02070309020205020404" pitchFamily="49" charset="0"/>
+            </a:endParaRPr>
+          </a:p>
+          <a:p>
+            <a:endParaRPr lang="fr-FR" dirty="0">
+              <a:latin typeface="Courier New" panose="02070309020205020404" pitchFamily="49" charset="0"/>
+              <a:cs typeface="Courier New" panose="02070309020205020404" pitchFamily="49" charset="0"/>
+            </a:endParaRPr>
+          </a:p>
+        </p:txBody>
+      </p:sp>
+    </p:spTree>
+    <p:extLst>
+      <p:ext uri="{BB962C8B-B14F-4D97-AF65-F5344CB8AC3E}">
+        <p14:creationId xmlns:p14="http://schemas.microsoft.com/office/powerpoint/2010/main" val="3072409533"/>
+      </p:ext>
+    </p:extLst>
+  </p:cSld>
+  <p:clrMapOvr>
+    <a:masterClrMapping/>
+  </p:clrMapOvr>
+  <p:timing>
+    <p:tnLst>
+      <p:par>
+        <p:cTn id="1" dur="indefinite" restart="never" nodeType="tmRoot">
+          <p:childTnLst>
+            <p:seq concurrent="1" nextAc="seek">
+              <p:cTn id="2" dur="indefinite" nodeType="mainSeq">
+                <p:childTnLst>
+                  <p:par>
+                    <p:cTn id="3" fill="hold">
+                      <p:stCondLst>
+                        <p:cond delay="indefinite"/>
+                      </p:stCondLst>
+                      <p:childTnLst>
+                        <p:par>
+                          <p:cTn id="4" fill="hold">
+                            <p:stCondLst>
+                              <p:cond delay="0"/>
+                            </p:stCondLst>
+                            <p:childTnLst>
+                              <p:par>
+                                <p:cTn id="5" presetID="10" presetClass="entr" presetSubtype="0" fill="hold" grpId="0" nodeType="clickEffect">
+                                  <p:stCondLst>
+                                    <p:cond delay="0"/>
+                                  </p:stCondLst>
+                                  <p:childTnLst>
+                                    <p:set>
+                                      <p:cBhvr>
+                                        <p:cTn id="6" dur="1" fill="hold">
+                                          <p:stCondLst>
+                                            <p:cond delay="0"/>
+                                          </p:stCondLst>
+                                        </p:cTn>
+                                        <p:tgtEl>
+                                          <p:spTgt spid="17"/>
+                                        </p:tgtEl>
+                                        <p:attrNameLst>
+                                          <p:attrName>style.visibility</p:attrName>
+                                        </p:attrNameLst>
+                                      </p:cBhvr>
+                                      <p:to>
+                                        <p:strVal val="visible"/>
+                                      </p:to>
+                                    </p:set>
+                                    <p:animEffect transition="in" filter="fade">
+                                      <p:cBhvr>
+                                        <p:cTn id="7" dur="500"/>
+                                        <p:tgtEl>
+                                          <p:spTgt spid="17"/>
+                                        </p:tgtEl>
+                                      </p:cBhvr>
+                                    </p:animEffect>
+                                  </p:childTnLst>
+                                </p:cTn>
+                              </p:par>
+                            </p:childTnLst>
+                          </p:cTn>
+                        </p:par>
+                      </p:childTnLst>
+                    </p:cTn>
+                  </p:par>
+                  <p:par>
+                    <p:cTn id="8" fill="hold">
+                      <p:stCondLst>
+                        <p:cond delay="indefinite"/>
+                      </p:stCondLst>
+                      <p:childTnLst>
+                        <p:par>
+                          <p:cTn id="9" fill="hold">
+                            <p:stCondLst>
+                              <p:cond delay="0"/>
+                            </p:stCondLst>
+                            <p:childTnLst>
+                              <p:par>
+                                <p:cTn id="10" presetID="10" presetClass="entr" presetSubtype="0" fill="hold" grpId="0" nodeType="clickEffect">
+                                  <p:stCondLst>
+                                    <p:cond delay="0"/>
+                                  </p:stCondLst>
+                                  <p:childTnLst>
+                                    <p:set>
+                                      <p:cBhvr>
+                                        <p:cTn id="11" dur="1" fill="hold">
+                                          <p:stCondLst>
+                                            <p:cond delay="0"/>
+                                          </p:stCondLst>
+                                        </p:cTn>
+                                        <p:tgtEl>
+                                          <p:spTgt spid="5"/>
+                                        </p:tgtEl>
+                                        <p:attrNameLst>
+                                          <p:attrName>style.visibility</p:attrName>
+                                        </p:attrNameLst>
+                                      </p:cBhvr>
+                                      <p:to>
+                                        <p:strVal val="visible"/>
+                                      </p:to>
+                                    </p:set>
+                                    <p:animEffect transition="in" filter="fade">
+                                      <p:cBhvr>
+                                        <p:cTn id="12" dur="500"/>
+                                        <p:tgtEl>
+                                          <p:spTgt spid="5"/>
+                                        </p:tgtEl>
+                                      </p:cBhvr>
+                                    </p:animEffect>
+                                  </p:childTnLst>
+                                </p:cTn>
+                              </p:par>
+                              <p:par>
+                                <p:cTn id="13" presetID="10" presetClass="entr" presetSubtype="0" fill="hold" grpId="0" nodeType="withEffect">
+                                  <p:stCondLst>
+                                    <p:cond delay="0"/>
+                                  </p:stCondLst>
+                                  <p:childTnLst>
+                                    <p:set>
+                                      <p:cBhvr>
+                                        <p:cTn id="14" dur="1" fill="hold">
+                                          <p:stCondLst>
+                                            <p:cond delay="0"/>
+                                          </p:stCondLst>
+                                        </p:cTn>
+                                        <p:tgtEl>
+                                          <p:spTgt spid="10"/>
+                                        </p:tgtEl>
+                                        <p:attrNameLst>
+                                          <p:attrName>style.visibility</p:attrName>
+                                        </p:attrNameLst>
+                                      </p:cBhvr>
+                                      <p:to>
+                                        <p:strVal val="visible"/>
+                                      </p:to>
+                                    </p:set>
+                                    <p:animEffect transition="in" filter="fade">
+                                      <p:cBhvr>
+                                        <p:cTn id="15" dur="500"/>
+                                        <p:tgtEl>
+                                          <p:spTgt spid="10"/>
+                                        </p:tgtEl>
+                                      </p:cBhvr>
+                                    </p:animEffect>
+                                  </p:childTnLst>
+                                </p:cTn>
+                              </p:par>
+                              <p:par>
+                                <p:cTn id="16" presetID="10" presetClass="entr" presetSubtype="0" fill="hold" grpId="0" nodeType="withEffect">
+                                  <p:stCondLst>
+                                    <p:cond delay="0"/>
+                                  </p:stCondLst>
+                                  <p:childTnLst>
+                                    <p:set>
+                                      <p:cBhvr>
+                                        <p:cTn id="17" dur="1" fill="hold">
+                                          <p:stCondLst>
+                                            <p:cond delay="0"/>
+                                          </p:stCondLst>
+                                        </p:cTn>
+                                        <p:tgtEl>
+                                          <p:spTgt spid="13"/>
+                                        </p:tgtEl>
+                                        <p:attrNameLst>
+                                          <p:attrName>style.visibility</p:attrName>
+                                        </p:attrNameLst>
+                                      </p:cBhvr>
+                                      <p:to>
+                                        <p:strVal val="visible"/>
+                                      </p:to>
+                                    </p:set>
+                                    <p:animEffect transition="in" filter="fade">
+                                      <p:cBhvr>
+                                        <p:cTn id="18" dur="500"/>
+                                        <p:tgtEl>
+                                          <p:spTgt spid="13"/>
+                                        </p:tgtEl>
+                                      </p:cBhvr>
+                                    </p:animEffect>
+                                  </p:childTnLst>
+                                </p:cTn>
+                              </p:par>
+                              <p:par>
+                                <p:cTn id="19" presetID="10" presetClass="entr" presetSubtype="0" fill="hold" grpId="0" nodeType="withEffect">
+                                  <p:stCondLst>
+                                    <p:cond delay="0"/>
+                                  </p:stCondLst>
+                                  <p:childTnLst>
+                                    <p:set>
+                                      <p:cBhvr>
+                                        <p:cTn id="20" dur="1" fill="hold">
+                                          <p:stCondLst>
+                                            <p:cond delay="0"/>
+                                          </p:stCondLst>
+                                        </p:cTn>
+                                        <p:tgtEl>
+                                          <p:spTgt spid="14"/>
+                                        </p:tgtEl>
+                                        <p:attrNameLst>
+                                          <p:attrName>style.visibility</p:attrName>
+                                        </p:attrNameLst>
+                                      </p:cBhvr>
+                                      <p:to>
+                                        <p:strVal val="visible"/>
+                                      </p:to>
+                                    </p:set>
+                                    <p:animEffect transition="in" filter="fade">
+                                      <p:cBhvr>
+                                        <p:cTn id="21" dur="500"/>
+                                        <p:tgtEl>
+                                          <p:spTgt spid="14"/>
+                                        </p:tgtEl>
+                                      </p:cBhvr>
+                                    </p:animEffect>
+                                  </p:childTnLst>
+                                </p:cTn>
+                              </p:par>
+                            </p:childTnLst>
+                          </p:cTn>
+                        </p:par>
+                      </p:childTnLst>
+                    </p:cTn>
+                  </p:par>
+                  <p:par>
+                    <p:cTn id="22" fill="hold">
+                      <p:stCondLst>
+                        <p:cond delay="indefinite"/>
+                      </p:stCondLst>
+                      <p:childTnLst>
+                        <p:par>
+                          <p:cTn id="23" fill="hold">
+                            <p:stCondLst>
+                              <p:cond delay="0"/>
+                            </p:stCondLst>
+                            <p:childTnLst>
+                              <p:par>
+                                <p:cTn id="24" presetID="10" presetClass="entr" presetSubtype="0" fill="hold" nodeType="clickEffect">
+                                  <p:stCondLst>
+                                    <p:cond delay="0"/>
+                                  </p:stCondLst>
+                                  <p:childTnLst>
+                                    <p:set>
+                                      <p:cBhvr>
+                                        <p:cTn id="25" dur="1" fill="hold">
+                                          <p:stCondLst>
+                                            <p:cond delay="0"/>
+                                          </p:stCondLst>
+                                        </p:cTn>
+                                        <p:tgtEl>
+                                          <p:spTgt spid="3">
+                                            <p:txEl>
+                                              <p:pRg st="0" end="0"/>
+                                            </p:txEl>
+                                          </p:spTgt>
+                                        </p:tgtEl>
+                                        <p:attrNameLst>
+                                          <p:attrName>style.visibility</p:attrName>
+                                        </p:attrNameLst>
+                                      </p:cBhvr>
+                                      <p:to>
+                                        <p:strVal val="visible"/>
+                                      </p:to>
+                                    </p:set>
+                                    <p:animEffect transition="in" filter="fade">
+                                      <p:cBhvr>
+                                        <p:cTn id="26" dur="500"/>
+                                        <p:tgtEl>
+                                          <p:spTgt spid="3">
+                                            <p:txEl>
+                                              <p:pRg st="0" end="0"/>
+                                            </p:txEl>
+                                          </p:spTgt>
+                                        </p:tgtEl>
+                                      </p:cBhvr>
+                                    </p:animEffect>
+                                  </p:childTnLst>
+                                </p:cTn>
+                              </p:par>
+                            </p:childTnLst>
+                          </p:cTn>
+                        </p:par>
+                      </p:childTnLst>
+                    </p:cTn>
+                  </p:par>
+                  <p:par>
+                    <p:cTn id="27" fill="hold">
+                      <p:stCondLst>
+                        <p:cond delay="indefinite"/>
+                      </p:stCondLst>
+                      <p:childTnLst>
+                        <p:par>
+                          <p:cTn id="28" fill="hold">
+                            <p:stCondLst>
+                              <p:cond delay="0"/>
+                            </p:stCondLst>
+                            <p:childTnLst>
+                              <p:par>
+                                <p:cTn id="29" presetID="10" presetClass="entr" presetSubtype="0" fill="hold" nodeType="clickEffect">
+                                  <p:stCondLst>
+                                    <p:cond delay="0"/>
+                                  </p:stCondLst>
+                                  <p:childTnLst>
+                                    <p:set>
+                                      <p:cBhvr>
+                                        <p:cTn id="30" dur="1" fill="hold">
+                                          <p:stCondLst>
+                                            <p:cond delay="0"/>
+                                          </p:stCondLst>
+                                        </p:cTn>
+                                        <p:tgtEl>
+                                          <p:spTgt spid="16"/>
+                                        </p:tgtEl>
+                                        <p:attrNameLst>
+                                          <p:attrName>style.visibility</p:attrName>
+                                        </p:attrNameLst>
+                                      </p:cBhvr>
+                                      <p:to>
+                                        <p:strVal val="visible"/>
+                                      </p:to>
+                                    </p:set>
+                                    <p:animEffect transition="in" filter="fade">
+                                      <p:cBhvr>
+                                        <p:cTn id="31" dur="500"/>
+                                        <p:tgtEl>
+                                          <p:spTgt spid="16"/>
+                                        </p:tgtEl>
+                                      </p:cBhvr>
+                                    </p:animEffect>
+                                  </p:childTnLst>
+                                </p:cTn>
+                              </p:par>
+                            </p:childTnLst>
+                          </p:cTn>
+                        </p:par>
+                      </p:childTnLst>
+                    </p:cTn>
+                  </p:par>
+                  <p:par>
+                    <p:cTn id="32" fill="hold">
+                      <p:stCondLst>
+                        <p:cond delay="indefinite"/>
+                      </p:stCondLst>
+                      <p:childTnLst>
+                        <p:par>
+                          <p:cTn id="33" fill="hold">
+                            <p:stCondLst>
+                              <p:cond delay="0"/>
+                            </p:stCondLst>
+                            <p:childTnLst>
+                              <p:par>
+                                <p:cTn id="34" presetID="10" presetClass="entr" presetSubtype="0" fill="hold" grpId="0" nodeType="clickEffect">
+                                  <p:stCondLst>
+                                    <p:cond delay="0"/>
+                                  </p:stCondLst>
+                                  <p:childTnLst>
+                                    <p:set>
+                                      <p:cBhvr>
+                                        <p:cTn id="35" dur="1" fill="hold">
+                                          <p:stCondLst>
+                                            <p:cond delay="0"/>
+                                          </p:stCondLst>
+                                        </p:cTn>
+                                        <p:tgtEl>
+                                          <p:spTgt spid="18"/>
+                                        </p:tgtEl>
+                                        <p:attrNameLst>
+                                          <p:attrName>style.visibility</p:attrName>
+                                        </p:attrNameLst>
+                                      </p:cBhvr>
+                                      <p:to>
+                                        <p:strVal val="visible"/>
+                                      </p:to>
+                                    </p:set>
+                                    <p:animEffect transition="in" filter="fade">
+                                      <p:cBhvr>
+                                        <p:cTn id="36" dur="500"/>
+                                        <p:tgtEl>
+                                          <p:spTgt spid="18"/>
+                                        </p:tgtEl>
+                                      </p:cBhvr>
+                                    </p:animEffect>
+                                  </p:childTnLst>
+                                </p:cTn>
+                              </p:par>
+                            </p:childTnLst>
+                          </p:cTn>
+                        </p:par>
+                      </p:childTnLst>
+                    </p:cTn>
+                  </p:par>
+                </p:childTnLst>
+              </p:cTn>
+              <p:prevCondLst>
+                <p:cond evt="onPrev" delay="0">
+                  <p:tgtEl>
+                    <p:sldTgt/>
+                  </p:tgtEl>
+                </p:cond>
+              </p:prevCondLst>
+              <p:nextCondLst>
+                <p:cond evt="onNext" delay="0">
+                  <p:tgtEl>
+                    <p:sldTgt/>
+                  </p:tgtEl>
+                </p:cond>
+              </p:nextCondLst>
+            </p:seq>
+          </p:childTnLst>
+        </p:cTn>
+      </p:par>
+    </p:tnLst>
+    <p:bldLst>
+      <p:bldP spid="5" grpId="0" animBg="1"/>
+      <p:bldP spid="10" grpId="0"/>
+      <p:bldP spid="13" grpId="0"/>
+      <p:bldP spid="14" grpId="0"/>
+      <p:bldP spid="17" grpId="0"/>
+      <p:bldP spid="18" grpId="0"/>
     </p:bldLst>
   </p:timing>
 </p:sld>
@@ -6286,19 +8420,12 @@
           <a:lstStyle/>
           <a:p>
             <a:r>
-              <a:rPr lang="fr-FR" dirty="0"/>
-              <a:t>Nouvelle séquence</a:t>
-            </a:r>
-            <a:br>
-              <a:rPr lang="fr-FR" dirty="0"/>
-            </a:br>
-            <a:r>
-              <a:rPr lang="fr-FR" dirty="0"/>
-              <a:t>(après les exercices</a:t>
-            </a:r>
-            <a:r>
               <a:rPr lang="fr-FR" dirty="0" smtClean="0"/>
-              <a:t>)</a:t>
+              <a:t>En Python, tout est un </a:t>
+            </a:r>
+            <a:r>
+              <a:rPr lang="fr-FR" dirty="0" smtClean="0"/>
+              <a:t>objet (30s)</a:t>
             </a:r>
             <a:endParaRPr lang="fr-FR" dirty="0"/>
           </a:p>
@@ -6319,14 +8446,118 @@
           <a:bodyPr/>
           <a:lstStyle/>
           <a:p>
-            <a:endParaRPr lang="fr-FR" dirty="0"/>
+            <a:r>
+              <a:rPr lang="fr-FR" sz="2800" dirty="0" smtClean="0"/>
+              <a:t>En python tout est un objet, ce qui </a:t>
+            </a:r>
+            <a:r>
+              <a:rPr lang="fr-FR" sz="2800" dirty="0" smtClean="0"/>
+              <a:t>simplifie et réduit considérablement le temps de développement de programmes</a:t>
+            </a:r>
+            <a:endParaRPr lang="fr-FR" sz="2800" dirty="0" smtClean="0"/>
+          </a:p>
+          <a:p>
+            <a:r>
+              <a:rPr lang="fr-FR" sz="2800" dirty="0" smtClean="0"/>
+              <a:t>On accède à tous les objets par leur référence en </a:t>
+            </a:r>
+            <a:r>
+              <a:rPr lang="fr-FR" sz="2800" dirty="0" smtClean="0"/>
+              <a:t>mémoire, mais </a:t>
+            </a:r>
+            <a:r>
+              <a:rPr lang="fr-FR" sz="2800" dirty="0" smtClean="0"/>
+              <a:t>on ne manipule jamais directement </a:t>
+            </a:r>
+            <a:r>
+              <a:rPr lang="fr-FR" sz="2800" dirty="0" smtClean="0"/>
+              <a:t>ces références. On </a:t>
+            </a:r>
+            <a:r>
+              <a:rPr lang="fr-FR" sz="2800" dirty="0" smtClean="0"/>
+              <a:t>utilise </a:t>
+            </a:r>
+            <a:r>
+              <a:rPr lang="fr-FR" sz="2800" dirty="0" smtClean="0"/>
+              <a:t>à la place </a:t>
+            </a:r>
+            <a:r>
+              <a:rPr lang="fr-FR" sz="2800" dirty="0" smtClean="0"/>
+              <a:t>l’affectation à une </a:t>
+            </a:r>
+            <a:r>
+              <a:rPr lang="fr-FR" sz="2800" dirty="0" smtClean="0"/>
+              <a:t>variable, c’est-à-dire que l’on utilise le signe égal pour affecter un objet à une variable, par exemple a=1 signifie que l’on affecte l’objet entier 1 à </a:t>
+            </a:r>
+            <a:r>
+              <a:rPr lang="fr-FR" sz="2800" dirty="0" smtClean="0"/>
+              <a:t>la variable a.</a:t>
+            </a:r>
+            <a:r>
+              <a:rPr lang="fr-FR" sz="2800" dirty="0" smtClean="0"/>
+              <a:t> Regardons maintenant plus en </a:t>
+            </a:r>
+            <a:r>
+              <a:rPr lang="fr-FR" sz="2800" dirty="0" smtClean="0"/>
+              <a:t>détail </a:t>
+            </a:r>
+            <a:r>
+              <a:rPr lang="fr-FR" sz="2800" dirty="0" smtClean="0"/>
+              <a:t>cette notion de variable…</a:t>
+            </a:r>
+            <a:endParaRPr lang="fr-FR" sz="2800" dirty="0"/>
+          </a:p>
+        </p:txBody>
+      </p:sp>
+      <p:sp>
+        <p:nvSpPr>
+          <p:cNvPr id="4" name="ZoneTexte 3"/>
+          <p:cNvSpPr txBox="1"/>
+          <p:nvPr/>
+        </p:nvSpPr>
+        <p:spPr>
+          <a:xfrm>
+            <a:off x="0" y="92076"/>
+            <a:ext cx="1537855" cy="400110"/>
+          </a:xfrm>
+          <a:prstGeom prst="rect">
+            <a:avLst/>
+          </a:prstGeom>
+          <a:noFill/>
+          <a:ln>
+            <a:solidFill>
+              <a:srgbClr val="FF0000"/>
+            </a:solidFill>
+          </a:ln>
+        </p:spPr>
+        <p:txBody>
+          <a:bodyPr wrap="square" rtlCol="0">
+            <a:spAutoFit/>
+          </a:bodyPr>
+          <a:lstStyle/>
+          <a:p>
+            <a:r>
+              <a:rPr lang="fr-FR" sz="2000" dirty="0" smtClean="0">
+                <a:solidFill>
+                  <a:srgbClr val="FF0000"/>
+                </a:solidFill>
+                <a:latin typeface="Calibri" panose="020F0502020204030204" pitchFamily="34" charset="0"/>
+              </a:rPr>
+              <a:t>prompteur</a:t>
+            </a:r>
+            <a:endParaRPr lang="fr-FR" sz="2000" dirty="0">
+              <a:solidFill>
+                <a:srgbClr val="FF0000"/>
+              </a:solidFill>
+              <a:latin typeface="Calibri" panose="020F0502020204030204" pitchFamily="34" charset="0"/>
+            </a:endParaRPr>
           </a:p>
         </p:txBody>
       </p:sp>
     </p:spTree>
     <p:extLst>
       <p:ext uri="{BB962C8B-B14F-4D97-AF65-F5344CB8AC3E}">
-        <p14:creationId xmlns:p14="http://schemas.microsoft.com/office/powerpoint/2010/main" val="815549015"/>
+        <p14:creationId xmlns:p14="http://schemas.microsoft.com/office/powerpoint/2010/main" val="567329468"/>
       </p:ext>
     </p:extLst>
   </p:cSld>
@@ -6376,8 +8607,12 @@
           <a:lstStyle/>
           <a:p>
             <a:r>
-              <a:rPr lang="fr-FR" dirty="0"/>
-              <a:t>Résumé de la séance</a:t>
+              <a:rPr lang="fr-FR" dirty="0" smtClean="0"/>
+              <a:t>Notion de </a:t>
+            </a:r>
+            <a:r>
+              <a:rPr lang="fr-FR" dirty="0" smtClean="0"/>
+              <a:t>variables (50s)</a:t>
             </a:r>
             <a:endParaRPr lang="fr-FR" dirty="0"/>
           </a:p>
@@ -6393,20 +8628,129 @@
             <p:ph idx="1"/>
           </p:nvPr>
         </p:nvSpPr>
-        <p:spPr/>
+        <p:spPr>
+          <a:xfrm>
+            <a:off x="457200" y="1600200"/>
+            <a:ext cx="8686800" cy="4525963"/>
+          </a:xfrm>
+        </p:spPr>
         <p:txBody>
           <a:bodyPr/>
           <a:lstStyle/>
           <a:p>
             <a:r>
-              <a:rPr lang="fr-FR" dirty="0" smtClean="0"/>
-              <a:t>On vient de voir beaucoup de nouvelles notions, n’hésitez pas visionner plusieurs fois cette vid</a:t>
-            </a:r>
-            <a:r>
-              <a:rPr lang="fr-FR" dirty="0" smtClean="0"/>
-              <a:t>éo et à faire les exercices</a:t>
-            </a:r>
-            <a:endParaRPr lang="fr-FR" dirty="0"/>
+              <a:rPr lang="fr-FR" sz="2400" dirty="0" smtClean="0"/>
+              <a:t>Une variable est un nom que l’on donne à un objet pour le retrouver en mémoire</a:t>
+            </a:r>
+          </a:p>
+          <a:p>
+            <a:pPr lvl="1"/>
+            <a:r>
+              <a:rPr lang="fr-FR" sz="2000" dirty="0"/>
+              <a:t>Il y a </a:t>
+            </a:r>
+            <a:r>
+              <a:rPr lang="fr-FR" sz="2000" dirty="0" smtClean="0"/>
+              <a:t>trois règles </a:t>
+            </a:r>
+            <a:r>
+              <a:rPr lang="fr-FR" sz="2000" dirty="0"/>
+              <a:t>importantes pour le nom d’une </a:t>
+            </a:r>
+            <a:r>
+              <a:rPr lang="fr-FR" sz="2000" dirty="0" smtClean="0"/>
+              <a:t>variable en Python</a:t>
+            </a:r>
+            <a:endParaRPr lang="fr-FR" sz="2000" dirty="0"/>
+          </a:p>
+          <a:p>
+            <a:pPr lvl="2"/>
+            <a:r>
+              <a:rPr lang="fr-FR" sz="1800" dirty="0" smtClean="0"/>
+              <a:t>Une variable peut être </a:t>
+            </a:r>
+            <a:r>
+              <a:rPr lang="fr-FR" sz="1800" dirty="0" smtClean="0"/>
+              <a:t>composée </a:t>
+            </a:r>
+            <a:r>
+              <a:rPr lang="fr-FR" sz="1800" dirty="0"/>
+              <a:t>de tirets bas </a:t>
+            </a:r>
+            <a:r>
+              <a:rPr lang="fr-FR" sz="1800" dirty="0" smtClean="0"/>
+              <a:t>et d’une </a:t>
+            </a:r>
+            <a:r>
+              <a:rPr lang="fr-FR" sz="1800" dirty="0" smtClean="0"/>
+              <a:t>suite quelconque de caractères </a:t>
+            </a:r>
+            <a:r>
+              <a:rPr lang="fr-FR" sz="1800" dirty="0" smtClean="0"/>
+              <a:t>alphanumériques, c’est-à-dire les lettres de l’alphabet en minuscule, en majuscule et les chiffres de 0 à 9</a:t>
+            </a:r>
+          </a:p>
+          <a:p>
+            <a:pPr lvl="2"/>
+            <a:r>
+              <a:rPr lang="fr-FR" sz="1800" dirty="0" smtClean="0"/>
+              <a:t>Une </a:t>
+            </a:r>
+            <a:r>
+              <a:rPr lang="fr-FR" sz="1800" dirty="0"/>
+              <a:t>variable commence soit par une lettre soit pas un tiret bas, mais jamais par un chiffre </a:t>
+            </a:r>
+          </a:p>
+          <a:p>
+            <a:pPr lvl="2"/>
+            <a:r>
+              <a:rPr lang="fr-FR" sz="1800" dirty="0" smtClean="0"/>
+              <a:t>Les majuscules et minuscules sont prises en </a:t>
+            </a:r>
+            <a:r>
+              <a:rPr lang="fr-FR" sz="1800" dirty="0" smtClean="0"/>
+              <a:t>compte, donc </a:t>
+            </a:r>
+            <a:r>
+              <a:rPr lang="fr-FR" sz="1800" dirty="0" err="1"/>
+              <a:t>Ma_variable</a:t>
+            </a:r>
+            <a:r>
+              <a:rPr lang="fr-FR" sz="1800" dirty="0"/>
+              <a:t> est différent de </a:t>
+            </a:r>
+            <a:r>
+              <a:rPr lang="fr-FR" sz="1800" dirty="0" err="1" smtClean="0"/>
+              <a:t>ma_variable</a:t>
+            </a:r>
+            <a:endParaRPr lang="fr-FR" sz="1800" dirty="0" smtClean="0"/>
+          </a:p>
+          <a:p>
+            <a:r>
+              <a:rPr lang="fr-FR" sz="2400" dirty="0" smtClean="0"/>
+              <a:t>Il est recommandé d’utiliser des noms explicites de variable, de tout écrire en minuscule, et de séparer les mots par des tirets bas. Par exemple, </a:t>
+            </a:r>
+            <a:r>
+              <a:rPr lang="fr-FR" sz="2400" dirty="0" err="1" smtClean="0"/>
+              <a:t>moyenne_age_francais</a:t>
+            </a:r>
+            <a:r>
+              <a:rPr lang="fr-FR" sz="2400" dirty="0" smtClean="0"/>
+              <a:t> est un bon nom de variable, meilleur de </a:t>
+            </a:r>
+            <a:r>
+              <a:rPr lang="fr-FR" sz="2400" dirty="0" err="1" smtClean="0"/>
+              <a:t>moy</a:t>
+            </a:r>
+            <a:r>
+              <a:rPr lang="fr-FR" sz="2400" dirty="0" err="1" smtClean="0"/>
+              <a:t>_age_f</a:t>
+            </a:r>
+            <a:r>
+              <a:rPr lang="fr-FR" sz="2400" dirty="0" smtClean="0"/>
+              <a:t> et bien meilleur que simplement x</a:t>
+            </a:r>
+            <a:endParaRPr lang="fr-FR" sz="2400" dirty="0" smtClean="0"/>
           </a:p>
         </p:txBody>
       </p:sp>
@@ -6458,7 +8802,7 @@
     </p:spTree>
     <p:extLst>
       <p:ext uri="{BB962C8B-B14F-4D97-AF65-F5344CB8AC3E}">
-        <p14:creationId xmlns:p14="http://schemas.microsoft.com/office/powerpoint/2010/main" val="1415606349"/>
+        <p14:creationId xmlns:p14="http://schemas.microsoft.com/office/powerpoint/2010/main" val="2819011811"/>
       </p:ext>
     </p:extLst>
   </p:cSld>

</xml_diff>

<commit_message>
J'ai supprimé de la semaine 0 toutes référence à if, for, fonctions et modules. C'est beaucoup trop compliqué pour la première semaine. Il faut introduire pleins de notions à la fois (bloc d'instruction, indentation, expression évaluant à un booléen, etc.) c'est beaucoup trop, je n'ai pas réussi à présenter ça de manière claire aussi tôt. À la place, je vais introduire ces notions entre la présentation des types de base.
</commit_message>
<xml_diff>
--- a/semaine2/semaine2-0.pptx
+++ b/semaine2/semaine2-0.pptx
@@ -12,18 +12,18 @@
   </p:handoutMasterIdLst>
   <p:sldIdLst>
     <p:sldId id="893" r:id="rId2"/>
-    <p:sldId id="895" r:id="rId3"/>
-    <p:sldId id="903" r:id="rId4"/>
-    <p:sldId id="907" r:id="rId5"/>
-    <p:sldId id="896" r:id="rId6"/>
-    <p:sldId id="904" r:id="rId7"/>
-    <p:sldId id="905" r:id="rId8"/>
-    <p:sldId id="898" r:id="rId9"/>
-    <p:sldId id="900" r:id="rId10"/>
-    <p:sldId id="899" r:id="rId11"/>
-    <p:sldId id="897" r:id="rId12"/>
-    <p:sldId id="906" r:id="rId13"/>
-    <p:sldId id="908" r:id="rId14"/>
+    <p:sldId id="903" r:id="rId3"/>
+    <p:sldId id="904" r:id="rId4"/>
+    <p:sldId id="905" r:id="rId5"/>
+    <p:sldId id="898" r:id="rId6"/>
+    <p:sldId id="900" r:id="rId7"/>
+    <p:sldId id="899" r:id="rId8"/>
+    <p:sldId id="897" r:id="rId9"/>
+    <p:sldId id="906" r:id="rId10"/>
+    <p:sldId id="908" r:id="rId11"/>
+    <p:sldId id="909" r:id="rId12"/>
+    <p:sldId id="910" r:id="rId13"/>
+    <p:sldId id="911" r:id="rId14"/>
   </p:sldIdLst>
   <p:sldSz cx="9144000" cy="6858000" type="screen4x3"/>
   <p:notesSz cx="7099300" cy="10234613"/>
@@ -158,10 +158,7 @@
         <p14:section name="Section par défaut" id="{28C650F0-13B2-49C9-9ED4-D40CD07835D6}">
           <p14:sldIdLst>
             <p14:sldId id="893"/>
-            <p14:sldId id="895"/>
             <p14:sldId id="903"/>
-            <p14:sldId id="907"/>
-            <p14:sldId id="896"/>
             <p14:sldId id="904"/>
             <p14:sldId id="905"/>
             <p14:sldId id="898"/>
@@ -170,6 +167,9 @@
             <p14:sldId id="897"/>
             <p14:sldId id="906"/>
             <p14:sldId id="908"/>
+            <p14:sldId id="909"/>
+            <p14:sldId id="910"/>
+            <p14:sldId id="911"/>
           </p14:sldIdLst>
         </p14:section>
       </p14:sectionLst>
@@ -1095,7 +1095,7 @@
     </p:spTree>
     <p:extLst>
       <p:ext uri="{BB962C8B-B14F-4D97-AF65-F5344CB8AC3E}">
-        <p14:creationId xmlns:p14="http://schemas.microsoft.com/office/powerpoint/2010/main" val="929701624"/>
+        <p14:creationId xmlns:p14="http://schemas.microsoft.com/office/powerpoint/2010/main" val="4254458590"/>
       </p:ext>
     </p:extLst>
   </p:cSld>
@@ -1149,6 +1149,52 @@
           <a:bodyPr/>
           <a:lstStyle/>
           <a:p>
+            <a:r>
+              <a:rPr lang="fr-FR" u="sng" dirty="0" smtClean="0"/>
+              <a:t>En surimpression pendant que je</a:t>
+            </a:r>
+            <a:r>
+              <a:rPr lang="fr-FR" u="sng" baseline="0" dirty="0" smtClean="0"/>
+              <a:t> parle</a:t>
+            </a:r>
+            <a:endParaRPr lang="fr-FR" u="sng" dirty="0" smtClean="0"/>
+          </a:p>
+          <a:p>
+            <a:r>
+              <a:rPr lang="fr-FR" dirty="0" smtClean="0"/>
+              <a:t>Objet</a:t>
+            </a:r>
+          </a:p>
+          <a:p>
+            <a:r>
+              <a:rPr lang="fr-FR" dirty="0" smtClean="0"/>
+              <a:t>	stockage d</a:t>
+            </a:r>
+            <a:r>
+              <a:rPr lang="fr-FR" baseline="0" dirty="0" smtClean="0"/>
+              <a:t>’information</a:t>
+            </a:r>
+          </a:p>
+          <a:p>
+            <a:r>
+              <a:rPr lang="fr-FR" baseline="0" dirty="0" smtClean="0"/>
+              <a:t>	méthodes</a:t>
+            </a:r>
+          </a:p>
+          <a:p>
+            <a:endParaRPr lang="fr-FR" baseline="0" dirty="0" smtClean="0"/>
+          </a:p>
+          <a:p>
+            <a:r>
+              <a:rPr lang="fr-FR" baseline="0" dirty="0" smtClean="0"/>
+              <a:t>Type</a:t>
+            </a:r>
+          </a:p>
+          <a:p>
+            <a:r>
+              <a:rPr lang="fr-FR" baseline="0" dirty="0" smtClean="0"/>
+              <a:t>	information et méthodes par défaut</a:t>
+            </a:r>
             <a:endParaRPr lang="fr-FR" dirty="0"/>
           </a:p>
         </p:txBody>
@@ -1185,7 +1231,7 @@
     </p:spTree>
     <p:extLst>
       <p:ext uri="{BB962C8B-B14F-4D97-AF65-F5344CB8AC3E}">
-        <p14:creationId xmlns:p14="http://schemas.microsoft.com/office/powerpoint/2010/main" val="4254458590"/>
+        <p14:creationId xmlns:p14="http://schemas.microsoft.com/office/powerpoint/2010/main" val="2284023044"/>
       </p:ext>
     </p:extLst>
   </p:cSld>
@@ -1240,50 +1286,8 @@
           <a:lstStyle/>
           <a:p>
             <a:r>
-              <a:rPr lang="fr-FR" u="sng" dirty="0" smtClean="0"/>
-              <a:t>En surimpression pendant que je</a:t>
-            </a:r>
-            <a:r>
-              <a:rPr lang="fr-FR" u="sng" baseline="0" dirty="0" smtClean="0"/>
-              <a:t> parle</a:t>
-            </a:r>
-            <a:endParaRPr lang="fr-FR" u="sng" dirty="0" smtClean="0"/>
-          </a:p>
-          <a:p>
-            <a:r>
               <a:rPr lang="fr-FR" dirty="0" smtClean="0"/>
-              <a:t>Objet</a:t>
-            </a:r>
-          </a:p>
-          <a:p>
-            <a:r>
-              <a:rPr lang="fr-FR" dirty="0" smtClean="0"/>
-              <a:t>	stockage d</a:t>
-            </a:r>
-            <a:r>
-              <a:rPr lang="fr-FR" baseline="0" dirty="0" smtClean="0"/>
-              <a:t>’information</a:t>
-            </a:r>
-          </a:p>
-          <a:p>
-            <a:r>
-              <a:rPr lang="fr-FR" baseline="0" dirty="0" smtClean="0"/>
-              <a:t>	méthodes</a:t>
-            </a:r>
-          </a:p>
-          <a:p>
-            <a:endParaRPr lang="fr-FR" baseline="0" dirty="0" smtClean="0"/>
-          </a:p>
-          <a:p>
-            <a:r>
-              <a:rPr lang="fr-FR" baseline="0" dirty="0" smtClean="0"/>
-              <a:t>Type</a:t>
-            </a:r>
-          </a:p>
-          <a:p>
-            <a:r>
-              <a:rPr lang="fr-FR" baseline="0" dirty="0" smtClean="0"/>
-              <a:t>	information et méthodes par défaut</a:t>
+              <a:t>(43s)</a:t>
             </a:r>
             <a:endParaRPr lang="fr-FR" dirty="0"/>
           </a:p>
@@ -1312,7 +1316,7 @@
               <a:pPr>
                 <a:defRPr/>
               </a:pPr>
-              <a:t>6</a:t>
+              <a:t>4</a:t>
             </a:fld>
             <a:endParaRPr lang="en-US"/>
           </a:p>
@@ -1321,7 +1325,7 @@
     </p:spTree>
     <p:extLst>
       <p:ext uri="{BB962C8B-B14F-4D97-AF65-F5344CB8AC3E}">
-        <p14:creationId xmlns:p14="http://schemas.microsoft.com/office/powerpoint/2010/main" val="2284023044"/>
+        <p14:creationId xmlns:p14="http://schemas.microsoft.com/office/powerpoint/2010/main" val="4085880631"/>
       </p:ext>
     </p:extLst>
   </p:cSld>
@@ -1375,9 +1379,37 @@
           <a:bodyPr/>
           <a:lstStyle/>
           <a:p>
+            <a:pPr marL="0" marR="0" indent="0" algn="l" defTabSz="914400" rtl="0" eaLnBrk="0" fontAlgn="base" latinLnBrk="0" hangingPunct="0">
+              <a:lnSpc>
+                <a:spcPct val="100000"/>
+              </a:lnSpc>
+              <a:spcBef>
+                <a:spcPct val="30000"/>
+              </a:spcBef>
+              <a:spcAft>
+                <a:spcPct val="0"/>
+              </a:spcAft>
+              <a:buClrTx/>
+              <a:buSzTx/>
+              <a:buFontTx/>
+              <a:buNone/>
+              <a:tabLst/>
+              <a:defRPr/>
+            </a:pPr>
+            <a:r>
+              <a:rPr lang="fr-FR" u="sng" dirty="0" smtClean="0"/>
+              <a:t>En surimpression pendant que je</a:t>
+            </a:r>
+            <a:r>
+              <a:rPr lang="fr-FR" u="sng" baseline="0" dirty="0" smtClean="0"/>
+              <a:t> parle</a:t>
+            </a:r>
+            <a:endParaRPr lang="fr-FR" u="sng" dirty="0" smtClean="0"/>
+          </a:p>
+          <a:p>
             <a:r>
               <a:rPr lang="fr-FR" dirty="0" smtClean="0"/>
-              <a:t>(43s)</a:t>
+              <a:t>a = 1</a:t>
             </a:r>
             <a:endParaRPr lang="fr-FR" dirty="0"/>
           </a:p>
@@ -1406,7 +1438,7 @@
               <a:pPr>
                 <a:defRPr/>
               </a:pPr>
-              <a:t>7</a:t>
+              <a:t>5</a:t>
             </a:fld>
             <a:endParaRPr lang="en-US"/>
           </a:p>
@@ -1415,7 +1447,7 @@
     </p:spTree>
     <p:extLst>
       <p:ext uri="{BB962C8B-B14F-4D97-AF65-F5344CB8AC3E}">
-        <p14:creationId xmlns:p14="http://schemas.microsoft.com/office/powerpoint/2010/main" val="4085880631"/>
+        <p14:creationId xmlns:p14="http://schemas.microsoft.com/office/powerpoint/2010/main" val="3249037592"/>
       </p:ext>
     </p:extLst>
   </p:cSld>
@@ -1492,15 +1524,120 @@
             </a:r>
             <a:r>
               <a:rPr lang="fr-FR" u="sng" baseline="0" dirty="0" smtClean="0"/>
-              <a:t> parle</a:t>
+              <a:t> parle (utiliser la police courrier new)</a:t>
             </a:r>
             <a:endParaRPr lang="fr-FR" u="sng" dirty="0" smtClean="0"/>
           </a:p>
           <a:p>
             <a:r>
+              <a:rPr lang="fr-FR" dirty="0" err="1" smtClean="0"/>
+              <a:t>abcdefghijklmnopqrstuvwxyz</a:t>
+            </a:r>
+            <a:endParaRPr lang="fr-FR" dirty="0" smtClean="0"/>
+          </a:p>
+          <a:p>
+            <a:r>
               <a:rPr lang="fr-FR" dirty="0" smtClean="0"/>
-              <a:t>a = 1</a:t>
-            </a:r>
+              <a:t>ABCDEFGHIJKLMNOPQRSTUVWXYZ</a:t>
+            </a:r>
+          </a:p>
+          <a:p>
+            <a:r>
+              <a:rPr lang="fr-FR" dirty="0" smtClean="0"/>
+              <a:t>0123456789</a:t>
+            </a:r>
+          </a:p>
+          <a:p>
+            <a:r>
+              <a:rPr lang="fr-FR" dirty="0" smtClean="0"/>
+              <a:t>_</a:t>
+            </a:r>
+          </a:p>
+          <a:p>
+            <a:endParaRPr lang="fr-FR" dirty="0" smtClean="0"/>
+          </a:p>
+          <a:p>
+            <a:r>
+              <a:rPr lang="fr-FR" dirty="0" err="1" smtClean="0"/>
+              <a:t>ma_variable</a:t>
+            </a:r>
+            <a:r>
+              <a:rPr lang="fr-FR" dirty="0" smtClean="0"/>
+              <a:t> (vert)</a:t>
+            </a:r>
+          </a:p>
+          <a:p>
+            <a:r>
+              <a:rPr lang="fr-FR" dirty="0" smtClean="0"/>
+              <a:t>_</a:t>
+            </a:r>
+            <a:r>
+              <a:rPr lang="fr-FR" dirty="0" err="1" smtClean="0"/>
+              <a:t>ma_variable</a:t>
+            </a:r>
+            <a:r>
+              <a:rPr lang="fr-FR" dirty="0" smtClean="0"/>
+              <a:t> (vert)</a:t>
+            </a:r>
+          </a:p>
+          <a:p>
+            <a:r>
+              <a:rPr lang="fr-FR" dirty="0" smtClean="0"/>
+              <a:t>1variable</a:t>
+            </a:r>
+            <a:r>
+              <a:rPr lang="fr-FR" baseline="0" dirty="0" smtClean="0"/>
+              <a:t> (barrer en rouge)</a:t>
+            </a:r>
+          </a:p>
+          <a:p>
+            <a:endParaRPr lang="fr-FR" baseline="0" dirty="0" smtClean="0"/>
+          </a:p>
+          <a:p>
+            <a:r>
+              <a:rPr lang="fr-FR" baseline="0" dirty="0" err="1" smtClean="0"/>
+              <a:t>Ma_variable</a:t>
+            </a:r>
+            <a:r>
+              <a:rPr lang="fr-FR" baseline="0" dirty="0" smtClean="0"/>
+              <a:t> est différent de </a:t>
+            </a:r>
+            <a:r>
+              <a:rPr lang="fr-FR" baseline="0" dirty="0" err="1" smtClean="0"/>
+              <a:t>ma_variable</a:t>
+            </a:r>
+            <a:endParaRPr lang="fr-FR" baseline="0" dirty="0" smtClean="0"/>
+          </a:p>
+          <a:p>
+            <a:endParaRPr lang="fr-FR" baseline="0" dirty="0" smtClean="0"/>
+          </a:p>
+          <a:p>
+            <a:r>
+              <a:rPr lang="fr-FR" baseline="0" dirty="0" smtClean="0"/>
+              <a:t>Utiliser </a:t>
+            </a:r>
+            <a:r>
+              <a:rPr lang="fr-FR" i="1" baseline="0" dirty="0" err="1" smtClean="0"/>
+              <a:t>moyenne_age_francais</a:t>
+            </a:r>
+            <a:r>
+              <a:rPr lang="fr-FR" baseline="0" dirty="0" smtClean="0"/>
+              <a:t> plutôt que </a:t>
+            </a:r>
+            <a:r>
+              <a:rPr lang="fr-FR" i="1" baseline="0" dirty="0" err="1" smtClean="0"/>
+              <a:t>moy_age_f</a:t>
+            </a:r>
+            <a:r>
+              <a:rPr lang="fr-FR" baseline="0" dirty="0" smtClean="0"/>
+              <a:t> ou pire </a:t>
+            </a:r>
+            <a:r>
+              <a:rPr lang="fr-FR" i="1" baseline="0" dirty="0" smtClean="0"/>
+              <a:t>x</a:t>
+            </a:r>
+          </a:p>
+          <a:p>
             <a:endParaRPr lang="fr-FR" dirty="0"/>
           </a:p>
         </p:txBody>
@@ -1528,7 +1665,7 @@
               <a:pPr>
                 <a:defRPr/>
               </a:pPr>
-              <a:t>8</a:t>
+              <a:t>6</a:t>
             </a:fld>
             <a:endParaRPr lang="en-US"/>
           </a:p>
@@ -1537,7 +1674,7 @@
     </p:spTree>
     <p:extLst>
       <p:ext uri="{BB962C8B-B14F-4D97-AF65-F5344CB8AC3E}">
-        <p14:creationId xmlns:p14="http://schemas.microsoft.com/office/powerpoint/2010/main" val="3249037592"/>
+        <p14:creationId xmlns:p14="http://schemas.microsoft.com/office/powerpoint/2010/main" val="3529004839"/>
       </p:ext>
     </p:extLst>
   </p:cSld>
@@ -1591,143 +1728,10 @@
           <a:bodyPr/>
           <a:lstStyle/>
           <a:p>
-            <a:pPr marL="0" marR="0" indent="0" algn="l" defTabSz="914400" rtl="0" eaLnBrk="0" fontAlgn="base" latinLnBrk="0" hangingPunct="0">
-              <a:lnSpc>
-                <a:spcPct val="100000"/>
-              </a:lnSpc>
-              <a:spcBef>
-                <a:spcPct val="30000"/>
-              </a:spcBef>
-              <a:spcAft>
-                <a:spcPct val="0"/>
-              </a:spcAft>
-              <a:buClrTx/>
-              <a:buSzTx/>
-              <a:buFontTx/>
-              <a:buNone/>
-              <a:tabLst/>
-              <a:defRPr/>
-            </a:pPr>
-            <a:r>
-              <a:rPr lang="fr-FR" u="sng" dirty="0" smtClean="0"/>
-              <a:t>En surimpression pendant que je</a:t>
-            </a:r>
-            <a:r>
-              <a:rPr lang="fr-FR" u="sng" baseline="0" dirty="0" smtClean="0"/>
-              <a:t> parle (utiliser la police courrier new)</a:t>
-            </a:r>
-            <a:endParaRPr lang="fr-FR" u="sng" dirty="0" smtClean="0"/>
-          </a:p>
-          <a:p>
-            <a:r>
-              <a:rPr lang="fr-FR" dirty="0" err="1" smtClean="0"/>
-              <a:t>abcdefghijklmnopqrstuvwxyz</a:t>
-            </a:r>
-            <a:endParaRPr lang="fr-FR" dirty="0" smtClean="0"/>
-          </a:p>
-          <a:p>
             <a:r>
               <a:rPr lang="fr-FR" dirty="0" smtClean="0"/>
-              <a:t>ABCDEFGHIJKLMNOPQRSTUVWXYZ</a:t>
-            </a:r>
-          </a:p>
-          <a:p>
-            <a:r>
-              <a:rPr lang="fr-FR" dirty="0" smtClean="0"/>
-              <a:t>0123456789</a:t>
-            </a:r>
-          </a:p>
-          <a:p>
-            <a:r>
-              <a:rPr lang="fr-FR" dirty="0" smtClean="0"/>
-              <a:t>_</a:t>
-            </a:r>
-          </a:p>
-          <a:p>
-            <a:endParaRPr lang="fr-FR" dirty="0" smtClean="0"/>
-          </a:p>
-          <a:p>
-            <a:r>
-              <a:rPr lang="fr-FR" dirty="0" err="1" smtClean="0"/>
-              <a:t>ma_variable</a:t>
-            </a:r>
-            <a:r>
-              <a:rPr lang="fr-FR" dirty="0" smtClean="0"/>
-              <a:t> (vert)</a:t>
-            </a:r>
-          </a:p>
-          <a:p>
-            <a:r>
-              <a:rPr lang="fr-FR" dirty="0" smtClean="0"/>
-              <a:t>_</a:t>
-            </a:r>
-            <a:r>
-              <a:rPr lang="fr-FR" dirty="0" err="1" smtClean="0"/>
-              <a:t>ma_variable</a:t>
-            </a:r>
-            <a:r>
-              <a:rPr lang="fr-FR" dirty="0" smtClean="0"/>
-              <a:t> (vert)</a:t>
-            </a:r>
-          </a:p>
-          <a:p>
-            <a:r>
-              <a:rPr lang="fr-FR" dirty="0" smtClean="0"/>
-              <a:t>1variable</a:t>
-            </a:r>
-            <a:r>
-              <a:rPr lang="fr-FR" baseline="0" dirty="0" smtClean="0"/>
-              <a:t> (barrer en rouge)</a:t>
-            </a:r>
-          </a:p>
-          <a:p>
-            <a:endParaRPr lang="fr-FR" baseline="0" dirty="0" smtClean="0"/>
-          </a:p>
-          <a:p>
-            <a:r>
-              <a:rPr lang="fr-FR" baseline="0" dirty="0" err="1" smtClean="0"/>
-              <a:t>Ma_variable</a:t>
-            </a:r>
-            <a:r>
-              <a:rPr lang="fr-FR" baseline="0" dirty="0" smtClean="0"/>
-              <a:t> est différent de </a:t>
-            </a:r>
-            <a:r>
-              <a:rPr lang="fr-FR" baseline="0" dirty="0" err="1" smtClean="0"/>
-              <a:t>ma_variable</a:t>
-            </a:r>
-            <a:endParaRPr lang="fr-FR" baseline="0" dirty="0" smtClean="0"/>
-          </a:p>
-          <a:p>
-            <a:endParaRPr lang="fr-FR" baseline="0" dirty="0" smtClean="0"/>
-          </a:p>
-          <a:p>
-            <a:r>
-              <a:rPr lang="fr-FR" baseline="0" dirty="0" smtClean="0"/>
-              <a:t>Utiliser </a:t>
-            </a:r>
-            <a:r>
-              <a:rPr lang="fr-FR" i="1" baseline="0" dirty="0" err="1" smtClean="0"/>
-              <a:t>moyenne_age_francais</a:t>
-            </a:r>
-            <a:r>
-              <a:rPr lang="fr-FR" baseline="0" dirty="0" smtClean="0"/>
-              <a:t> plutôt que </a:t>
-            </a:r>
-            <a:r>
-              <a:rPr lang="fr-FR" i="1" baseline="0" dirty="0" err="1" smtClean="0"/>
-              <a:t>moy_age_f</a:t>
-            </a:r>
-            <a:r>
-              <a:rPr lang="fr-FR" baseline="0" dirty="0" smtClean="0"/>
-              <a:t> ou pire </a:t>
-            </a:r>
-            <a:r>
-              <a:rPr lang="fr-FR" i="1" baseline="0" dirty="0" smtClean="0"/>
-              <a:t>x</a:t>
-            </a:r>
-          </a:p>
-          <a:p>
+              <a:t>(60s)</a:t>
+            </a:r>
             <a:endParaRPr lang="fr-FR" dirty="0"/>
           </a:p>
         </p:txBody>
@@ -1755,7 +1759,7 @@
               <a:pPr>
                 <a:defRPr/>
               </a:pPr>
-              <a:t>9</a:t>
+              <a:t>8</a:t>
             </a:fld>
             <a:endParaRPr lang="en-US"/>
           </a:p>
@@ -1764,7 +1768,7 @@
     </p:spTree>
     <p:extLst>
       <p:ext uri="{BB962C8B-B14F-4D97-AF65-F5344CB8AC3E}">
-        <p14:creationId xmlns:p14="http://schemas.microsoft.com/office/powerpoint/2010/main" val="3529004839"/>
+        <p14:creationId xmlns:p14="http://schemas.microsoft.com/office/powerpoint/2010/main" val="3493514724"/>
       </p:ext>
     </p:extLst>
   </p:cSld>
@@ -1818,10 +1822,6 @@
           <a:bodyPr/>
           <a:lstStyle/>
           <a:p>
-            <a:r>
-              <a:rPr lang="fr-FR" dirty="0" smtClean="0"/>
-              <a:t>(60s)</a:t>
-            </a:r>
             <a:endParaRPr lang="fr-FR" dirty="0"/>
           </a:p>
         </p:txBody>
@@ -1849,7 +1849,7 @@
               <a:pPr>
                 <a:defRPr/>
               </a:pPr>
-              <a:t>11</a:t>
+              <a:t>12</a:t>
             </a:fld>
             <a:endParaRPr lang="en-US"/>
           </a:p>
@@ -1858,7 +1858,97 @@
     </p:spTree>
     <p:extLst>
       <p:ext uri="{BB962C8B-B14F-4D97-AF65-F5344CB8AC3E}">
-        <p14:creationId xmlns:p14="http://schemas.microsoft.com/office/powerpoint/2010/main" val="3493514724"/>
+        <p14:creationId xmlns:p14="http://schemas.microsoft.com/office/powerpoint/2010/main" val="2941415002"/>
+      </p:ext>
+    </p:extLst>
+  </p:cSld>
+  <p:clrMapOvr>
+    <a:masterClrMapping/>
+  </p:clrMapOvr>
+</p:notes>
+</file>
+
+<file path=ppt/notesSlides/notesSlide9.xml><?xml version="1.0" encoding="utf-8"?>
+<p:notes xmlns:a="http://schemas.openxmlformats.org/drawingml/2006/main" xmlns:r="http://schemas.openxmlformats.org/officeDocument/2006/relationships" xmlns:p="http://schemas.openxmlformats.org/presentationml/2006/main">
+  <p:cSld>
+    <p:spTree>
+      <p:nvGrpSpPr>
+        <p:cNvPr id="1" name=""/>
+        <p:cNvGrpSpPr/>
+        <p:nvPr/>
+      </p:nvGrpSpPr>
+      <p:grpSpPr>
+        <a:xfrm>
+          <a:off x="0" y="0"/>
+          <a:ext cx="0" cy="0"/>
+          <a:chOff x="0" y="0"/>
+          <a:chExt cx="0" cy="0"/>
+        </a:xfrm>
+      </p:grpSpPr>
+      <p:sp>
+        <p:nvSpPr>
+          <p:cNvPr id="2" name="Espace réservé de l'image des diapositives 1"/>
+          <p:cNvSpPr>
+            <a:spLocks noGrp="1" noRot="1" noChangeAspect="1"/>
+          </p:cNvSpPr>
+          <p:nvPr>
+            <p:ph type="sldImg"/>
+          </p:nvPr>
+        </p:nvSpPr>
+        <p:spPr/>
+      </p:sp>
+      <p:sp>
+        <p:nvSpPr>
+          <p:cNvPr id="3" name="Espace réservé des commentaires 2"/>
+          <p:cNvSpPr>
+            <a:spLocks noGrp="1"/>
+          </p:cNvSpPr>
+          <p:nvPr>
+            <p:ph type="body" idx="1"/>
+          </p:nvPr>
+        </p:nvSpPr>
+        <p:spPr/>
+        <p:txBody>
+          <a:bodyPr/>
+          <a:lstStyle/>
+          <a:p>
+            <a:endParaRPr lang="fr-FR" dirty="0"/>
+          </a:p>
+        </p:txBody>
+      </p:sp>
+      <p:sp>
+        <p:nvSpPr>
+          <p:cNvPr id="4" name="Espace réservé du numéro de diapositive 3"/>
+          <p:cNvSpPr>
+            <a:spLocks noGrp="1"/>
+          </p:cNvSpPr>
+          <p:nvPr>
+            <p:ph type="sldNum" sz="quarter" idx="10"/>
+          </p:nvPr>
+        </p:nvSpPr>
+        <p:spPr/>
+        <p:txBody>
+          <a:bodyPr/>
+          <a:lstStyle/>
+          <a:p>
+            <a:pPr>
+              <a:defRPr/>
+            </a:pPr>
+            <a:fld id="{9E8EB9F5-F2F7-4A48-A943-9B409357C15C}" type="slidenum">
+              <a:rPr lang="en-US" smtClean="0"/>
+              <a:pPr>
+                <a:defRPr/>
+              </a:pPr>
+              <a:t>13</a:t>
+            </a:fld>
+            <a:endParaRPr lang="en-US"/>
+          </a:p>
+        </p:txBody>
+      </p:sp>
+    </p:spTree>
+    <p:extLst>
+      <p:ext uri="{BB962C8B-B14F-4D97-AF65-F5344CB8AC3E}">
+        <p14:creationId xmlns:p14="http://schemas.microsoft.com/office/powerpoint/2010/main" val="1673654216"/>
       </p:ext>
     </p:extLst>
   </p:cSld>
@@ -5182,11 +5272,7 @@
           <a:p>
             <a:r>
               <a:rPr lang="fr-FR" dirty="0" smtClean="0"/>
-              <a:t>Sujet de la </a:t>
-            </a:r>
-            <a:r>
-              <a:rPr lang="fr-FR" dirty="0" smtClean="0"/>
-              <a:t>semaine (18s)</a:t>
+              <a:t>Sujet de la semaine (18s)</a:t>
             </a:r>
             <a:endParaRPr lang="fr-FR" dirty="0"/>
           </a:p>
@@ -5209,59 +5295,25 @@
           <a:p>
             <a:r>
               <a:rPr lang="fr-FR" dirty="0" smtClean="0"/>
-              <a:t>Cette semaine nous allons </a:t>
-            </a:r>
+              <a:t>Cette semaine nous allons aborder deux sujets importants</a:t>
+            </a:r>
+          </a:p>
+          <a:p>
+            <a:pPr lvl="1"/>
             <a:r>
               <a:rPr lang="fr-FR" dirty="0" smtClean="0"/>
-              <a:t>aborder deux sujets importants</a:t>
-            </a:r>
-            <a:endParaRPr lang="fr-FR" dirty="0" smtClean="0"/>
+              <a:t>Le premier sujet est sur les notions d’objet, de variables et de typage dynamique qui représentent une des clefs de la compréhension de Python</a:t>
+            </a:r>
           </a:p>
           <a:p>
             <a:pPr lvl="1"/>
             <a:r>
               <a:rPr lang="fr-FR" dirty="0" smtClean="0"/>
-              <a:t>Le premier sujet est sur la présentation des </a:t>
+              <a:t>Le deuxième sujet </a:t>
             </a:r>
             <a:r>
               <a:rPr lang="fr-FR" dirty="0" smtClean="0"/>
-              <a:t>types </a:t>
-            </a:r>
-            <a:r>
-              <a:rPr lang="fr-FR" dirty="0" smtClean="0"/>
-              <a:t>de base en </a:t>
-            </a:r>
-            <a:r>
-              <a:rPr lang="fr-FR" dirty="0" smtClean="0"/>
-              <a:t>Python qui sont des objets puissants, polyvalents, mais très souple et facile à utiliser</a:t>
-            </a:r>
-            <a:endParaRPr lang="fr-FR" dirty="0" smtClean="0"/>
-          </a:p>
-          <a:p>
-            <a:pPr lvl="1"/>
-            <a:r>
-              <a:rPr lang="fr-FR" dirty="0" smtClean="0"/>
-              <a:t>Le deuxième sujet est sur le </a:t>
-            </a:r>
-            <a:r>
-              <a:rPr lang="fr-FR" dirty="0" smtClean="0"/>
-              <a:t>typage dynamique et </a:t>
-            </a:r>
-            <a:r>
-              <a:rPr lang="fr-FR" dirty="0" smtClean="0"/>
-              <a:t>les </a:t>
-            </a:r>
-            <a:r>
-              <a:rPr lang="fr-FR" dirty="0" smtClean="0"/>
-              <a:t>références </a:t>
-            </a:r>
-            <a:r>
-              <a:rPr lang="fr-FR" dirty="0" smtClean="0"/>
-              <a:t>partagés qui représentent une des </a:t>
-            </a:r>
-            <a:r>
-              <a:rPr lang="fr-FR" dirty="0" smtClean="0"/>
-              <a:t>trois clefs de la compréhension de Python</a:t>
+              <a:t>est sur la présentation des types de base en Python qui sont des objets puissants, polyvalents, mais très souple et facile à utiliser</a:t>
             </a:r>
           </a:p>
           <a:p>
@@ -5353,12 +5405,12 @@
       </p:grpSpPr>
       <p:sp>
         <p:nvSpPr>
-          <p:cNvPr id="2" name="Titre 1"/>
+          <p:cNvPr id="4" name="Titre 3"/>
           <p:cNvSpPr>
             <a:spLocks noGrp="1"/>
           </p:cNvSpPr>
           <p:nvPr>
-            <p:ph type="title"/>
+            <p:ph type="ctrTitle"/>
           </p:nvPr>
         </p:nvSpPr>
         <p:spPr/>
@@ -5368,11 +5420,27 @@
           <a:p>
             <a:r>
               <a:rPr lang="fr-FR" dirty="0" smtClean="0"/>
-              <a:t>Typage </a:t>
+              <a:t>Total : </a:t>
             </a:r>
             <a:r>
               <a:rPr lang="fr-FR" dirty="0" smtClean="0"/>
-              <a:t>dynamique (20s)</a:t>
+              <a:t>4 </a:t>
+            </a:r>
+            <a:r>
+              <a:rPr lang="fr-FR" dirty="0" smtClean="0"/>
+              <a:t>minutes </a:t>
+            </a:r>
+            <a:r>
+              <a:rPr lang="fr-FR" dirty="0" smtClean="0"/>
+              <a:t>46</a:t>
+            </a:r>
+            <a:r>
+              <a:rPr lang="fr-FR" dirty="0" smtClean="0"/>
+              <a:t> </a:t>
+            </a:r>
+            <a:r>
+              <a:rPr lang="fr-FR" dirty="0" smtClean="0"/>
+              <a:t>secondes</a:t>
             </a:r>
             <a:endParaRPr lang="fr-FR" dirty="0"/>
           </a:p>
@@ -5380,12 +5448,12 @@
       </p:sp>
       <p:sp>
         <p:nvSpPr>
-          <p:cNvPr id="3" name="Espace réservé du contenu 2"/>
+          <p:cNvPr id="5" name="Sous-titre 4"/>
           <p:cNvSpPr>
             <a:spLocks noGrp="1"/>
           </p:cNvSpPr>
           <p:nvPr>
-            <p:ph idx="1"/>
+            <p:ph type="subTitle" idx="1"/>
           </p:nvPr>
         </p:nvSpPr>
         <p:spPr/>
@@ -5393,80 +5461,14 @@
           <a:bodyPr/>
           <a:lstStyle/>
           <a:p>
-            <a:r>
-              <a:rPr lang="fr-FR" dirty="0" smtClean="0"/>
-              <a:t>Maintenant que nous avons vu les notions d’objets et de variables, parlons du typage dynamique</a:t>
-            </a:r>
-          </a:p>
-          <a:p>
-            <a:r>
-              <a:rPr lang="fr-FR" dirty="0" smtClean="0"/>
-              <a:t>Python </a:t>
-            </a:r>
-            <a:r>
-              <a:rPr lang="fr-FR" dirty="0" smtClean="0"/>
-              <a:t>utilise le typage </a:t>
-            </a:r>
-            <a:r>
-              <a:rPr lang="fr-FR" dirty="0" smtClean="0"/>
-              <a:t>dynamique c’est-à-dire que le type des variables n’est pas spécifié lors de l’écriture du programme, mais automatiquement à l’exécution. En fait, les variables </a:t>
-            </a:r>
-            <a:r>
-              <a:rPr lang="fr-FR" dirty="0" smtClean="0"/>
-              <a:t>n’ont pas de type, ce sont les objets qu’elles référencent qui ont un type. Prenons un exemple…</a:t>
-            </a:r>
-          </a:p>
-        </p:txBody>
-      </p:sp>
-      <p:sp>
-        <p:nvSpPr>
-          <p:cNvPr id="4" name="ZoneTexte 3"/>
-          <p:cNvSpPr txBox="1"/>
-          <p:nvPr/>
-        </p:nvSpPr>
-        <p:spPr>
-          <a:xfrm>
-            <a:off x="0" y="92076"/>
-            <a:ext cx="1537855" cy="400110"/>
-          </a:xfrm>
-          <a:prstGeom prst="rect">
-            <a:avLst/>
-          </a:prstGeom>
-          <a:noFill/>
-          <a:ln>
-            <a:solidFill>
-              <a:srgbClr val="FF0000"/>
-            </a:solidFill>
-          </a:ln>
-        </p:spPr>
-        <p:txBody>
-          <a:bodyPr wrap="square" rtlCol="0">
-            <a:spAutoFit/>
-          </a:bodyPr>
-          <a:lstStyle/>
-          <a:p>
-            <a:r>
-              <a:rPr lang="fr-FR" sz="2000" dirty="0" smtClean="0">
-                <a:solidFill>
-                  <a:srgbClr val="FF0000"/>
-                </a:solidFill>
-                <a:latin typeface="Calibri" panose="020F0502020204030204" pitchFamily="34" charset="0"/>
-              </a:rPr>
-              <a:t>prompteur</a:t>
-            </a:r>
-            <a:endParaRPr lang="fr-FR" sz="2000" dirty="0">
-              <a:solidFill>
-                <a:srgbClr val="FF0000"/>
-              </a:solidFill>
-              <a:latin typeface="Calibri" panose="020F0502020204030204" pitchFamily="34" charset="0"/>
-            </a:endParaRPr>
+            <a:endParaRPr lang="fr-FR"/>
           </a:p>
         </p:txBody>
       </p:sp>
     </p:spTree>
     <p:extLst>
       <p:ext uri="{BB962C8B-B14F-4D97-AF65-F5344CB8AC3E}">
-        <p14:creationId xmlns:p14="http://schemas.microsoft.com/office/powerpoint/2010/main" val="3893248729"/>
+        <p14:creationId xmlns:p14="http://schemas.microsoft.com/office/powerpoint/2010/main" val="2203744170"/>
       </p:ext>
     </p:extLst>
   </p:cSld>
@@ -5502,14 +5504,664 @@
       </p:grpSpPr>
       <p:sp>
         <p:nvSpPr>
-          <p:cNvPr id="4" name="Rectangle 3"/>
+          <p:cNvPr id="2" name="Titre 1"/>
+          <p:cNvSpPr>
+            <a:spLocks noGrp="1"/>
+          </p:cNvSpPr>
+          <p:nvPr>
+            <p:ph type="title"/>
+          </p:nvPr>
+        </p:nvSpPr>
+        <p:spPr/>
+        <p:txBody>
+          <a:bodyPr/>
+          <a:lstStyle/>
+          <a:p>
+            <a:r>
+              <a:rPr lang="fr-FR" dirty="0" smtClean="0"/>
+              <a:t>TRASH</a:t>
+            </a:r>
+            <a:endParaRPr lang="fr-FR" dirty="0"/>
+          </a:p>
+        </p:txBody>
+      </p:sp>
+      <p:sp>
+        <p:nvSpPr>
+          <p:cNvPr id="3" name="Espace réservé du contenu 2"/>
+          <p:cNvSpPr>
+            <a:spLocks noGrp="1"/>
+          </p:cNvSpPr>
+          <p:nvPr>
+            <p:ph idx="1"/>
+          </p:nvPr>
+        </p:nvSpPr>
+        <p:spPr/>
+        <p:txBody>
+          <a:bodyPr/>
+          <a:lstStyle/>
+          <a:p>
+            <a:pPr marL="0" indent="0">
+              <a:buNone/>
+            </a:pPr>
+            <a:r>
+              <a:rPr lang="fr-FR" dirty="0" smtClean="0"/>
+              <a:t>Tout ce que je ne garde pas</a:t>
+            </a:r>
+            <a:endParaRPr lang="fr-FR" dirty="0"/>
+          </a:p>
+        </p:txBody>
+      </p:sp>
+    </p:spTree>
+    <p:extLst>
+      <p:ext uri="{BB962C8B-B14F-4D97-AF65-F5344CB8AC3E}">
+        <p14:creationId xmlns:p14="http://schemas.microsoft.com/office/powerpoint/2010/main" val="1756774745"/>
+      </p:ext>
+    </p:extLst>
+  </p:cSld>
+  <p:clrMapOvr>
+    <a:masterClrMapping/>
+  </p:clrMapOvr>
+  <p:timing>
+    <p:tnLst>
+      <p:par>
+        <p:cTn id="1" dur="indefinite" restart="never" nodeType="tmRoot"/>
+      </p:par>
+    </p:tnLst>
+  </p:timing>
+</p:sld>
+</file>
+
+<file path=ppt/slides/slide12.xml><?xml version="1.0" encoding="utf-8"?>
+<p:sld xmlns:a="http://schemas.openxmlformats.org/drawingml/2006/main" xmlns:r="http://schemas.openxmlformats.org/officeDocument/2006/relationships" xmlns:p="http://schemas.openxmlformats.org/presentationml/2006/main">
+  <p:cSld>
+    <p:spTree>
+      <p:nvGrpSpPr>
+        <p:cNvPr id="1" name=""/>
+        <p:cNvGrpSpPr/>
+        <p:nvPr/>
+      </p:nvGrpSpPr>
+      <p:grpSpPr>
+        <a:xfrm>
+          <a:off x="0" y="0"/>
+          <a:ext cx="0" cy="0"/>
+          <a:chOff x="0" y="0"/>
+          <a:chExt cx="0" cy="0"/>
+        </a:xfrm>
+      </p:grpSpPr>
+      <p:sp>
+        <p:nvSpPr>
+          <p:cNvPr id="2" name="Titre 1"/>
+          <p:cNvSpPr>
+            <a:spLocks noGrp="1"/>
+          </p:cNvSpPr>
+          <p:nvPr>
+            <p:ph type="title"/>
+          </p:nvPr>
+        </p:nvSpPr>
+        <p:spPr/>
+        <p:txBody>
+          <a:bodyPr/>
+          <a:lstStyle/>
+          <a:p>
+            <a:r>
+              <a:rPr lang="fr-FR" dirty="0" smtClean="0"/>
+              <a:t>Résumé de la séquence (20s)</a:t>
+            </a:r>
+            <a:endParaRPr lang="fr-FR" dirty="0"/>
+          </a:p>
+        </p:txBody>
+      </p:sp>
+      <p:sp>
+        <p:nvSpPr>
+          <p:cNvPr id="3" name="Espace réservé du contenu 2"/>
+          <p:cNvSpPr>
+            <a:spLocks noGrp="1"/>
+          </p:cNvSpPr>
+          <p:nvPr>
+            <p:ph idx="1"/>
+          </p:nvPr>
+        </p:nvSpPr>
+        <p:spPr/>
+        <p:txBody>
+          <a:bodyPr/>
+          <a:lstStyle/>
+          <a:p>
+            <a:r>
+              <a:rPr lang="fr-FR" dirty="0"/>
+              <a:t>Mais avant de commencer l’exploration des types de base en python </a:t>
+            </a:r>
+            <a:r>
+              <a:rPr lang="fr-FR" dirty="0" smtClean="0"/>
+              <a:t>j’aimerai introduire </a:t>
+            </a:r>
+            <a:r>
+              <a:rPr lang="fr-FR" dirty="0" smtClean="0"/>
+              <a:t> </a:t>
+            </a:r>
+            <a:r>
+              <a:rPr lang="fr-FR" dirty="0" smtClean="0"/>
+              <a:t>dans cette vidéo 3 notions importantes :  les objets, les variables et le typage dynamique. Dans la prochaine vidéo, nous parlerons des types de bases, et nous finirons avec les techniques de factorisation de code que sont les boucles, les fonctions et les modules</a:t>
+            </a:r>
+          </a:p>
+          <a:p>
+            <a:r>
+              <a:rPr lang="fr-FR" dirty="0" smtClean="0"/>
+              <a:t>À la fin de ces deux vidéos vous connaitrez le minimum pour commencer à jouer avec Python</a:t>
+            </a:r>
+            <a:endParaRPr lang="fr-FR" dirty="0"/>
+          </a:p>
+        </p:txBody>
+      </p:sp>
+      <p:sp>
+        <p:nvSpPr>
+          <p:cNvPr id="4" name="ZoneTexte 3"/>
+          <p:cNvSpPr txBox="1"/>
+          <p:nvPr/>
+        </p:nvSpPr>
+        <p:spPr>
+          <a:xfrm>
+            <a:off x="0" y="92076"/>
+            <a:ext cx="1537855" cy="400110"/>
+          </a:xfrm>
+          <a:prstGeom prst="rect">
+            <a:avLst/>
+          </a:prstGeom>
+          <a:noFill/>
+          <a:ln>
+            <a:solidFill>
+              <a:srgbClr val="FF0000"/>
+            </a:solidFill>
+          </a:ln>
+        </p:spPr>
+        <p:txBody>
+          <a:bodyPr wrap="square" rtlCol="0">
+            <a:spAutoFit/>
+          </a:bodyPr>
+          <a:lstStyle/>
+          <a:p>
+            <a:r>
+              <a:rPr lang="fr-FR" sz="2000" dirty="0" smtClean="0">
+                <a:solidFill>
+                  <a:srgbClr val="FF0000"/>
+                </a:solidFill>
+                <a:latin typeface="Calibri" panose="020F0502020204030204" pitchFamily="34" charset="0"/>
+              </a:rPr>
+              <a:t>prompteur</a:t>
+            </a:r>
+            <a:endParaRPr lang="fr-FR" sz="2000" dirty="0">
+              <a:solidFill>
+                <a:srgbClr val="FF0000"/>
+              </a:solidFill>
+              <a:latin typeface="Calibri" panose="020F0502020204030204" pitchFamily="34" charset="0"/>
+            </a:endParaRPr>
+          </a:p>
+        </p:txBody>
+      </p:sp>
+    </p:spTree>
+    <p:extLst>
+      <p:ext uri="{BB962C8B-B14F-4D97-AF65-F5344CB8AC3E}">
+        <p14:creationId xmlns:p14="http://schemas.microsoft.com/office/powerpoint/2010/main" val="1024385563"/>
+      </p:ext>
+    </p:extLst>
+  </p:cSld>
+  <p:clrMapOvr>
+    <a:masterClrMapping/>
+  </p:clrMapOvr>
+  <p:timing>
+    <p:tnLst>
+      <p:par>
+        <p:cTn id="1" dur="indefinite" restart="never" nodeType="tmRoot"/>
+      </p:par>
+    </p:tnLst>
+  </p:timing>
+</p:sld>
+</file>
+
+<file path=ppt/slides/slide13.xml><?xml version="1.0" encoding="utf-8"?>
+<p:sld xmlns:a="http://schemas.openxmlformats.org/drawingml/2006/main" xmlns:r="http://schemas.openxmlformats.org/officeDocument/2006/relationships" xmlns:p="http://schemas.openxmlformats.org/presentationml/2006/main">
+  <p:cSld>
+    <p:spTree>
+      <p:nvGrpSpPr>
+        <p:cNvPr id="1" name=""/>
+        <p:cNvGrpSpPr/>
+        <p:nvPr/>
+      </p:nvGrpSpPr>
+      <p:grpSpPr>
+        <a:xfrm>
+          <a:off x="0" y="0"/>
+          <a:ext cx="0" cy="0"/>
+          <a:chOff x="0" y="0"/>
+          <a:chExt cx="0" cy="0"/>
+        </a:xfrm>
+      </p:grpSpPr>
+      <p:sp>
+        <p:nvSpPr>
+          <p:cNvPr id="2" name="Titre 1"/>
+          <p:cNvSpPr>
+            <a:spLocks noGrp="1"/>
+          </p:cNvSpPr>
+          <p:nvPr>
+            <p:ph type="title"/>
+          </p:nvPr>
+        </p:nvSpPr>
+        <p:spPr/>
+        <p:txBody>
+          <a:bodyPr/>
+          <a:lstStyle/>
+          <a:p>
+            <a:r>
+              <a:rPr lang="fr-FR" dirty="0"/>
+              <a:t>Résumé de la séquence (27s)</a:t>
+            </a:r>
+          </a:p>
+        </p:txBody>
+      </p:sp>
+      <p:sp>
+        <p:nvSpPr>
+          <p:cNvPr id="3" name="Espace réservé du contenu 2"/>
+          <p:cNvSpPr>
+            <a:spLocks noGrp="1"/>
+          </p:cNvSpPr>
+          <p:nvPr>
+            <p:ph idx="1"/>
+          </p:nvPr>
+        </p:nvSpPr>
+        <p:spPr/>
+        <p:txBody>
+          <a:bodyPr/>
+          <a:lstStyle/>
+          <a:p>
+            <a:r>
+              <a:rPr lang="fr-FR" sz="2800" dirty="0" smtClean="0"/>
+              <a:t>Mais avant de commencer l’exploration des types de base en python, j’aimerais introduire des notions que nous verrons dans les semaines qui suivent. En effet, notre but et de vous permettre, dès cette semaine, de jouer avec Python. Vous avez donc besoin de connaitre certaines notions nécessaire à l’écriture de petits programmes. Je vais présenter dans cette vidéo et la suivante le minimum dont vous aurez besoin cette semaine, on approfondira ensuite chaque notion dans les semaines suivantes jusqu’à une parfaite maitrise des notions introduites aujourd’hui. </a:t>
+            </a:r>
+          </a:p>
+        </p:txBody>
+      </p:sp>
+      <p:sp>
+        <p:nvSpPr>
+          <p:cNvPr id="4" name="ZoneTexte 3"/>
+          <p:cNvSpPr txBox="1"/>
+          <p:nvPr/>
+        </p:nvSpPr>
+        <p:spPr>
+          <a:xfrm>
+            <a:off x="0" y="92076"/>
+            <a:ext cx="1537855" cy="400110"/>
+          </a:xfrm>
+          <a:prstGeom prst="rect">
+            <a:avLst/>
+          </a:prstGeom>
+          <a:noFill/>
+          <a:ln>
+            <a:solidFill>
+              <a:srgbClr val="FF0000"/>
+            </a:solidFill>
+          </a:ln>
+        </p:spPr>
+        <p:txBody>
+          <a:bodyPr wrap="square" rtlCol="0">
+            <a:spAutoFit/>
+          </a:bodyPr>
+          <a:lstStyle/>
+          <a:p>
+            <a:r>
+              <a:rPr lang="fr-FR" sz="2000" dirty="0" smtClean="0">
+                <a:solidFill>
+                  <a:srgbClr val="FF0000"/>
+                </a:solidFill>
+                <a:latin typeface="Calibri" panose="020F0502020204030204" pitchFamily="34" charset="0"/>
+              </a:rPr>
+              <a:t>prompteur</a:t>
+            </a:r>
+            <a:endParaRPr lang="fr-FR" sz="2000" dirty="0">
+              <a:solidFill>
+                <a:srgbClr val="FF0000"/>
+              </a:solidFill>
+              <a:latin typeface="Calibri" panose="020F0502020204030204" pitchFamily="34" charset="0"/>
+            </a:endParaRPr>
+          </a:p>
+        </p:txBody>
+      </p:sp>
+    </p:spTree>
+    <p:extLst>
+      <p:ext uri="{BB962C8B-B14F-4D97-AF65-F5344CB8AC3E}">
+        <p14:creationId xmlns:p14="http://schemas.microsoft.com/office/powerpoint/2010/main" val="2838327625"/>
+      </p:ext>
+    </p:extLst>
+  </p:cSld>
+  <p:clrMapOvr>
+    <a:masterClrMapping/>
+  </p:clrMapOvr>
+  <p:timing>
+    <p:tnLst>
+      <p:par>
+        <p:cTn id="1" dur="indefinite" restart="never" nodeType="tmRoot"/>
+      </p:par>
+    </p:tnLst>
+  </p:timing>
+</p:sld>
+</file>
+
+<file path=ppt/slides/slide2.xml><?xml version="1.0" encoding="utf-8"?>
+<p:sld xmlns:a="http://schemas.openxmlformats.org/drawingml/2006/main" xmlns:r="http://schemas.openxmlformats.org/officeDocument/2006/relationships" xmlns:p="http://schemas.openxmlformats.org/presentationml/2006/main">
+  <p:cSld>
+    <p:spTree>
+      <p:nvGrpSpPr>
+        <p:cNvPr id="1" name=""/>
+        <p:cNvGrpSpPr/>
+        <p:nvPr/>
+      </p:nvGrpSpPr>
+      <p:grpSpPr>
+        <a:xfrm>
+          <a:off x="0" y="0"/>
+          <a:ext cx="0" cy="0"/>
+          <a:chOff x="0" y="0"/>
+          <a:chExt cx="0" cy="0"/>
+        </a:xfrm>
+      </p:grpSpPr>
+      <p:sp>
+        <p:nvSpPr>
+          <p:cNvPr id="2" name="Titre 1"/>
+          <p:cNvSpPr>
+            <a:spLocks noGrp="1"/>
+          </p:cNvSpPr>
+          <p:nvPr>
+            <p:ph type="title"/>
+          </p:nvPr>
+        </p:nvSpPr>
+        <p:spPr/>
+        <p:txBody>
+          <a:bodyPr/>
+          <a:lstStyle/>
+          <a:p>
+            <a:r>
+              <a:rPr lang="fr-FR" dirty="0" smtClean="0"/>
+              <a:t>Résumé de la séquence (20s)</a:t>
+            </a:r>
+            <a:endParaRPr lang="fr-FR" dirty="0"/>
+          </a:p>
+        </p:txBody>
+      </p:sp>
+      <p:sp>
+        <p:nvSpPr>
+          <p:cNvPr id="3" name="Espace réservé du contenu 2"/>
+          <p:cNvSpPr>
+            <a:spLocks noGrp="1"/>
+          </p:cNvSpPr>
+          <p:nvPr>
+            <p:ph idx="1"/>
+          </p:nvPr>
+        </p:nvSpPr>
+        <p:spPr/>
+        <p:txBody>
+          <a:bodyPr/>
+          <a:lstStyle/>
+          <a:p>
+            <a:r>
+              <a:rPr lang="fr-FR" dirty="0" smtClean="0"/>
+              <a:t>Dans cette vidéo je vais introduire les </a:t>
+            </a:r>
+            <a:r>
+              <a:rPr lang="fr-FR" dirty="0" smtClean="0"/>
+              <a:t>notions d’objets</a:t>
+            </a:r>
+            <a:r>
+              <a:rPr lang="fr-FR" dirty="0" smtClean="0"/>
+              <a:t>, </a:t>
+            </a:r>
+            <a:r>
+              <a:rPr lang="fr-FR" dirty="0" smtClean="0"/>
+              <a:t>de</a:t>
+            </a:r>
+            <a:r>
+              <a:rPr lang="fr-FR" dirty="0" smtClean="0"/>
+              <a:t> </a:t>
+            </a:r>
+            <a:r>
+              <a:rPr lang="fr-FR" dirty="0" smtClean="0"/>
+              <a:t>variables et </a:t>
+            </a:r>
+            <a:r>
+              <a:rPr lang="fr-FR" dirty="0"/>
+              <a:t>d</a:t>
+            </a:r>
+            <a:r>
+              <a:rPr lang="fr-FR" dirty="0" smtClean="0"/>
+              <a:t>e </a:t>
+            </a:r>
+            <a:r>
+              <a:rPr lang="fr-FR" dirty="0" smtClean="0"/>
+              <a:t>typage dynamique. </a:t>
+            </a:r>
+            <a:endParaRPr lang="fr-FR" dirty="0"/>
+          </a:p>
+        </p:txBody>
+      </p:sp>
+      <p:sp>
+        <p:nvSpPr>
+          <p:cNvPr id="4" name="ZoneTexte 3"/>
+          <p:cNvSpPr txBox="1"/>
+          <p:nvPr/>
+        </p:nvSpPr>
+        <p:spPr>
+          <a:xfrm>
+            <a:off x="0" y="92076"/>
+            <a:ext cx="1537855" cy="400110"/>
+          </a:xfrm>
+          <a:prstGeom prst="rect">
+            <a:avLst/>
+          </a:prstGeom>
+          <a:noFill/>
+          <a:ln>
+            <a:solidFill>
+              <a:srgbClr val="FF0000"/>
+            </a:solidFill>
+          </a:ln>
+        </p:spPr>
+        <p:txBody>
+          <a:bodyPr wrap="square" rtlCol="0">
+            <a:spAutoFit/>
+          </a:bodyPr>
+          <a:lstStyle/>
+          <a:p>
+            <a:r>
+              <a:rPr lang="fr-FR" sz="2000" dirty="0" smtClean="0">
+                <a:solidFill>
+                  <a:srgbClr val="FF0000"/>
+                </a:solidFill>
+                <a:latin typeface="Calibri" panose="020F0502020204030204" pitchFamily="34" charset="0"/>
+              </a:rPr>
+              <a:t>prompteur</a:t>
+            </a:r>
+            <a:endParaRPr lang="fr-FR" sz="2000" dirty="0">
+              <a:solidFill>
+                <a:srgbClr val="FF0000"/>
+              </a:solidFill>
+              <a:latin typeface="Calibri" panose="020F0502020204030204" pitchFamily="34" charset="0"/>
+            </a:endParaRPr>
+          </a:p>
+        </p:txBody>
+      </p:sp>
+    </p:spTree>
+    <p:extLst>
+      <p:ext uri="{BB962C8B-B14F-4D97-AF65-F5344CB8AC3E}">
+        <p14:creationId xmlns:p14="http://schemas.microsoft.com/office/powerpoint/2010/main" val="3367709972"/>
+      </p:ext>
+    </p:extLst>
+  </p:cSld>
+  <p:clrMapOvr>
+    <a:masterClrMapping/>
+  </p:clrMapOvr>
+  <p:timing>
+    <p:tnLst>
+      <p:par>
+        <p:cTn id="1" dur="indefinite" restart="never" nodeType="tmRoot"/>
+      </p:par>
+    </p:tnLst>
+  </p:timing>
+</p:sld>
+</file>
+
+<file path=ppt/slides/slide3.xml><?xml version="1.0" encoding="utf-8"?>
+<p:sld xmlns:a="http://schemas.openxmlformats.org/drawingml/2006/main" xmlns:r="http://schemas.openxmlformats.org/officeDocument/2006/relationships" xmlns:p="http://schemas.openxmlformats.org/presentationml/2006/main">
+  <p:cSld>
+    <p:spTree>
+      <p:nvGrpSpPr>
+        <p:cNvPr id="1" name=""/>
+        <p:cNvGrpSpPr/>
+        <p:nvPr/>
+      </p:nvGrpSpPr>
+      <p:grpSpPr>
+        <a:xfrm>
+          <a:off x="0" y="0"/>
+          <a:ext cx="0" cy="0"/>
+          <a:chOff x="0" y="0"/>
+          <a:chExt cx="0" cy="0"/>
+        </a:xfrm>
+      </p:grpSpPr>
+      <p:sp>
+        <p:nvSpPr>
+          <p:cNvPr id="2" name="Titre 1"/>
+          <p:cNvSpPr>
+            <a:spLocks noGrp="1"/>
+          </p:cNvSpPr>
+          <p:nvPr>
+            <p:ph type="title"/>
+          </p:nvPr>
+        </p:nvSpPr>
+        <p:spPr/>
+        <p:txBody>
+          <a:bodyPr/>
+          <a:lstStyle/>
+          <a:p>
+            <a:r>
+              <a:rPr lang="fr-FR" dirty="0" smtClean="0"/>
+              <a:t>Définition d’un objet(27s)</a:t>
+            </a:r>
+            <a:endParaRPr lang="fr-FR" dirty="0"/>
+          </a:p>
+        </p:txBody>
+      </p:sp>
+      <p:sp>
+        <p:nvSpPr>
+          <p:cNvPr id="3" name="Espace réservé du contenu 2"/>
+          <p:cNvSpPr>
+            <a:spLocks noGrp="1"/>
+          </p:cNvSpPr>
+          <p:nvPr>
+            <p:ph idx="1"/>
+          </p:nvPr>
+        </p:nvSpPr>
+        <p:spPr/>
+        <p:txBody>
+          <a:bodyPr/>
+          <a:lstStyle/>
+          <a:p>
+            <a:r>
+              <a:rPr lang="fr-FR" sz="2800" dirty="0" smtClean="0"/>
+              <a:t>Commençons par la </a:t>
+            </a:r>
+            <a:r>
+              <a:rPr lang="fr-FR" sz="2800" dirty="0" smtClean="0"/>
+              <a:t>notion d’objet. En informatique, un objet est un morceau de programme qui peut stocker de l’information et qui a un ensemble de mécanismes, que l’on appelle méthodes, qui permettent d’effectuer des taches. Le type de l’objet va définir les informations et les méthodes qui existent par défaut à la création de l’objet. Regardons maintenant un exemple de création d’objet…</a:t>
+            </a:r>
+            <a:endParaRPr lang="fr-FR" sz="2800" dirty="0"/>
+          </a:p>
+        </p:txBody>
+      </p:sp>
+      <p:sp>
+        <p:nvSpPr>
+          <p:cNvPr id="4" name="ZoneTexte 3"/>
+          <p:cNvSpPr txBox="1"/>
+          <p:nvPr/>
+        </p:nvSpPr>
+        <p:spPr>
+          <a:xfrm>
+            <a:off x="0" y="92076"/>
+            <a:ext cx="1537855" cy="400110"/>
+          </a:xfrm>
+          <a:prstGeom prst="rect">
+            <a:avLst/>
+          </a:prstGeom>
+          <a:noFill/>
+          <a:ln>
+            <a:solidFill>
+              <a:srgbClr val="FF0000"/>
+            </a:solidFill>
+          </a:ln>
+        </p:spPr>
+        <p:txBody>
+          <a:bodyPr wrap="square" rtlCol="0">
+            <a:spAutoFit/>
+          </a:bodyPr>
+          <a:lstStyle/>
+          <a:p>
+            <a:r>
+              <a:rPr lang="fr-FR" sz="2000" dirty="0" smtClean="0">
+                <a:solidFill>
+                  <a:srgbClr val="FF0000"/>
+                </a:solidFill>
+                <a:latin typeface="Calibri" panose="020F0502020204030204" pitchFamily="34" charset="0"/>
+              </a:rPr>
+              <a:t>prompteur</a:t>
+            </a:r>
+            <a:endParaRPr lang="fr-FR" sz="2000" dirty="0">
+              <a:solidFill>
+                <a:srgbClr val="FF0000"/>
+              </a:solidFill>
+              <a:latin typeface="Calibri" panose="020F0502020204030204" pitchFamily="34" charset="0"/>
+            </a:endParaRPr>
+          </a:p>
+        </p:txBody>
+      </p:sp>
+    </p:spTree>
+    <p:extLst>
+      <p:ext uri="{BB962C8B-B14F-4D97-AF65-F5344CB8AC3E}">
+        <p14:creationId xmlns:p14="http://schemas.microsoft.com/office/powerpoint/2010/main" val="3871509048"/>
+      </p:ext>
+    </p:extLst>
+  </p:cSld>
+  <p:clrMapOvr>
+    <a:masterClrMapping/>
+  </p:clrMapOvr>
+  <p:timing>
+    <p:tnLst>
+      <p:par>
+        <p:cTn id="1" dur="indefinite" restart="never" nodeType="tmRoot"/>
+      </p:par>
+    </p:tnLst>
+  </p:timing>
+</p:sld>
+</file>
+
+<file path=ppt/slides/slide4.xml><?xml version="1.0" encoding="utf-8"?>
+<p:sld xmlns:a="http://schemas.openxmlformats.org/drawingml/2006/main" xmlns:r="http://schemas.openxmlformats.org/officeDocument/2006/relationships" xmlns:p="http://schemas.openxmlformats.org/presentationml/2006/main">
+  <p:cSld>
+    <p:spTree>
+      <p:nvGrpSpPr>
+        <p:cNvPr id="1" name=""/>
+        <p:cNvGrpSpPr/>
+        <p:nvPr/>
+      </p:nvGrpSpPr>
+      <p:grpSpPr>
+        <a:xfrm>
+          <a:off x="0" y="0"/>
+          <a:ext cx="0" cy="0"/>
+          <a:chOff x="0" y="0"/>
+          <a:chExt cx="0" cy="0"/>
+        </a:xfrm>
+      </p:grpSpPr>
+      <p:sp>
+        <p:nvSpPr>
+          <p:cNvPr id="5" name="Rectangle 4"/>
           <p:cNvSpPr/>
           <p:nvPr/>
         </p:nvSpPr>
         <p:spPr bwMode="auto">
           <a:xfrm>
-            <a:off x="4622800" y="2379784"/>
-            <a:ext cx="3548185" cy="3948335"/>
+            <a:off x="984738" y="917331"/>
+            <a:ext cx="2510693" cy="2184400"/>
           </a:xfrm>
           <a:prstGeom prst="rect">
             <a:avLst/>
@@ -5517,7 +6169,7 @@
           <a:noFill/>
           <a:ln w="38100" cap="flat" cmpd="sng" algn="ctr">
             <a:solidFill>
-              <a:schemeClr val="tx1"/>
+              <a:srgbClr val="FF0000"/>
             </a:solidFill>
             <a:prstDash val="solid"/>
             <a:round/>
@@ -5566,14 +6218,68 @@
       </p:sp>
       <p:sp>
         <p:nvSpPr>
-          <p:cNvPr id="6" name="ZoneTexte 5"/>
+          <p:cNvPr id="3" name="ZoneTexte 2"/>
           <p:cNvSpPr txBox="1"/>
           <p:nvPr/>
         </p:nvSpPr>
         <p:spPr>
           <a:xfrm>
-            <a:off x="5188527" y="1456454"/>
-            <a:ext cx="3454400" cy="923330"/>
+            <a:off x="855785" y="4466492"/>
+            <a:ext cx="7514492" cy="830997"/>
+          </a:xfrm>
+          <a:prstGeom prst="rect">
+            <a:avLst/>
+          </a:prstGeom>
+          <a:solidFill>
+            <a:schemeClr val="bg1"/>
+          </a:solidFill>
+        </p:spPr>
+        <p:txBody>
+          <a:bodyPr wrap="square" rtlCol="0">
+            <a:spAutoFit/>
+          </a:bodyPr>
+          <a:lstStyle/>
+          <a:p>
+            <a:r>
+              <a:rPr lang="fr-FR" dirty="0" smtClean="0">
+                <a:latin typeface="Courier New" panose="02070309020205020404" pitchFamily="49" charset="0"/>
+                <a:cs typeface="Courier New" panose="02070309020205020404" pitchFamily="49" charset="0"/>
+              </a:rPr>
+              <a:t>'spam'.</a:t>
+            </a:r>
+            <a:r>
+              <a:rPr lang="fr-FR" dirty="0" err="1" smtClean="0">
+                <a:latin typeface="Courier New" panose="02070309020205020404" pitchFamily="49" charset="0"/>
+                <a:cs typeface="Courier New" panose="02070309020205020404" pitchFamily="49" charset="0"/>
+              </a:rPr>
+              <a:t>upper</a:t>
+            </a:r>
+            <a:r>
+              <a:rPr lang="fr-FR" dirty="0">
+                <a:latin typeface="Courier New" panose="02070309020205020404" pitchFamily="49" charset="0"/>
+                <a:cs typeface="Courier New" panose="02070309020205020404" pitchFamily="49" charset="0"/>
+              </a:rPr>
+              <a:t>()</a:t>
+            </a:r>
+          </a:p>
+          <a:p>
+            <a:endParaRPr lang="fr-FR" dirty="0">
+              <a:latin typeface="Courier New" panose="02070309020205020404" pitchFamily="49" charset="0"/>
+              <a:cs typeface="Courier New" panose="02070309020205020404" pitchFamily="49" charset="0"/>
+            </a:endParaRPr>
+          </a:p>
+        </p:txBody>
+      </p:sp>
+      <p:sp>
+        <p:nvSpPr>
+          <p:cNvPr id="10" name="ZoneTexte 9"/>
+          <p:cNvSpPr txBox="1"/>
+          <p:nvPr/>
+        </p:nvSpPr>
+        <p:spPr>
+          <a:xfrm>
+            <a:off x="984738" y="351550"/>
+            <a:ext cx="5061438" cy="461665"/>
           </a:xfrm>
           <a:prstGeom prst="rect">
             <a:avLst/>
@@ -5587,12 +6293,12 @@
           <a:lstStyle/>
           <a:p>
             <a:r>
-              <a:rPr lang="fr-FR" sz="5400" dirty="0" smtClean="0">
+              <a:rPr lang="fr-FR" dirty="0" smtClean="0">
                 <a:latin typeface="Calibri" panose="020F0502020204030204" pitchFamily="34" charset="0"/>
               </a:rPr>
-              <a:t>objets</a:t>
-            </a:r>
-            <a:endParaRPr lang="fr-FR" sz="5400" dirty="0">
+              <a:t>Objet de type chaîne de caractères</a:t>
+            </a:r>
+            <a:endParaRPr lang="fr-FR" dirty="0">
               <a:latin typeface="Calibri" panose="020F0502020204030204" pitchFamily="34" charset="0"/>
             </a:endParaRPr>
           </a:p>
@@ -5600,13 +6306,1161 @@
       </p:sp>
       <p:sp>
         <p:nvSpPr>
-          <p:cNvPr id="5" name="Rectangle 4"/>
+          <p:cNvPr id="13" name="ZoneTexte 12"/>
+          <p:cNvSpPr txBox="1"/>
+          <p:nvPr/>
+        </p:nvSpPr>
+        <p:spPr>
+          <a:xfrm>
+            <a:off x="1069730" y="1080239"/>
+            <a:ext cx="2341684" cy="830997"/>
+          </a:xfrm>
+          <a:prstGeom prst="rect">
+            <a:avLst/>
+          </a:prstGeom>
+          <a:noFill/>
+        </p:spPr>
+        <p:txBody>
+          <a:bodyPr wrap="square" rtlCol="0">
+            <a:spAutoFit/>
+          </a:bodyPr>
+          <a:lstStyle/>
+          <a:p>
+            <a:r>
+              <a:rPr lang="fr-FR" u="sng" dirty="0" smtClean="0">
+                <a:latin typeface="Calibri" panose="020F0502020204030204" pitchFamily="34" charset="0"/>
+              </a:rPr>
+              <a:t>Information:</a:t>
+            </a:r>
+          </a:p>
+          <a:p>
+            <a:r>
+              <a:rPr lang="fr-FR" dirty="0" smtClean="0">
+                <a:latin typeface="Calibri" panose="020F0502020204030204" pitchFamily="34" charset="0"/>
+              </a:rPr>
+              <a:t>'spam'</a:t>
+            </a:r>
+            <a:endParaRPr lang="fr-FR" dirty="0">
+              <a:latin typeface="Calibri" panose="020F0502020204030204" pitchFamily="34" charset="0"/>
+            </a:endParaRPr>
+          </a:p>
+        </p:txBody>
+      </p:sp>
+      <p:sp>
+        <p:nvSpPr>
+          <p:cNvPr id="14" name="ZoneTexte 13"/>
+          <p:cNvSpPr txBox="1"/>
+          <p:nvPr/>
+        </p:nvSpPr>
+        <p:spPr>
+          <a:xfrm>
+            <a:off x="1069242" y="1875119"/>
+            <a:ext cx="2341684" cy="1200329"/>
+          </a:xfrm>
+          <a:prstGeom prst="rect">
+            <a:avLst/>
+          </a:prstGeom>
+          <a:noFill/>
+        </p:spPr>
+        <p:txBody>
+          <a:bodyPr wrap="square" rtlCol="0">
+            <a:spAutoFit/>
+          </a:bodyPr>
+          <a:lstStyle/>
+          <a:p>
+            <a:r>
+              <a:rPr lang="fr-FR" u="sng" dirty="0" smtClean="0">
+                <a:latin typeface="Calibri" panose="020F0502020204030204" pitchFamily="34" charset="0"/>
+              </a:rPr>
+              <a:t>Méthodes</a:t>
+            </a:r>
+            <a:r>
+              <a:rPr lang="fr-FR" dirty="0" smtClean="0">
+                <a:latin typeface="Calibri" panose="020F0502020204030204" pitchFamily="34" charset="0"/>
+              </a:rPr>
+              <a:t>:</a:t>
+            </a:r>
+          </a:p>
+          <a:p>
+            <a:r>
+              <a:rPr lang="fr-FR" dirty="0" smtClean="0">
+                <a:latin typeface="Calibri" panose="020F0502020204030204" pitchFamily="34" charset="0"/>
+              </a:rPr>
+              <a:t>…</a:t>
+            </a:r>
+          </a:p>
+          <a:p>
+            <a:r>
+              <a:rPr lang="fr-FR" dirty="0" err="1" smtClean="0">
+                <a:latin typeface="Calibri" panose="020F0502020204030204" pitchFamily="34" charset="0"/>
+              </a:rPr>
+              <a:t>upper</a:t>
+            </a:r>
+            <a:r>
+              <a:rPr lang="fr-FR" dirty="0" smtClean="0">
+                <a:latin typeface="Calibri" panose="020F0502020204030204" pitchFamily="34" charset="0"/>
+              </a:rPr>
+              <a:t>()</a:t>
+            </a:r>
+            <a:endParaRPr lang="fr-FR" dirty="0">
+              <a:latin typeface="Calibri" panose="020F0502020204030204" pitchFamily="34" charset="0"/>
+            </a:endParaRPr>
+          </a:p>
+        </p:txBody>
+      </p:sp>
+      <p:cxnSp>
+        <p:nvCxnSpPr>
+          <p:cNvPr id="16" name="Connecteur droit avec flèche 15"/>
+          <p:cNvCxnSpPr/>
+          <p:nvPr/>
+        </p:nvCxnSpPr>
+        <p:spPr bwMode="auto">
+          <a:xfrm flipH="1">
+            <a:off x="2145323" y="4214445"/>
+            <a:ext cx="386862" cy="504093"/>
+          </a:xfrm>
+          <a:prstGeom prst="straightConnector1">
+            <a:avLst/>
+          </a:prstGeom>
+          <a:noFill/>
+          <a:ln w="53975" cap="flat" cmpd="sng" algn="ctr">
+            <a:solidFill>
+              <a:srgbClr val="FF0000"/>
+            </a:solidFill>
+            <a:prstDash val="solid"/>
+            <a:round/>
+            <a:headEnd type="none" w="med" len="med"/>
+            <a:tailEnd type="triangle" w="med" len="med"/>
+          </a:ln>
+          <a:effectLst/>
+        </p:spPr>
+      </p:cxnSp>
+      <p:sp>
+        <p:nvSpPr>
+          <p:cNvPr id="17" name="ZoneTexte 16"/>
+          <p:cNvSpPr txBox="1"/>
+          <p:nvPr/>
+        </p:nvSpPr>
+        <p:spPr>
+          <a:xfrm>
+            <a:off x="855785" y="4466491"/>
+            <a:ext cx="7514492" cy="830997"/>
+          </a:xfrm>
+          <a:prstGeom prst="rect">
+            <a:avLst/>
+          </a:prstGeom>
+          <a:noFill/>
+        </p:spPr>
+        <p:txBody>
+          <a:bodyPr wrap="square" rtlCol="0">
+            <a:spAutoFit/>
+          </a:bodyPr>
+          <a:lstStyle/>
+          <a:p>
+            <a:r>
+              <a:rPr lang="fr-FR" dirty="0" smtClean="0">
+                <a:latin typeface="Courier New" panose="02070309020205020404" pitchFamily="49" charset="0"/>
+                <a:cs typeface="Courier New" panose="02070309020205020404" pitchFamily="49" charset="0"/>
+              </a:rPr>
+              <a:t>'spam'</a:t>
+            </a:r>
+            <a:endParaRPr lang="fr-FR" dirty="0">
+              <a:latin typeface="Courier New" panose="02070309020205020404" pitchFamily="49" charset="0"/>
+              <a:cs typeface="Courier New" panose="02070309020205020404" pitchFamily="49" charset="0"/>
+            </a:endParaRPr>
+          </a:p>
+          <a:p>
+            <a:endParaRPr lang="fr-FR" dirty="0">
+              <a:latin typeface="Courier New" panose="02070309020205020404" pitchFamily="49" charset="0"/>
+              <a:cs typeface="Courier New" panose="02070309020205020404" pitchFamily="49" charset="0"/>
+            </a:endParaRPr>
+          </a:p>
+        </p:txBody>
+      </p:sp>
+      <p:sp>
+        <p:nvSpPr>
+          <p:cNvPr id="18" name="ZoneTexte 17"/>
+          <p:cNvSpPr txBox="1"/>
+          <p:nvPr/>
+        </p:nvSpPr>
+        <p:spPr>
+          <a:xfrm>
+            <a:off x="855785" y="5000255"/>
+            <a:ext cx="7514492" cy="830997"/>
+          </a:xfrm>
+          <a:prstGeom prst="rect">
+            <a:avLst/>
+          </a:prstGeom>
+          <a:noFill/>
+        </p:spPr>
+        <p:txBody>
+          <a:bodyPr wrap="square" rtlCol="0">
+            <a:spAutoFit/>
+          </a:bodyPr>
+          <a:lstStyle/>
+          <a:p>
+            <a:r>
+              <a:rPr lang="fr-FR" dirty="0" smtClean="0">
+                <a:latin typeface="Courier New" panose="02070309020205020404" pitchFamily="49" charset="0"/>
+                <a:cs typeface="Courier New" panose="02070309020205020404" pitchFamily="49" charset="0"/>
+              </a:rPr>
+              <a:t>'SPAM'</a:t>
+            </a:r>
+            <a:endParaRPr lang="fr-FR" dirty="0">
+              <a:latin typeface="Courier New" panose="02070309020205020404" pitchFamily="49" charset="0"/>
+              <a:cs typeface="Courier New" panose="02070309020205020404" pitchFamily="49" charset="0"/>
+            </a:endParaRPr>
+          </a:p>
+          <a:p>
+            <a:endParaRPr lang="fr-FR" dirty="0">
+              <a:latin typeface="Courier New" panose="02070309020205020404" pitchFamily="49" charset="0"/>
+              <a:cs typeface="Courier New" panose="02070309020205020404" pitchFamily="49" charset="0"/>
+            </a:endParaRPr>
+          </a:p>
+        </p:txBody>
+      </p:sp>
+    </p:spTree>
+    <p:extLst>
+      <p:ext uri="{BB962C8B-B14F-4D97-AF65-F5344CB8AC3E}">
+        <p14:creationId xmlns:p14="http://schemas.microsoft.com/office/powerpoint/2010/main" val="3072409533"/>
+      </p:ext>
+    </p:extLst>
+  </p:cSld>
+  <p:clrMapOvr>
+    <a:masterClrMapping/>
+  </p:clrMapOvr>
+  <p:timing>
+    <p:tnLst>
+      <p:par>
+        <p:cTn id="1" dur="indefinite" restart="never" nodeType="tmRoot">
+          <p:childTnLst>
+            <p:seq concurrent="1" nextAc="seek">
+              <p:cTn id="2" dur="indefinite" nodeType="mainSeq">
+                <p:childTnLst>
+                  <p:par>
+                    <p:cTn id="3" fill="hold">
+                      <p:stCondLst>
+                        <p:cond delay="indefinite"/>
+                      </p:stCondLst>
+                      <p:childTnLst>
+                        <p:par>
+                          <p:cTn id="4" fill="hold">
+                            <p:stCondLst>
+                              <p:cond delay="0"/>
+                            </p:stCondLst>
+                            <p:childTnLst>
+                              <p:par>
+                                <p:cTn id="5" presetID="10" presetClass="entr" presetSubtype="0" fill="hold" grpId="0" nodeType="clickEffect">
+                                  <p:stCondLst>
+                                    <p:cond delay="0"/>
+                                  </p:stCondLst>
+                                  <p:childTnLst>
+                                    <p:set>
+                                      <p:cBhvr>
+                                        <p:cTn id="6" dur="1" fill="hold">
+                                          <p:stCondLst>
+                                            <p:cond delay="0"/>
+                                          </p:stCondLst>
+                                        </p:cTn>
+                                        <p:tgtEl>
+                                          <p:spTgt spid="17"/>
+                                        </p:tgtEl>
+                                        <p:attrNameLst>
+                                          <p:attrName>style.visibility</p:attrName>
+                                        </p:attrNameLst>
+                                      </p:cBhvr>
+                                      <p:to>
+                                        <p:strVal val="visible"/>
+                                      </p:to>
+                                    </p:set>
+                                    <p:animEffect transition="in" filter="fade">
+                                      <p:cBhvr>
+                                        <p:cTn id="7" dur="500"/>
+                                        <p:tgtEl>
+                                          <p:spTgt spid="17"/>
+                                        </p:tgtEl>
+                                      </p:cBhvr>
+                                    </p:animEffect>
+                                  </p:childTnLst>
+                                </p:cTn>
+                              </p:par>
+                            </p:childTnLst>
+                          </p:cTn>
+                        </p:par>
+                      </p:childTnLst>
+                    </p:cTn>
+                  </p:par>
+                  <p:par>
+                    <p:cTn id="8" fill="hold">
+                      <p:stCondLst>
+                        <p:cond delay="indefinite"/>
+                      </p:stCondLst>
+                      <p:childTnLst>
+                        <p:par>
+                          <p:cTn id="9" fill="hold">
+                            <p:stCondLst>
+                              <p:cond delay="0"/>
+                            </p:stCondLst>
+                            <p:childTnLst>
+                              <p:par>
+                                <p:cTn id="10" presetID="10" presetClass="entr" presetSubtype="0" fill="hold" grpId="0" nodeType="clickEffect">
+                                  <p:stCondLst>
+                                    <p:cond delay="0"/>
+                                  </p:stCondLst>
+                                  <p:childTnLst>
+                                    <p:set>
+                                      <p:cBhvr>
+                                        <p:cTn id="11" dur="1" fill="hold">
+                                          <p:stCondLst>
+                                            <p:cond delay="0"/>
+                                          </p:stCondLst>
+                                        </p:cTn>
+                                        <p:tgtEl>
+                                          <p:spTgt spid="5"/>
+                                        </p:tgtEl>
+                                        <p:attrNameLst>
+                                          <p:attrName>style.visibility</p:attrName>
+                                        </p:attrNameLst>
+                                      </p:cBhvr>
+                                      <p:to>
+                                        <p:strVal val="visible"/>
+                                      </p:to>
+                                    </p:set>
+                                    <p:animEffect transition="in" filter="fade">
+                                      <p:cBhvr>
+                                        <p:cTn id="12" dur="500"/>
+                                        <p:tgtEl>
+                                          <p:spTgt spid="5"/>
+                                        </p:tgtEl>
+                                      </p:cBhvr>
+                                    </p:animEffect>
+                                  </p:childTnLst>
+                                </p:cTn>
+                              </p:par>
+                              <p:par>
+                                <p:cTn id="13" presetID="10" presetClass="entr" presetSubtype="0" fill="hold" grpId="0" nodeType="withEffect">
+                                  <p:stCondLst>
+                                    <p:cond delay="0"/>
+                                  </p:stCondLst>
+                                  <p:childTnLst>
+                                    <p:set>
+                                      <p:cBhvr>
+                                        <p:cTn id="14" dur="1" fill="hold">
+                                          <p:stCondLst>
+                                            <p:cond delay="0"/>
+                                          </p:stCondLst>
+                                        </p:cTn>
+                                        <p:tgtEl>
+                                          <p:spTgt spid="10"/>
+                                        </p:tgtEl>
+                                        <p:attrNameLst>
+                                          <p:attrName>style.visibility</p:attrName>
+                                        </p:attrNameLst>
+                                      </p:cBhvr>
+                                      <p:to>
+                                        <p:strVal val="visible"/>
+                                      </p:to>
+                                    </p:set>
+                                    <p:animEffect transition="in" filter="fade">
+                                      <p:cBhvr>
+                                        <p:cTn id="15" dur="500"/>
+                                        <p:tgtEl>
+                                          <p:spTgt spid="10"/>
+                                        </p:tgtEl>
+                                      </p:cBhvr>
+                                    </p:animEffect>
+                                  </p:childTnLst>
+                                </p:cTn>
+                              </p:par>
+                              <p:par>
+                                <p:cTn id="16" presetID="10" presetClass="entr" presetSubtype="0" fill="hold" grpId="0" nodeType="withEffect">
+                                  <p:stCondLst>
+                                    <p:cond delay="0"/>
+                                  </p:stCondLst>
+                                  <p:childTnLst>
+                                    <p:set>
+                                      <p:cBhvr>
+                                        <p:cTn id="17" dur="1" fill="hold">
+                                          <p:stCondLst>
+                                            <p:cond delay="0"/>
+                                          </p:stCondLst>
+                                        </p:cTn>
+                                        <p:tgtEl>
+                                          <p:spTgt spid="13"/>
+                                        </p:tgtEl>
+                                        <p:attrNameLst>
+                                          <p:attrName>style.visibility</p:attrName>
+                                        </p:attrNameLst>
+                                      </p:cBhvr>
+                                      <p:to>
+                                        <p:strVal val="visible"/>
+                                      </p:to>
+                                    </p:set>
+                                    <p:animEffect transition="in" filter="fade">
+                                      <p:cBhvr>
+                                        <p:cTn id="18" dur="500"/>
+                                        <p:tgtEl>
+                                          <p:spTgt spid="13"/>
+                                        </p:tgtEl>
+                                      </p:cBhvr>
+                                    </p:animEffect>
+                                  </p:childTnLst>
+                                </p:cTn>
+                              </p:par>
+                              <p:par>
+                                <p:cTn id="19" presetID="10" presetClass="entr" presetSubtype="0" fill="hold" grpId="0" nodeType="withEffect">
+                                  <p:stCondLst>
+                                    <p:cond delay="0"/>
+                                  </p:stCondLst>
+                                  <p:childTnLst>
+                                    <p:set>
+                                      <p:cBhvr>
+                                        <p:cTn id="20" dur="1" fill="hold">
+                                          <p:stCondLst>
+                                            <p:cond delay="0"/>
+                                          </p:stCondLst>
+                                        </p:cTn>
+                                        <p:tgtEl>
+                                          <p:spTgt spid="14"/>
+                                        </p:tgtEl>
+                                        <p:attrNameLst>
+                                          <p:attrName>style.visibility</p:attrName>
+                                        </p:attrNameLst>
+                                      </p:cBhvr>
+                                      <p:to>
+                                        <p:strVal val="visible"/>
+                                      </p:to>
+                                    </p:set>
+                                    <p:animEffect transition="in" filter="fade">
+                                      <p:cBhvr>
+                                        <p:cTn id="21" dur="500"/>
+                                        <p:tgtEl>
+                                          <p:spTgt spid="14"/>
+                                        </p:tgtEl>
+                                      </p:cBhvr>
+                                    </p:animEffect>
+                                  </p:childTnLst>
+                                </p:cTn>
+                              </p:par>
+                            </p:childTnLst>
+                          </p:cTn>
+                        </p:par>
+                      </p:childTnLst>
+                    </p:cTn>
+                  </p:par>
+                  <p:par>
+                    <p:cTn id="22" fill="hold">
+                      <p:stCondLst>
+                        <p:cond delay="indefinite"/>
+                      </p:stCondLst>
+                      <p:childTnLst>
+                        <p:par>
+                          <p:cTn id="23" fill="hold">
+                            <p:stCondLst>
+                              <p:cond delay="0"/>
+                            </p:stCondLst>
+                            <p:childTnLst>
+                              <p:par>
+                                <p:cTn id="24" presetID="10" presetClass="entr" presetSubtype="0" fill="hold" nodeType="clickEffect">
+                                  <p:stCondLst>
+                                    <p:cond delay="0"/>
+                                  </p:stCondLst>
+                                  <p:childTnLst>
+                                    <p:set>
+                                      <p:cBhvr>
+                                        <p:cTn id="25" dur="1" fill="hold">
+                                          <p:stCondLst>
+                                            <p:cond delay="0"/>
+                                          </p:stCondLst>
+                                        </p:cTn>
+                                        <p:tgtEl>
+                                          <p:spTgt spid="3">
+                                            <p:txEl>
+                                              <p:pRg st="0" end="0"/>
+                                            </p:txEl>
+                                          </p:spTgt>
+                                        </p:tgtEl>
+                                        <p:attrNameLst>
+                                          <p:attrName>style.visibility</p:attrName>
+                                        </p:attrNameLst>
+                                      </p:cBhvr>
+                                      <p:to>
+                                        <p:strVal val="visible"/>
+                                      </p:to>
+                                    </p:set>
+                                    <p:animEffect transition="in" filter="fade">
+                                      <p:cBhvr>
+                                        <p:cTn id="26" dur="500"/>
+                                        <p:tgtEl>
+                                          <p:spTgt spid="3">
+                                            <p:txEl>
+                                              <p:pRg st="0" end="0"/>
+                                            </p:txEl>
+                                          </p:spTgt>
+                                        </p:tgtEl>
+                                      </p:cBhvr>
+                                    </p:animEffect>
+                                  </p:childTnLst>
+                                </p:cTn>
+                              </p:par>
+                            </p:childTnLst>
+                          </p:cTn>
+                        </p:par>
+                      </p:childTnLst>
+                    </p:cTn>
+                  </p:par>
+                  <p:par>
+                    <p:cTn id="27" fill="hold">
+                      <p:stCondLst>
+                        <p:cond delay="indefinite"/>
+                      </p:stCondLst>
+                      <p:childTnLst>
+                        <p:par>
+                          <p:cTn id="28" fill="hold">
+                            <p:stCondLst>
+                              <p:cond delay="0"/>
+                            </p:stCondLst>
+                            <p:childTnLst>
+                              <p:par>
+                                <p:cTn id="29" presetID="10" presetClass="entr" presetSubtype="0" fill="hold" nodeType="clickEffect">
+                                  <p:stCondLst>
+                                    <p:cond delay="0"/>
+                                  </p:stCondLst>
+                                  <p:childTnLst>
+                                    <p:set>
+                                      <p:cBhvr>
+                                        <p:cTn id="30" dur="1" fill="hold">
+                                          <p:stCondLst>
+                                            <p:cond delay="0"/>
+                                          </p:stCondLst>
+                                        </p:cTn>
+                                        <p:tgtEl>
+                                          <p:spTgt spid="16"/>
+                                        </p:tgtEl>
+                                        <p:attrNameLst>
+                                          <p:attrName>style.visibility</p:attrName>
+                                        </p:attrNameLst>
+                                      </p:cBhvr>
+                                      <p:to>
+                                        <p:strVal val="visible"/>
+                                      </p:to>
+                                    </p:set>
+                                    <p:animEffect transition="in" filter="fade">
+                                      <p:cBhvr>
+                                        <p:cTn id="31" dur="500"/>
+                                        <p:tgtEl>
+                                          <p:spTgt spid="16"/>
+                                        </p:tgtEl>
+                                      </p:cBhvr>
+                                    </p:animEffect>
+                                  </p:childTnLst>
+                                </p:cTn>
+                              </p:par>
+                            </p:childTnLst>
+                          </p:cTn>
+                        </p:par>
+                      </p:childTnLst>
+                    </p:cTn>
+                  </p:par>
+                  <p:par>
+                    <p:cTn id="32" fill="hold">
+                      <p:stCondLst>
+                        <p:cond delay="indefinite"/>
+                      </p:stCondLst>
+                      <p:childTnLst>
+                        <p:par>
+                          <p:cTn id="33" fill="hold">
+                            <p:stCondLst>
+                              <p:cond delay="0"/>
+                            </p:stCondLst>
+                            <p:childTnLst>
+                              <p:par>
+                                <p:cTn id="34" presetID="10" presetClass="entr" presetSubtype="0" fill="hold" grpId="0" nodeType="clickEffect">
+                                  <p:stCondLst>
+                                    <p:cond delay="0"/>
+                                  </p:stCondLst>
+                                  <p:childTnLst>
+                                    <p:set>
+                                      <p:cBhvr>
+                                        <p:cTn id="35" dur="1" fill="hold">
+                                          <p:stCondLst>
+                                            <p:cond delay="0"/>
+                                          </p:stCondLst>
+                                        </p:cTn>
+                                        <p:tgtEl>
+                                          <p:spTgt spid="18"/>
+                                        </p:tgtEl>
+                                        <p:attrNameLst>
+                                          <p:attrName>style.visibility</p:attrName>
+                                        </p:attrNameLst>
+                                      </p:cBhvr>
+                                      <p:to>
+                                        <p:strVal val="visible"/>
+                                      </p:to>
+                                    </p:set>
+                                    <p:animEffect transition="in" filter="fade">
+                                      <p:cBhvr>
+                                        <p:cTn id="36" dur="500"/>
+                                        <p:tgtEl>
+                                          <p:spTgt spid="18"/>
+                                        </p:tgtEl>
+                                      </p:cBhvr>
+                                    </p:animEffect>
+                                  </p:childTnLst>
+                                </p:cTn>
+                              </p:par>
+                            </p:childTnLst>
+                          </p:cTn>
+                        </p:par>
+                      </p:childTnLst>
+                    </p:cTn>
+                  </p:par>
+                </p:childTnLst>
+              </p:cTn>
+              <p:prevCondLst>
+                <p:cond evt="onPrev" delay="0">
+                  <p:tgtEl>
+                    <p:sldTgt/>
+                  </p:tgtEl>
+                </p:cond>
+              </p:prevCondLst>
+              <p:nextCondLst>
+                <p:cond evt="onNext" delay="0">
+                  <p:tgtEl>
+                    <p:sldTgt/>
+                  </p:tgtEl>
+                </p:cond>
+              </p:nextCondLst>
+            </p:seq>
+          </p:childTnLst>
+        </p:cTn>
+      </p:par>
+    </p:tnLst>
+    <p:bldLst>
+      <p:bldP spid="5" grpId="0" animBg="1"/>
+      <p:bldP spid="10" grpId="0"/>
+      <p:bldP spid="13" grpId="0"/>
+      <p:bldP spid="14" grpId="0"/>
+      <p:bldP spid="17" grpId="0"/>
+      <p:bldP spid="18" grpId="0"/>
+    </p:bldLst>
+  </p:timing>
+</p:sld>
+</file>
+
+<file path=ppt/slides/slide5.xml><?xml version="1.0" encoding="utf-8"?>
+<p:sld xmlns:a="http://schemas.openxmlformats.org/drawingml/2006/main" xmlns:r="http://schemas.openxmlformats.org/officeDocument/2006/relationships" xmlns:p="http://schemas.openxmlformats.org/presentationml/2006/main">
+  <p:cSld>
+    <p:spTree>
+      <p:nvGrpSpPr>
+        <p:cNvPr id="1" name=""/>
+        <p:cNvGrpSpPr/>
+        <p:nvPr/>
+      </p:nvGrpSpPr>
+      <p:grpSpPr>
+        <a:xfrm>
+          <a:off x="0" y="0"/>
+          <a:ext cx="0" cy="0"/>
+          <a:chOff x="0" y="0"/>
+          <a:chExt cx="0" cy="0"/>
+        </a:xfrm>
+      </p:grpSpPr>
+      <p:sp>
+        <p:nvSpPr>
+          <p:cNvPr id="2" name="Titre 1"/>
+          <p:cNvSpPr>
+            <a:spLocks noGrp="1"/>
+          </p:cNvSpPr>
+          <p:nvPr>
+            <p:ph type="title"/>
+          </p:nvPr>
+        </p:nvSpPr>
+        <p:spPr/>
+        <p:txBody>
+          <a:bodyPr/>
+          <a:lstStyle/>
+          <a:p>
+            <a:r>
+              <a:rPr lang="fr-FR" dirty="0" smtClean="0"/>
+              <a:t>En Python, tout est un objet (30s)</a:t>
+            </a:r>
+            <a:endParaRPr lang="fr-FR" dirty="0"/>
+          </a:p>
+        </p:txBody>
+      </p:sp>
+      <p:sp>
+        <p:nvSpPr>
+          <p:cNvPr id="3" name="Espace réservé du contenu 2"/>
+          <p:cNvSpPr>
+            <a:spLocks noGrp="1"/>
+          </p:cNvSpPr>
+          <p:nvPr>
+            <p:ph idx="1"/>
+          </p:nvPr>
+        </p:nvSpPr>
+        <p:spPr/>
+        <p:txBody>
+          <a:bodyPr/>
+          <a:lstStyle/>
+          <a:p>
+            <a:r>
+              <a:rPr lang="fr-FR" sz="2800" dirty="0" smtClean="0"/>
+              <a:t>En python tout est un objet, ce qui simplifie et réduit considérablement le temps de développement de programmes</a:t>
+            </a:r>
+          </a:p>
+          <a:p>
+            <a:r>
+              <a:rPr lang="fr-FR" sz="2800" dirty="0" smtClean="0"/>
+              <a:t>On accède à tous les objets par leur référence en mémoire, mais on ne manipule jamais directement ces références. On utilise à la place l’affectation à une variable, c’est-à-dire que l’on utilise le signe égal pour affecter un objet à une variable, par exemple a=1 signifie que l’on affecte l’objet entier 1 à la variable a. Regardons maintenant plus en détail cette notion de variable…</a:t>
+            </a:r>
+            <a:endParaRPr lang="fr-FR" sz="2800" dirty="0"/>
+          </a:p>
+        </p:txBody>
+      </p:sp>
+      <p:sp>
+        <p:nvSpPr>
+          <p:cNvPr id="4" name="ZoneTexte 3"/>
+          <p:cNvSpPr txBox="1"/>
+          <p:nvPr/>
+        </p:nvSpPr>
+        <p:spPr>
+          <a:xfrm>
+            <a:off x="0" y="92076"/>
+            <a:ext cx="1537855" cy="400110"/>
+          </a:xfrm>
+          <a:prstGeom prst="rect">
+            <a:avLst/>
+          </a:prstGeom>
+          <a:noFill/>
+          <a:ln>
+            <a:solidFill>
+              <a:srgbClr val="FF0000"/>
+            </a:solidFill>
+          </a:ln>
+        </p:spPr>
+        <p:txBody>
+          <a:bodyPr wrap="square" rtlCol="0">
+            <a:spAutoFit/>
+          </a:bodyPr>
+          <a:lstStyle/>
+          <a:p>
+            <a:r>
+              <a:rPr lang="fr-FR" sz="2000" dirty="0" smtClean="0">
+                <a:solidFill>
+                  <a:srgbClr val="FF0000"/>
+                </a:solidFill>
+                <a:latin typeface="Calibri" panose="020F0502020204030204" pitchFamily="34" charset="0"/>
+              </a:rPr>
+              <a:t>prompteur</a:t>
+            </a:r>
+            <a:endParaRPr lang="fr-FR" sz="2000" dirty="0">
+              <a:solidFill>
+                <a:srgbClr val="FF0000"/>
+              </a:solidFill>
+              <a:latin typeface="Calibri" panose="020F0502020204030204" pitchFamily="34" charset="0"/>
+            </a:endParaRPr>
+          </a:p>
+        </p:txBody>
+      </p:sp>
+    </p:spTree>
+    <p:extLst>
+      <p:ext uri="{BB962C8B-B14F-4D97-AF65-F5344CB8AC3E}">
+        <p14:creationId xmlns:p14="http://schemas.microsoft.com/office/powerpoint/2010/main" val="567329468"/>
+      </p:ext>
+    </p:extLst>
+  </p:cSld>
+  <p:clrMapOvr>
+    <a:masterClrMapping/>
+  </p:clrMapOvr>
+  <p:timing>
+    <p:tnLst>
+      <p:par>
+        <p:cTn id="1" dur="indefinite" restart="never" nodeType="tmRoot"/>
+      </p:par>
+    </p:tnLst>
+  </p:timing>
+</p:sld>
+</file>
+
+<file path=ppt/slides/slide6.xml><?xml version="1.0" encoding="utf-8"?>
+<p:sld xmlns:a="http://schemas.openxmlformats.org/drawingml/2006/main" xmlns:r="http://schemas.openxmlformats.org/officeDocument/2006/relationships" xmlns:p="http://schemas.openxmlformats.org/presentationml/2006/main">
+  <p:cSld>
+    <p:spTree>
+      <p:nvGrpSpPr>
+        <p:cNvPr id="1" name=""/>
+        <p:cNvGrpSpPr/>
+        <p:nvPr/>
+      </p:nvGrpSpPr>
+      <p:grpSpPr>
+        <a:xfrm>
+          <a:off x="0" y="0"/>
+          <a:ext cx="0" cy="0"/>
+          <a:chOff x="0" y="0"/>
+          <a:chExt cx="0" cy="0"/>
+        </a:xfrm>
+      </p:grpSpPr>
+      <p:sp>
+        <p:nvSpPr>
+          <p:cNvPr id="2" name="Titre 1"/>
+          <p:cNvSpPr>
+            <a:spLocks noGrp="1"/>
+          </p:cNvSpPr>
+          <p:nvPr>
+            <p:ph type="title"/>
+          </p:nvPr>
+        </p:nvSpPr>
+        <p:spPr/>
+        <p:txBody>
+          <a:bodyPr/>
+          <a:lstStyle/>
+          <a:p>
+            <a:r>
+              <a:rPr lang="fr-FR" dirty="0" smtClean="0"/>
+              <a:t>Notion de variables (50s)</a:t>
+            </a:r>
+            <a:endParaRPr lang="fr-FR" dirty="0"/>
+          </a:p>
+        </p:txBody>
+      </p:sp>
+      <p:sp>
+        <p:nvSpPr>
+          <p:cNvPr id="3" name="Espace réservé du contenu 2"/>
+          <p:cNvSpPr>
+            <a:spLocks noGrp="1"/>
+          </p:cNvSpPr>
+          <p:nvPr>
+            <p:ph idx="1"/>
+          </p:nvPr>
+        </p:nvSpPr>
+        <p:spPr>
+          <a:xfrm>
+            <a:off x="457200" y="1600200"/>
+            <a:ext cx="8686800" cy="4525963"/>
+          </a:xfrm>
+        </p:spPr>
+        <p:txBody>
+          <a:bodyPr/>
+          <a:lstStyle/>
+          <a:p>
+            <a:r>
+              <a:rPr lang="fr-FR" sz="2400" dirty="0" smtClean="0"/>
+              <a:t>Une variable est un nom que l’on donne à un objet pour le retrouver en mémoire</a:t>
+            </a:r>
+          </a:p>
+          <a:p>
+            <a:pPr lvl="1"/>
+            <a:r>
+              <a:rPr lang="fr-FR" sz="2000" dirty="0"/>
+              <a:t>Il y a </a:t>
+            </a:r>
+            <a:r>
+              <a:rPr lang="fr-FR" sz="2000" dirty="0" smtClean="0"/>
+              <a:t>trois règles </a:t>
+            </a:r>
+            <a:r>
+              <a:rPr lang="fr-FR" sz="2000" dirty="0"/>
+              <a:t>importantes pour le nom d’une </a:t>
+            </a:r>
+            <a:r>
+              <a:rPr lang="fr-FR" sz="2000" dirty="0" smtClean="0"/>
+              <a:t>variable en Python</a:t>
+            </a:r>
+            <a:endParaRPr lang="fr-FR" sz="2000" dirty="0"/>
+          </a:p>
+          <a:p>
+            <a:pPr lvl="2"/>
+            <a:r>
+              <a:rPr lang="fr-FR" sz="1800" dirty="0" smtClean="0"/>
+              <a:t>Une variable peut être composée </a:t>
+            </a:r>
+            <a:r>
+              <a:rPr lang="fr-FR" sz="1800" dirty="0"/>
+              <a:t>de tirets bas </a:t>
+            </a:r>
+            <a:r>
+              <a:rPr lang="fr-FR" sz="1800" dirty="0" smtClean="0"/>
+              <a:t>et d’une suite quelconque de caractères alphanumériques, c’est-à-dire les lettres de l’alphabet en minuscule, en majuscule et les chiffres de 0 à 9</a:t>
+            </a:r>
+          </a:p>
+          <a:p>
+            <a:pPr lvl="2"/>
+            <a:r>
+              <a:rPr lang="fr-FR" sz="1800" dirty="0" smtClean="0"/>
+              <a:t>Une </a:t>
+            </a:r>
+            <a:r>
+              <a:rPr lang="fr-FR" sz="1800" dirty="0"/>
+              <a:t>variable commence soit par une lettre soit pas un tiret bas, mais jamais par un chiffre </a:t>
+            </a:r>
+          </a:p>
+          <a:p>
+            <a:pPr lvl="2"/>
+            <a:r>
+              <a:rPr lang="fr-FR" sz="1800" dirty="0" smtClean="0"/>
+              <a:t>Les majuscules et minuscules sont prises en compte, donc </a:t>
+            </a:r>
+            <a:r>
+              <a:rPr lang="fr-FR" sz="1800" dirty="0" err="1"/>
+              <a:t>Ma_variable</a:t>
+            </a:r>
+            <a:r>
+              <a:rPr lang="fr-FR" sz="1800" dirty="0"/>
+              <a:t> est différent de </a:t>
+            </a:r>
+            <a:r>
+              <a:rPr lang="fr-FR" sz="1800" dirty="0" err="1" smtClean="0"/>
+              <a:t>ma_variable</a:t>
+            </a:r>
+            <a:endParaRPr lang="fr-FR" sz="1800" dirty="0" smtClean="0"/>
+          </a:p>
+          <a:p>
+            <a:r>
+              <a:rPr lang="fr-FR" sz="2400" dirty="0" smtClean="0"/>
+              <a:t>Il est recommandé d’utiliser des noms explicites de variable, de tout écrire en minuscule, et de séparer les mots par des tirets bas. Par exemple, </a:t>
+            </a:r>
+            <a:r>
+              <a:rPr lang="fr-FR" sz="2400" dirty="0" err="1" smtClean="0"/>
+              <a:t>moyenne_age_francais</a:t>
+            </a:r>
+            <a:r>
+              <a:rPr lang="fr-FR" sz="2400" dirty="0" smtClean="0"/>
+              <a:t> est un bon nom de variable, meilleur de </a:t>
+            </a:r>
+            <a:r>
+              <a:rPr lang="fr-FR" sz="2400" dirty="0" err="1" smtClean="0"/>
+              <a:t>moy_age_f</a:t>
+            </a:r>
+            <a:r>
+              <a:rPr lang="fr-FR" sz="2400" dirty="0" smtClean="0"/>
+              <a:t> et bien meilleur que simplement x</a:t>
+            </a:r>
+          </a:p>
+        </p:txBody>
+      </p:sp>
+      <p:sp>
+        <p:nvSpPr>
+          <p:cNvPr id="4" name="ZoneTexte 3"/>
+          <p:cNvSpPr txBox="1"/>
+          <p:nvPr/>
+        </p:nvSpPr>
+        <p:spPr>
+          <a:xfrm>
+            <a:off x="0" y="92076"/>
+            <a:ext cx="1537855" cy="400110"/>
+          </a:xfrm>
+          <a:prstGeom prst="rect">
+            <a:avLst/>
+          </a:prstGeom>
+          <a:noFill/>
+          <a:ln>
+            <a:solidFill>
+              <a:srgbClr val="FF0000"/>
+            </a:solidFill>
+          </a:ln>
+        </p:spPr>
+        <p:txBody>
+          <a:bodyPr wrap="square" rtlCol="0">
+            <a:spAutoFit/>
+          </a:bodyPr>
+          <a:lstStyle/>
+          <a:p>
+            <a:r>
+              <a:rPr lang="fr-FR" sz="2000" dirty="0" smtClean="0">
+                <a:solidFill>
+                  <a:srgbClr val="FF0000"/>
+                </a:solidFill>
+                <a:latin typeface="Calibri" panose="020F0502020204030204" pitchFamily="34" charset="0"/>
+              </a:rPr>
+              <a:t>prompteur</a:t>
+            </a:r>
+            <a:endParaRPr lang="fr-FR" sz="2000" dirty="0">
+              <a:solidFill>
+                <a:srgbClr val="FF0000"/>
+              </a:solidFill>
+              <a:latin typeface="Calibri" panose="020F0502020204030204" pitchFamily="34" charset="0"/>
+            </a:endParaRPr>
+          </a:p>
+        </p:txBody>
+      </p:sp>
+    </p:spTree>
+    <p:extLst>
+      <p:ext uri="{BB962C8B-B14F-4D97-AF65-F5344CB8AC3E}">
+        <p14:creationId xmlns:p14="http://schemas.microsoft.com/office/powerpoint/2010/main" val="2819011811"/>
+      </p:ext>
+    </p:extLst>
+  </p:cSld>
+  <p:clrMapOvr>
+    <a:masterClrMapping/>
+  </p:clrMapOvr>
+  <p:timing>
+    <p:tnLst>
+      <p:par>
+        <p:cTn id="1" dur="indefinite" restart="never" nodeType="tmRoot"/>
+      </p:par>
+    </p:tnLst>
+  </p:timing>
+</p:sld>
+</file>
+
+<file path=ppt/slides/slide7.xml><?xml version="1.0" encoding="utf-8"?>
+<p:sld xmlns:a="http://schemas.openxmlformats.org/drawingml/2006/main" xmlns:r="http://schemas.openxmlformats.org/officeDocument/2006/relationships" xmlns:p="http://schemas.openxmlformats.org/presentationml/2006/main">
+  <p:cSld>
+    <p:spTree>
+      <p:nvGrpSpPr>
+        <p:cNvPr id="1" name=""/>
+        <p:cNvGrpSpPr/>
+        <p:nvPr/>
+      </p:nvGrpSpPr>
+      <p:grpSpPr>
+        <a:xfrm>
+          <a:off x="0" y="0"/>
+          <a:ext cx="0" cy="0"/>
+          <a:chOff x="0" y="0"/>
+          <a:chExt cx="0" cy="0"/>
+        </a:xfrm>
+      </p:grpSpPr>
+      <p:sp>
+        <p:nvSpPr>
+          <p:cNvPr id="2" name="Titre 1"/>
+          <p:cNvSpPr>
+            <a:spLocks noGrp="1"/>
+          </p:cNvSpPr>
+          <p:nvPr>
+            <p:ph type="title"/>
+          </p:nvPr>
+        </p:nvSpPr>
+        <p:spPr/>
+        <p:txBody>
+          <a:bodyPr/>
+          <a:lstStyle/>
+          <a:p>
+            <a:r>
+              <a:rPr lang="fr-FR" dirty="0" smtClean="0"/>
+              <a:t>Typage dynamique (20s)</a:t>
+            </a:r>
+            <a:endParaRPr lang="fr-FR" dirty="0"/>
+          </a:p>
+        </p:txBody>
+      </p:sp>
+      <p:sp>
+        <p:nvSpPr>
+          <p:cNvPr id="3" name="Espace réservé du contenu 2"/>
+          <p:cNvSpPr>
+            <a:spLocks noGrp="1"/>
+          </p:cNvSpPr>
+          <p:nvPr>
+            <p:ph idx="1"/>
+          </p:nvPr>
+        </p:nvSpPr>
+        <p:spPr/>
+        <p:txBody>
+          <a:bodyPr/>
+          <a:lstStyle/>
+          <a:p>
+            <a:r>
+              <a:rPr lang="fr-FR" dirty="0" smtClean="0"/>
+              <a:t>Maintenant que nous avons vu les notions d’objets et de variables, parlons du typage dynamique</a:t>
+            </a:r>
+          </a:p>
+          <a:p>
+            <a:r>
+              <a:rPr lang="fr-FR" dirty="0" smtClean="0"/>
+              <a:t>Python utilise le typage dynamique c’est-à-dire que le type des variables n’est pas spécifié lors de l’écriture du programme, mais automatiquement à l’exécution. En fait, les variables n’ont pas de type, ce sont les objets qu’elles référencent qui ont un type. Prenons un exemple…</a:t>
+            </a:r>
+          </a:p>
+        </p:txBody>
+      </p:sp>
+      <p:sp>
+        <p:nvSpPr>
+          <p:cNvPr id="4" name="ZoneTexte 3"/>
+          <p:cNvSpPr txBox="1"/>
+          <p:nvPr/>
+        </p:nvSpPr>
+        <p:spPr>
+          <a:xfrm>
+            <a:off x="0" y="92076"/>
+            <a:ext cx="1537855" cy="400110"/>
+          </a:xfrm>
+          <a:prstGeom prst="rect">
+            <a:avLst/>
+          </a:prstGeom>
+          <a:noFill/>
+          <a:ln>
+            <a:solidFill>
+              <a:srgbClr val="FF0000"/>
+            </a:solidFill>
+          </a:ln>
+        </p:spPr>
+        <p:txBody>
+          <a:bodyPr wrap="square" rtlCol="0">
+            <a:spAutoFit/>
+          </a:bodyPr>
+          <a:lstStyle/>
+          <a:p>
+            <a:r>
+              <a:rPr lang="fr-FR" sz="2000" dirty="0" smtClean="0">
+                <a:solidFill>
+                  <a:srgbClr val="FF0000"/>
+                </a:solidFill>
+                <a:latin typeface="Calibri" panose="020F0502020204030204" pitchFamily="34" charset="0"/>
+              </a:rPr>
+              <a:t>prompteur</a:t>
+            </a:r>
+            <a:endParaRPr lang="fr-FR" sz="2000" dirty="0">
+              <a:solidFill>
+                <a:srgbClr val="FF0000"/>
+              </a:solidFill>
+              <a:latin typeface="Calibri" panose="020F0502020204030204" pitchFamily="34" charset="0"/>
+            </a:endParaRPr>
+          </a:p>
+        </p:txBody>
+      </p:sp>
+    </p:spTree>
+    <p:extLst>
+      <p:ext uri="{BB962C8B-B14F-4D97-AF65-F5344CB8AC3E}">
+        <p14:creationId xmlns:p14="http://schemas.microsoft.com/office/powerpoint/2010/main" val="3893248729"/>
+      </p:ext>
+    </p:extLst>
+  </p:cSld>
+  <p:clrMapOvr>
+    <a:masterClrMapping/>
+  </p:clrMapOvr>
+  <p:timing>
+    <p:tnLst>
+      <p:par>
+        <p:cTn id="1" dur="indefinite" restart="never" nodeType="tmRoot"/>
+      </p:par>
+    </p:tnLst>
+  </p:timing>
+</p:sld>
+</file>
+
+<file path=ppt/slides/slide8.xml><?xml version="1.0" encoding="utf-8"?>
+<p:sld xmlns:a="http://schemas.openxmlformats.org/drawingml/2006/main" xmlns:r="http://schemas.openxmlformats.org/officeDocument/2006/relationships" xmlns:p="http://schemas.openxmlformats.org/presentationml/2006/main">
+  <p:cSld>
+    <p:spTree>
+      <p:nvGrpSpPr>
+        <p:cNvPr id="1" name=""/>
+        <p:cNvGrpSpPr/>
+        <p:nvPr/>
+      </p:nvGrpSpPr>
+      <p:grpSpPr>
+        <a:xfrm>
+          <a:off x="0" y="0"/>
+          <a:ext cx="0" cy="0"/>
+          <a:chOff x="0" y="0"/>
+          <a:chExt cx="0" cy="0"/>
+        </a:xfrm>
+      </p:grpSpPr>
+      <p:sp>
+        <p:nvSpPr>
+          <p:cNvPr id="4" name="Rectangle 3"/>
           <p:cNvSpPr/>
           <p:nvPr/>
         </p:nvSpPr>
         <p:spPr bwMode="auto">
           <a:xfrm>
-            <a:off x="457200" y="2379785"/>
+            <a:off x="4622800" y="2379784"/>
             <a:ext cx="3548185" cy="3948335"/>
           </a:xfrm>
           <a:prstGeom prst="rect">
@@ -5664,6 +7518,104 @@
       </p:sp>
       <p:sp>
         <p:nvSpPr>
+          <p:cNvPr id="6" name="ZoneTexte 5"/>
+          <p:cNvSpPr txBox="1"/>
+          <p:nvPr/>
+        </p:nvSpPr>
+        <p:spPr>
+          <a:xfrm>
+            <a:off x="5188527" y="1456454"/>
+            <a:ext cx="3454400" cy="923330"/>
+          </a:xfrm>
+          <a:prstGeom prst="rect">
+            <a:avLst/>
+          </a:prstGeom>
+          <a:noFill/>
+        </p:spPr>
+        <p:txBody>
+          <a:bodyPr wrap="square" rtlCol="0">
+            <a:spAutoFit/>
+          </a:bodyPr>
+          <a:lstStyle/>
+          <a:p>
+            <a:r>
+              <a:rPr lang="fr-FR" sz="5400" dirty="0" smtClean="0">
+                <a:latin typeface="Calibri" panose="020F0502020204030204" pitchFamily="34" charset="0"/>
+              </a:rPr>
+              <a:t>objets</a:t>
+            </a:r>
+            <a:endParaRPr lang="fr-FR" sz="5400" dirty="0">
+              <a:latin typeface="Calibri" panose="020F0502020204030204" pitchFamily="34" charset="0"/>
+            </a:endParaRPr>
+          </a:p>
+        </p:txBody>
+      </p:sp>
+      <p:sp>
+        <p:nvSpPr>
+          <p:cNvPr id="5" name="Rectangle 4"/>
+          <p:cNvSpPr/>
+          <p:nvPr/>
+        </p:nvSpPr>
+        <p:spPr bwMode="auto">
+          <a:xfrm>
+            <a:off x="457200" y="2379785"/>
+            <a:ext cx="3548185" cy="3948335"/>
+          </a:xfrm>
+          <a:prstGeom prst="rect">
+            <a:avLst/>
+          </a:prstGeom>
+          <a:noFill/>
+          <a:ln w="38100" cap="flat" cmpd="sng" algn="ctr">
+            <a:solidFill>
+              <a:schemeClr val="tx1"/>
+            </a:solidFill>
+            <a:prstDash val="solid"/>
+            <a:round/>
+            <a:headEnd type="none" w="med" len="med"/>
+            <a:tailEnd type="none" w="med" len="med"/>
+          </a:ln>
+          <a:effectLst/>
+        </p:spPr>
+        <p:txBody>
+          <a:bodyPr vert="horz" wrap="square" lIns="90000" tIns="46800" rIns="90000" bIns="46800" numCol="1" rtlCol="0" anchor="ctr" anchorCtr="0" compatLnSpc="1">
+            <a:prstTxWarp prst="textNoShape">
+              <a:avLst/>
+            </a:prstTxWarp>
+            <a:spAutoFit/>
+          </a:bodyPr>
+          <a:lstStyle/>
+          <a:p>
+            <a:pPr marL="0" marR="0" indent="0" algn="ctr" defTabSz="914400" rtl="0" eaLnBrk="1" fontAlgn="base" latinLnBrk="0" hangingPunct="1">
+              <a:lnSpc>
+                <a:spcPct val="100000"/>
+              </a:lnSpc>
+              <a:spcBef>
+                <a:spcPct val="50000"/>
+              </a:spcBef>
+              <a:spcAft>
+                <a:spcPct val="0"/>
+              </a:spcAft>
+              <a:buClrTx/>
+              <a:buSzTx/>
+              <a:buFontTx/>
+              <a:buNone/>
+              <a:tabLst/>
+            </a:pPr>
+            <a:endParaRPr kumimoji="0" lang="fr-FR" sz="2400" b="0" i="0" u="none" strike="noStrike" cap="none" normalizeH="0" baseline="0" smtClean="0">
+              <a:ln>
+                <a:noFill/>
+              </a:ln>
+              <a:solidFill>
+                <a:schemeClr val="tx1"/>
+              </a:solidFill>
+              <a:effectLst/>
+              <a:latin typeface="Comic Sans MS" pitchFamily="66" charset="0"/>
+            </a:endParaRPr>
+          </a:p>
+        </p:txBody>
+      </p:sp>
+      <p:sp>
+        <p:nvSpPr>
           <p:cNvPr id="7" name="ZoneTexte 6"/>
           <p:cNvSpPr txBox="1"/>
           <p:nvPr/>
@@ -5723,14 +7675,7 @@
                 <a:latin typeface="Courier New" panose="02070309020205020404" pitchFamily="49" charset="0"/>
                 <a:cs typeface="Courier New" panose="02070309020205020404" pitchFamily="49" charset="0"/>
               </a:rPr>
-              <a:t>&gt;&gt;&gt; a = </a:t>
-            </a:r>
-            <a:r>
-              <a:rPr lang="fr-FR" sz="4000" dirty="0" smtClean="0">
-                <a:latin typeface="Courier New" panose="02070309020205020404" pitchFamily="49" charset="0"/>
-                <a:cs typeface="Courier New" panose="02070309020205020404" pitchFamily="49" charset="0"/>
-              </a:rPr>
-              <a:t>3</a:t>
+              <a:t>&gt;&gt;&gt; a = 3</a:t>
             </a:r>
           </a:p>
           <a:p>
@@ -5741,10 +7686,6 @@
               </a:rPr>
               <a:t>&gt;&gt;&gt; a = 'spam'</a:t>
             </a:r>
-            <a:endParaRPr lang="fr-FR" sz="4000" dirty="0">
-              <a:latin typeface="Courier New" panose="02070309020205020404" pitchFamily="49" charset="0"/>
-              <a:cs typeface="Courier New" panose="02070309020205020404" pitchFamily="49" charset="0"/>
-            </a:endParaRPr>
           </a:p>
         </p:txBody>
       </p:sp>
@@ -6806,1774 +8747,6 @@
 </p:sld>
 </file>
 
-<file path=ppt/slides/slide12.xml><?xml version="1.0" encoding="utf-8"?>
-<p:sld xmlns:a="http://schemas.openxmlformats.org/drawingml/2006/main" xmlns:r="http://schemas.openxmlformats.org/officeDocument/2006/relationships" xmlns:p="http://schemas.openxmlformats.org/presentationml/2006/main">
-  <p:cSld>
-    <p:spTree>
-      <p:nvGrpSpPr>
-        <p:cNvPr id="1" name=""/>
-        <p:cNvGrpSpPr/>
-        <p:nvPr/>
-      </p:nvGrpSpPr>
-      <p:grpSpPr>
-        <a:xfrm>
-          <a:off x="0" y="0"/>
-          <a:ext cx="0" cy="0"/>
-          <a:chOff x="0" y="0"/>
-          <a:chExt cx="0" cy="0"/>
-        </a:xfrm>
-      </p:grpSpPr>
-      <p:sp>
-        <p:nvSpPr>
-          <p:cNvPr id="2" name="Titre 1"/>
-          <p:cNvSpPr>
-            <a:spLocks noGrp="1"/>
-          </p:cNvSpPr>
-          <p:nvPr>
-            <p:ph type="title"/>
-          </p:nvPr>
-        </p:nvSpPr>
-        <p:spPr/>
-        <p:txBody>
-          <a:bodyPr/>
-          <a:lstStyle/>
-          <a:p>
-            <a:r>
-              <a:rPr lang="fr-FR" dirty="0"/>
-              <a:t>Typage </a:t>
-            </a:r>
-            <a:r>
-              <a:rPr lang="fr-FR" dirty="0" smtClean="0"/>
-              <a:t>dynamique (30s)</a:t>
-            </a:r>
-            <a:endParaRPr lang="fr-FR" dirty="0"/>
-          </a:p>
-        </p:txBody>
-      </p:sp>
-      <p:sp>
-        <p:nvSpPr>
-          <p:cNvPr id="3" name="Espace réservé du contenu 2"/>
-          <p:cNvSpPr>
-            <a:spLocks noGrp="1"/>
-          </p:cNvSpPr>
-          <p:nvPr>
-            <p:ph idx="1"/>
-          </p:nvPr>
-        </p:nvSpPr>
-        <p:spPr/>
-        <p:txBody>
-          <a:bodyPr/>
-          <a:lstStyle/>
-          <a:p>
-            <a:r>
-              <a:rPr lang="fr-FR" sz="2800" dirty="0" smtClean="0"/>
-              <a:t>Le typage dynamique offre beaucoup de flexibilité, facilite grandement l’écriture des programmes et permet d’écrire du code polymorphe, c’est-à-dire du code qui fonctionne automatiquement pour différent types d’objets. Nous reviendrons sur la notion de polymorphisme dans les semaines qui viennent.</a:t>
-            </a:r>
-          </a:p>
-          <a:p>
-            <a:r>
-              <a:rPr lang="fr-FR" sz="2800" dirty="0" smtClean="0"/>
-              <a:t>Dans cette vidéo, nous avons introduit la notion d’objet avec les variables et le typage dynamique. Dans la prochaine vidéo, nous introduirons les types de base,  et </a:t>
-            </a:r>
-            <a:r>
-              <a:rPr lang="fr-FR" sz="2800" dirty="0"/>
-              <a:t>les techniques de factorisation de code que sont les boucles, les fonctions et les modules</a:t>
-            </a:r>
-          </a:p>
-          <a:p>
-            <a:endParaRPr lang="fr-FR" sz="2800" dirty="0"/>
-          </a:p>
-        </p:txBody>
-      </p:sp>
-    </p:spTree>
-    <p:extLst>
-      <p:ext uri="{BB962C8B-B14F-4D97-AF65-F5344CB8AC3E}">
-        <p14:creationId xmlns:p14="http://schemas.microsoft.com/office/powerpoint/2010/main" val="118494192"/>
-      </p:ext>
-    </p:extLst>
-  </p:cSld>
-  <p:clrMapOvr>
-    <a:masterClrMapping/>
-  </p:clrMapOvr>
-  <p:timing>
-    <p:tnLst>
-      <p:par>
-        <p:cTn id="1" dur="indefinite" restart="never" nodeType="tmRoot"/>
-      </p:par>
-    </p:tnLst>
-  </p:timing>
-</p:sld>
-</file>
-
-<file path=ppt/slides/slide13.xml><?xml version="1.0" encoding="utf-8"?>
-<p:sld xmlns:a="http://schemas.openxmlformats.org/drawingml/2006/main" xmlns:r="http://schemas.openxmlformats.org/officeDocument/2006/relationships" xmlns:p="http://schemas.openxmlformats.org/presentationml/2006/main">
-  <p:cSld>
-    <p:spTree>
-      <p:nvGrpSpPr>
-        <p:cNvPr id="1" name=""/>
-        <p:cNvGrpSpPr/>
-        <p:nvPr/>
-      </p:nvGrpSpPr>
-      <p:grpSpPr>
-        <a:xfrm>
-          <a:off x="0" y="0"/>
-          <a:ext cx="0" cy="0"/>
-          <a:chOff x="0" y="0"/>
-          <a:chExt cx="0" cy="0"/>
-        </a:xfrm>
-      </p:grpSpPr>
-      <p:sp>
-        <p:nvSpPr>
-          <p:cNvPr id="4" name="Titre 3"/>
-          <p:cNvSpPr>
-            <a:spLocks noGrp="1"/>
-          </p:cNvSpPr>
-          <p:nvPr>
-            <p:ph type="ctrTitle"/>
-          </p:nvPr>
-        </p:nvSpPr>
-        <p:spPr/>
-        <p:txBody>
-          <a:bodyPr/>
-          <a:lstStyle/>
-          <a:p>
-            <a:r>
-              <a:rPr lang="fr-FR" dirty="0" smtClean="0"/>
-              <a:t>Total : 5 minutes 28 secondes</a:t>
-            </a:r>
-            <a:endParaRPr lang="fr-FR" dirty="0"/>
-          </a:p>
-        </p:txBody>
-      </p:sp>
-      <p:sp>
-        <p:nvSpPr>
-          <p:cNvPr id="5" name="Sous-titre 4"/>
-          <p:cNvSpPr>
-            <a:spLocks noGrp="1"/>
-          </p:cNvSpPr>
-          <p:nvPr>
-            <p:ph type="subTitle" idx="1"/>
-          </p:nvPr>
-        </p:nvSpPr>
-        <p:spPr/>
-        <p:txBody>
-          <a:bodyPr/>
-          <a:lstStyle/>
-          <a:p>
-            <a:endParaRPr lang="fr-FR"/>
-          </a:p>
-        </p:txBody>
-      </p:sp>
-    </p:spTree>
-    <p:extLst>
-      <p:ext uri="{BB962C8B-B14F-4D97-AF65-F5344CB8AC3E}">
-        <p14:creationId xmlns:p14="http://schemas.microsoft.com/office/powerpoint/2010/main" val="2203744170"/>
-      </p:ext>
-    </p:extLst>
-  </p:cSld>
-  <p:clrMapOvr>
-    <a:masterClrMapping/>
-  </p:clrMapOvr>
-  <p:timing>
-    <p:tnLst>
-      <p:par>
-        <p:cTn id="1" dur="indefinite" restart="never" nodeType="tmRoot"/>
-      </p:par>
-    </p:tnLst>
-  </p:timing>
-</p:sld>
-</file>
-
-<file path=ppt/slides/slide2.xml><?xml version="1.0" encoding="utf-8"?>
-<p:sld xmlns:a="http://schemas.openxmlformats.org/drawingml/2006/main" xmlns:r="http://schemas.openxmlformats.org/officeDocument/2006/relationships" xmlns:p="http://schemas.openxmlformats.org/presentationml/2006/main">
-  <p:cSld>
-    <p:spTree>
-      <p:nvGrpSpPr>
-        <p:cNvPr id="1" name=""/>
-        <p:cNvGrpSpPr/>
-        <p:nvPr/>
-      </p:nvGrpSpPr>
-      <p:grpSpPr>
-        <a:xfrm>
-          <a:off x="0" y="0"/>
-          <a:ext cx="0" cy="0"/>
-          <a:chOff x="0" y="0"/>
-          <a:chExt cx="0" cy="0"/>
-        </a:xfrm>
-      </p:grpSpPr>
-      <p:sp>
-        <p:nvSpPr>
-          <p:cNvPr id="2" name="Titre 1"/>
-          <p:cNvSpPr>
-            <a:spLocks noGrp="1"/>
-          </p:cNvSpPr>
-          <p:nvPr>
-            <p:ph type="title"/>
-          </p:nvPr>
-        </p:nvSpPr>
-        <p:spPr/>
-        <p:txBody>
-          <a:bodyPr/>
-          <a:lstStyle/>
-          <a:p>
-            <a:r>
-              <a:rPr lang="fr-FR" dirty="0" smtClean="0"/>
-              <a:t>Résumé de la </a:t>
-            </a:r>
-            <a:r>
-              <a:rPr lang="fr-FR" dirty="0" smtClean="0"/>
-              <a:t>séquence (27s)</a:t>
-            </a:r>
-            <a:endParaRPr lang="fr-FR" dirty="0"/>
-          </a:p>
-        </p:txBody>
-      </p:sp>
-      <p:sp>
-        <p:nvSpPr>
-          <p:cNvPr id="3" name="Espace réservé du contenu 2"/>
-          <p:cNvSpPr>
-            <a:spLocks noGrp="1"/>
-          </p:cNvSpPr>
-          <p:nvPr>
-            <p:ph idx="1"/>
-          </p:nvPr>
-        </p:nvSpPr>
-        <p:spPr/>
-        <p:txBody>
-          <a:bodyPr/>
-          <a:lstStyle/>
-          <a:p>
-            <a:r>
-              <a:rPr lang="fr-FR" sz="2800" dirty="0" smtClean="0"/>
-              <a:t>Mais avant de commencer l’exploration des types de base en python, j’aimerais introduire </a:t>
-            </a:r>
-            <a:r>
-              <a:rPr lang="fr-FR" sz="2800" dirty="0" smtClean="0"/>
-              <a:t>des notions que nous verrons dans les semaines qui suivent. En effet, notre but et de vous permettre, dès cette semaine, de jouer avec Python. Vous avez donc besoin de connaitre certaines notions nécessaire à l’écriture de petits programmes. Je vais présenter dans cette vidéo et la suivante le minimum dont vous aurez besoin cette semaine, on approfondira ensuite chaque notion dans les semaines suivantes jusqu’à une parfaite maitrise des notions introduites aujourd’hui. </a:t>
-            </a:r>
-            <a:endParaRPr lang="fr-FR" sz="2800" dirty="0" smtClean="0"/>
-          </a:p>
-        </p:txBody>
-      </p:sp>
-      <p:sp>
-        <p:nvSpPr>
-          <p:cNvPr id="4" name="ZoneTexte 3"/>
-          <p:cNvSpPr txBox="1"/>
-          <p:nvPr/>
-        </p:nvSpPr>
-        <p:spPr>
-          <a:xfrm>
-            <a:off x="0" y="92076"/>
-            <a:ext cx="1537855" cy="400110"/>
-          </a:xfrm>
-          <a:prstGeom prst="rect">
-            <a:avLst/>
-          </a:prstGeom>
-          <a:noFill/>
-          <a:ln>
-            <a:solidFill>
-              <a:srgbClr val="FF0000"/>
-            </a:solidFill>
-          </a:ln>
-        </p:spPr>
-        <p:txBody>
-          <a:bodyPr wrap="square" rtlCol="0">
-            <a:spAutoFit/>
-          </a:bodyPr>
-          <a:lstStyle/>
-          <a:p>
-            <a:r>
-              <a:rPr lang="fr-FR" sz="2000" dirty="0" smtClean="0">
-                <a:solidFill>
-                  <a:srgbClr val="FF0000"/>
-                </a:solidFill>
-                <a:latin typeface="Calibri" panose="020F0502020204030204" pitchFamily="34" charset="0"/>
-              </a:rPr>
-              <a:t>prompteur</a:t>
-            </a:r>
-            <a:endParaRPr lang="fr-FR" sz="2000" dirty="0">
-              <a:solidFill>
-                <a:srgbClr val="FF0000"/>
-              </a:solidFill>
-              <a:latin typeface="Calibri" panose="020F0502020204030204" pitchFamily="34" charset="0"/>
-            </a:endParaRPr>
-          </a:p>
-        </p:txBody>
-      </p:sp>
-    </p:spTree>
-    <p:extLst>
-      <p:ext uri="{BB962C8B-B14F-4D97-AF65-F5344CB8AC3E}">
-        <p14:creationId xmlns:p14="http://schemas.microsoft.com/office/powerpoint/2010/main" val="1143164526"/>
-      </p:ext>
-    </p:extLst>
-  </p:cSld>
-  <p:clrMapOvr>
-    <a:masterClrMapping/>
-  </p:clrMapOvr>
-  <p:timing>
-    <p:tnLst>
-      <p:par>
-        <p:cTn id="1" dur="indefinite" restart="never" nodeType="tmRoot"/>
-      </p:par>
-    </p:tnLst>
-  </p:timing>
-</p:sld>
-</file>
-
-<file path=ppt/slides/slide3.xml><?xml version="1.0" encoding="utf-8"?>
-<p:sld xmlns:a="http://schemas.openxmlformats.org/drawingml/2006/main" xmlns:r="http://schemas.openxmlformats.org/officeDocument/2006/relationships" xmlns:p="http://schemas.openxmlformats.org/presentationml/2006/main">
-  <p:cSld>
-    <p:spTree>
-      <p:nvGrpSpPr>
-        <p:cNvPr id="1" name=""/>
-        <p:cNvGrpSpPr/>
-        <p:nvPr/>
-      </p:nvGrpSpPr>
-      <p:grpSpPr>
-        <a:xfrm>
-          <a:off x="0" y="0"/>
-          <a:ext cx="0" cy="0"/>
-          <a:chOff x="0" y="0"/>
-          <a:chExt cx="0" cy="0"/>
-        </a:xfrm>
-      </p:grpSpPr>
-      <p:sp>
-        <p:nvSpPr>
-          <p:cNvPr id="2" name="Titre 1"/>
-          <p:cNvSpPr>
-            <a:spLocks noGrp="1"/>
-          </p:cNvSpPr>
-          <p:nvPr>
-            <p:ph type="title"/>
-          </p:nvPr>
-        </p:nvSpPr>
-        <p:spPr/>
-        <p:txBody>
-          <a:bodyPr/>
-          <a:lstStyle/>
-          <a:p>
-            <a:r>
-              <a:rPr lang="fr-FR" dirty="0" smtClean="0"/>
-              <a:t>Résumé de la </a:t>
-            </a:r>
-            <a:r>
-              <a:rPr lang="fr-FR" dirty="0" smtClean="0"/>
-              <a:t>séquence (20s)</a:t>
-            </a:r>
-            <a:endParaRPr lang="fr-FR" dirty="0"/>
-          </a:p>
-        </p:txBody>
-      </p:sp>
-      <p:sp>
-        <p:nvSpPr>
-          <p:cNvPr id="3" name="Espace réservé du contenu 2"/>
-          <p:cNvSpPr>
-            <a:spLocks noGrp="1"/>
-          </p:cNvSpPr>
-          <p:nvPr>
-            <p:ph idx="1"/>
-          </p:nvPr>
-        </p:nvSpPr>
-        <p:spPr/>
-        <p:txBody>
-          <a:bodyPr/>
-          <a:lstStyle/>
-          <a:p>
-            <a:r>
-              <a:rPr lang="fr-FR" dirty="0" smtClean="0"/>
-              <a:t>Nous allons introduire 3 notions importantes :  on va commencer par introduire la notion d’objet avec les variables et le </a:t>
-            </a:r>
-            <a:r>
-              <a:rPr lang="fr-FR" dirty="0" smtClean="0"/>
-              <a:t>t</a:t>
-            </a:r>
-            <a:r>
-              <a:rPr lang="fr-FR" dirty="0" smtClean="0"/>
-              <a:t>ypage dynamique. Puis nous parlerons des types de bases, et nous finirons avec les techniques de factorisation de code que sont les boucles, les fonctions et les modules</a:t>
-            </a:r>
-          </a:p>
-          <a:p>
-            <a:r>
-              <a:rPr lang="fr-FR" dirty="0" smtClean="0"/>
-              <a:t>À </a:t>
-            </a:r>
-            <a:r>
-              <a:rPr lang="fr-FR" dirty="0" smtClean="0"/>
-              <a:t>la fin de cette vidéo vous connaitrez le minimum pour commencer à jouer avec Python</a:t>
-            </a:r>
-            <a:endParaRPr lang="fr-FR" dirty="0"/>
-          </a:p>
-        </p:txBody>
-      </p:sp>
-      <p:sp>
-        <p:nvSpPr>
-          <p:cNvPr id="4" name="ZoneTexte 3"/>
-          <p:cNvSpPr txBox="1"/>
-          <p:nvPr/>
-        </p:nvSpPr>
-        <p:spPr>
-          <a:xfrm>
-            <a:off x="0" y="92076"/>
-            <a:ext cx="1537855" cy="400110"/>
-          </a:xfrm>
-          <a:prstGeom prst="rect">
-            <a:avLst/>
-          </a:prstGeom>
-          <a:noFill/>
-          <a:ln>
-            <a:solidFill>
-              <a:srgbClr val="FF0000"/>
-            </a:solidFill>
-          </a:ln>
-        </p:spPr>
-        <p:txBody>
-          <a:bodyPr wrap="square" rtlCol="0">
-            <a:spAutoFit/>
-          </a:bodyPr>
-          <a:lstStyle/>
-          <a:p>
-            <a:r>
-              <a:rPr lang="fr-FR" sz="2000" dirty="0" smtClean="0">
-                <a:solidFill>
-                  <a:srgbClr val="FF0000"/>
-                </a:solidFill>
-                <a:latin typeface="Calibri" panose="020F0502020204030204" pitchFamily="34" charset="0"/>
-              </a:rPr>
-              <a:t>prompteur</a:t>
-            </a:r>
-            <a:endParaRPr lang="fr-FR" sz="2000" dirty="0">
-              <a:solidFill>
-                <a:srgbClr val="FF0000"/>
-              </a:solidFill>
-              <a:latin typeface="Calibri" panose="020F0502020204030204" pitchFamily="34" charset="0"/>
-            </a:endParaRPr>
-          </a:p>
-        </p:txBody>
-      </p:sp>
-    </p:spTree>
-    <p:extLst>
-      <p:ext uri="{BB962C8B-B14F-4D97-AF65-F5344CB8AC3E}">
-        <p14:creationId xmlns:p14="http://schemas.microsoft.com/office/powerpoint/2010/main" val="3367709972"/>
-      </p:ext>
-    </p:extLst>
-  </p:cSld>
-  <p:clrMapOvr>
-    <a:masterClrMapping/>
-  </p:clrMapOvr>
-  <p:timing>
-    <p:tnLst>
-      <p:par>
-        <p:cTn id="1" dur="indefinite" restart="never" nodeType="tmRoot"/>
-      </p:par>
-    </p:tnLst>
-  </p:timing>
-</p:sld>
-</file>
-
-<file path=ppt/slides/slide4.xml><?xml version="1.0" encoding="utf-8"?>
-<p:sld xmlns:a="http://schemas.openxmlformats.org/drawingml/2006/main" xmlns:r="http://schemas.openxmlformats.org/officeDocument/2006/relationships" xmlns:p="http://schemas.openxmlformats.org/presentationml/2006/main">
-  <p:cSld>
-    <p:spTree>
-      <p:nvGrpSpPr>
-        <p:cNvPr id="1" name=""/>
-        <p:cNvGrpSpPr/>
-        <p:nvPr/>
-      </p:nvGrpSpPr>
-      <p:grpSpPr>
-        <a:xfrm>
-          <a:off x="0" y="0"/>
-          <a:ext cx="0" cy="0"/>
-          <a:chOff x="0" y="0"/>
-          <a:chExt cx="0" cy="0"/>
-        </a:xfrm>
-      </p:grpSpPr>
-      <p:sp>
-        <p:nvSpPr>
-          <p:cNvPr id="4" name="Titre 3"/>
-          <p:cNvSpPr>
-            <a:spLocks noGrp="1"/>
-          </p:cNvSpPr>
-          <p:nvPr>
-            <p:ph type="ctrTitle"/>
-          </p:nvPr>
-        </p:nvSpPr>
-        <p:spPr/>
-        <p:txBody>
-          <a:bodyPr/>
-          <a:lstStyle/>
-          <a:p>
-            <a:r>
-              <a:rPr lang="fr-FR" dirty="0" smtClean="0"/>
-              <a:t>Total : 1 minute 5 secondes</a:t>
-            </a:r>
-            <a:endParaRPr lang="fr-FR" dirty="0"/>
-          </a:p>
-        </p:txBody>
-      </p:sp>
-      <p:sp>
-        <p:nvSpPr>
-          <p:cNvPr id="5" name="Sous-titre 4"/>
-          <p:cNvSpPr>
-            <a:spLocks noGrp="1"/>
-          </p:cNvSpPr>
-          <p:nvPr>
-            <p:ph type="subTitle" idx="1"/>
-          </p:nvPr>
-        </p:nvSpPr>
-        <p:spPr/>
-        <p:txBody>
-          <a:bodyPr/>
-          <a:lstStyle/>
-          <a:p>
-            <a:endParaRPr lang="fr-FR"/>
-          </a:p>
-        </p:txBody>
-      </p:sp>
-    </p:spTree>
-    <p:extLst>
-      <p:ext uri="{BB962C8B-B14F-4D97-AF65-F5344CB8AC3E}">
-        <p14:creationId xmlns:p14="http://schemas.microsoft.com/office/powerpoint/2010/main" val="708715459"/>
-      </p:ext>
-    </p:extLst>
-  </p:cSld>
-  <p:clrMapOvr>
-    <a:masterClrMapping/>
-  </p:clrMapOvr>
-  <p:timing>
-    <p:tnLst>
-      <p:par>
-        <p:cTn id="1" dur="indefinite" restart="never" nodeType="tmRoot"/>
-      </p:par>
-    </p:tnLst>
-  </p:timing>
-</p:sld>
-</file>
-
-<file path=ppt/slides/slide5.xml><?xml version="1.0" encoding="utf-8"?>
-<p:sld xmlns:a="http://schemas.openxmlformats.org/drawingml/2006/main" xmlns:r="http://schemas.openxmlformats.org/officeDocument/2006/relationships" xmlns:p="http://schemas.openxmlformats.org/presentationml/2006/main">
-  <p:cSld>
-    <p:spTree>
-      <p:nvGrpSpPr>
-        <p:cNvPr id="1" name=""/>
-        <p:cNvGrpSpPr/>
-        <p:nvPr/>
-      </p:nvGrpSpPr>
-      <p:grpSpPr>
-        <a:xfrm>
-          <a:off x="0" y="0"/>
-          <a:ext cx="0" cy="0"/>
-          <a:chOff x="0" y="0"/>
-          <a:chExt cx="0" cy="0"/>
-        </a:xfrm>
-      </p:grpSpPr>
-      <p:sp>
-        <p:nvSpPr>
-          <p:cNvPr id="2" name="Titre 1"/>
-          <p:cNvSpPr>
-            <a:spLocks noGrp="1"/>
-          </p:cNvSpPr>
-          <p:nvPr>
-            <p:ph type="title"/>
-          </p:nvPr>
-        </p:nvSpPr>
-        <p:spPr/>
-        <p:txBody>
-          <a:bodyPr/>
-          <a:lstStyle/>
-          <a:p>
-            <a:r>
-              <a:rPr lang="fr-FR" dirty="0" smtClean="0"/>
-              <a:t>Nouvelle </a:t>
-            </a:r>
-            <a:r>
-              <a:rPr lang="fr-FR" dirty="0" smtClean="0"/>
-              <a:t>séquence</a:t>
-            </a:r>
-            <a:endParaRPr lang="fr-FR" dirty="0"/>
-          </a:p>
-        </p:txBody>
-      </p:sp>
-      <p:sp>
-        <p:nvSpPr>
-          <p:cNvPr id="3" name="Espace réservé du contenu 2"/>
-          <p:cNvSpPr>
-            <a:spLocks noGrp="1"/>
-          </p:cNvSpPr>
-          <p:nvPr>
-            <p:ph idx="1"/>
-          </p:nvPr>
-        </p:nvSpPr>
-        <p:spPr/>
-        <p:txBody>
-          <a:bodyPr/>
-          <a:lstStyle/>
-          <a:p>
-            <a:endParaRPr lang="fr-FR"/>
-          </a:p>
-        </p:txBody>
-      </p:sp>
-    </p:spTree>
-    <p:extLst>
-      <p:ext uri="{BB962C8B-B14F-4D97-AF65-F5344CB8AC3E}">
-        <p14:creationId xmlns:p14="http://schemas.microsoft.com/office/powerpoint/2010/main" val="3107198915"/>
-      </p:ext>
-    </p:extLst>
-  </p:cSld>
-  <p:clrMapOvr>
-    <a:masterClrMapping/>
-  </p:clrMapOvr>
-  <p:timing>
-    <p:tnLst>
-      <p:par>
-        <p:cTn id="1" dur="indefinite" restart="never" nodeType="tmRoot"/>
-      </p:par>
-    </p:tnLst>
-  </p:timing>
-</p:sld>
-</file>
-
-<file path=ppt/slides/slide6.xml><?xml version="1.0" encoding="utf-8"?>
-<p:sld xmlns:a="http://schemas.openxmlformats.org/drawingml/2006/main" xmlns:r="http://schemas.openxmlformats.org/officeDocument/2006/relationships" xmlns:p="http://schemas.openxmlformats.org/presentationml/2006/main">
-  <p:cSld>
-    <p:spTree>
-      <p:nvGrpSpPr>
-        <p:cNvPr id="1" name=""/>
-        <p:cNvGrpSpPr/>
-        <p:nvPr/>
-      </p:nvGrpSpPr>
-      <p:grpSpPr>
-        <a:xfrm>
-          <a:off x="0" y="0"/>
-          <a:ext cx="0" cy="0"/>
-          <a:chOff x="0" y="0"/>
-          <a:chExt cx="0" cy="0"/>
-        </a:xfrm>
-      </p:grpSpPr>
-      <p:sp>
-        <p:nvSpPr>
-          <p:cNvPr id="2" name="Titre 1"/>
-          <p:cNvSpPr>
-            <a:spLocks noGrp="1"/>
-          </p:cNvSpPr>
-          <p:nvPr>
-            <p:ph type="title"/>
-          </p:nvPr>
-        </p:nvSpPr>
-        <p:spPr/>
-        <p:txBody>
-          <a:bodyPr/>
-          <a:lstStyle/>
-          <a:p>
-            <a:r>
-              <a:rPr lang="fr-FR" dirty="0" smtClean="0"/>
-              <a:t>Définition d’un objet(27s)</a:t>
-            </a:r>
-            <a:endParaRPr lang="fr-FR" dirty="0"/>
-          </a:p>
-        </p:txBody>
-      </p:sp>
-      <p:sp>
-        <p:nvSpPr>
-          <p:cNvPr id="3" name="Espace réservé du contenu 2"/>
-          <p:cNvSpPr>
-            <a:spLocks noGrp="1"/>
-          </p:cNvSpPr>
-          <p:nvPr>
-            <p:ph idx="1"/>
-          </p:nvPr>
-        </p:nvSpPr>
-        <p:spPr/>
-        <p:txBody>
-          <a:bodyPr/>
-          <a:lstStyle/>
-          <a:p>
-            <a:r>
-              <a:rPr lang="fr-FR" sz="2800" dirty="0" smtClean="0"/>
-              <a:t>Nous allons voir dans le suite la notion d’objet, de variable et de typage dynamique. </a:t>
-            </a:r>
-          </a:p>
-          <a:p>
-            <a:r>
-              <a:rPr lang="fr-FR" sz="2800" dirty="0" smtClean="0"/>
-              <a:t>Je vais maintenir définir la notion d’</a:t>
-            </a:r>
-            <a:r>
-              <a:rPr lang="fr-FR" sz="2800" dirty="0" smtClean="0"/>
-              <a:t>objet. </a:t>
-            </a:r>
-            <a:r>
-              <a:rPr lang="fr-FR" sz="2800" dirty="0" smtClean="0"/>
-              <a:t>En informatique, un objet est un morceau de programme qui peut stocker de l’information et qui a un ensemble de mécanismes, que l’on appelle méthodes, qui permettent d’effectuer des taches. Le type de l’objet va définir les informations et les méthodes qui existent par défaut à la création de l’objet. Regardons maintenant un exemple de création d’objet…</a:t>
-            </a:r>
-            <a:endParaRPr lang="fr-FR" sz="2800" dirty="0"/>
-          </a:p>
-        </p:txBody>
-      </p:sp>
-      <p:sp>
-        <p:nvSpPr>
-          <p:cNvPr id="4" name="ZoneTexte 3"/>
-          <p:cNvSpPr txBox="1"/>
-          <p:nvPr/>
-        </p:nvSpPr>
-        <p:spPr>
-          <a:xfrm>
-            <a:off x="0" y="92076"/>
-            <a:ext cx="1537855" cy="400110"/>
-          </a:xfrm>
-          <a:prstGeom prst="rect">
-            <a:avLst/>
-          </a:prstGeom>
-          <a:noFill/>
-          <a:ln>
-            <a:solidFill>
-              <a:srgbClr val="FF0000"/>
-            </a:solidFill>
-          </a:ln>
-        </p:spPr>
-        <p:txBody>
-          <a:bodyPr wrap="square" rtlCol="0">
-            <a:spAutoFit/>
-          </a:bodyPr>
-          <a:lstStyle/>
-          <a:p>
-            <a:r>
-              <a:rPr lang="fr-FR" sz="2000" dirty="0" smtClean="0">
-                <a:solidFill>
-                  <a:srgbClr val="FF0000"/>
-                </a:solidFill>
-                <a:latin typeface="Calibri" panose="020F0502020204030204" pitchFamily="34" charset="0"/>
-              </a:rPr>
-              <a:t>prompteur</a:t>
-            </a:r>
-            <a:endParaRPr lang="fr-FR" sz="2000" dirty="0">
-              <a:solidFill>
-                <a:srgbClr val="FF0000"/>
-              </a:solidFill>
-              <a:latin typeface="Calibri" panose="020F0502020204030204" pitchFamily="34" charset="0"/>
-            </a:endParaRPr>
-          </a:p>
-        </p:txBody>
-      </p:sp>
-    </p:spTree>
-    <p:extLst>
-      <p:ext uri="{BB962C8B-B14F-4D97-AF65-F5344CB8AC3E}">
-        <p14:creationId xmlns:p14="http://schemas.microsoft.com/office/powerpoint/2010/main" val="3871509048"/>
-      </p:ext>
-    </p:extLst>
-  </p:cSld>
-  <p:clrMapOvr>
-    <a:masterClrMapping/>
-  </p:clrMapOvr>
-  <p:timing>
-    <p:tnLst>
-      <p:par>
-        <p:cTn id="1" dur="indefinite" restart="never" nodeType="tmRoot"/>
-      </p:par>
-    </p:tnLst>
-  </p:timing>
-</p:sld>
-</file>
-
-<file path=ppt/slides/slide7.xml><?xml version="1.0" encoding="utf-8"?>
-<p:sld xmlns:a="http://schemas.openxmlformats.org/drawingml/2006/main" xmlns:r="http://schemas.openxmlformats.org/officeDocument/2006/relationships" xmlns:p="http://schemas.openxmlformats.org/presentationml/2006/main">
-  <p:cSld>
-    <p:spTree>
-      <p:nvGrpSpPr>
-        <p:cNvPr id="1" name=""/>
-        <p:cNvGrpSpPr/>
-        <p:nvPr/>
-      </p:nvGrpSpPr>
-      <p:grpSpPr>
-        <a:xfrm>
-          <a:off x="0" y="0"/>
-          <a:ext cx="0" cy="0"/>
-          <a:chOff x="0" y="0"/>
-          <a:chExt cx="0" cy="0"/>
-        </a:xfrm>
-      </p:grpSpPr>
-      <p:sp>
-        <p:nvSpPr>
-          <p:cNvPr id="5" name="Rectangle 4"/>
-          <p:cNvSpPr/>
-          <p:nvPr/>
-        </p:nvSpPr>
-        <p:spPr bwMode="auto">
-          <a:xfrm>
-            <a:off x="984738" y="917331"/>
-            <a:ext cx="2510693" cy="2184400"/>
-          </a:xfrm>
-          <a:prstGeom prst="rect">
-            <a:avLst/>
-          </a:prstGeom>
-          <a:noFill/>
-          <a:ln w="38100" cap="flat" cmpd="sng" algn="ctr">
-            <a:solidFill>
-              <a:srgbClr val="FF0000"/>
-            </a:solidFill>
-            <a:prstDash val="solid"/>
-            <a:round/>
-            <a:headEnd type="none" w="med" len="med"/>
-            <a:tailEnd type="none" w="med" len="med"/>
-          </a:ln>
-          <a:effectLst/>
-        </p:spPr>
-        <p:txBody>
-          <a:bodyPr vert="horz" wrap="square" lIns="90000" tIns="46800" rIns="90000" bIns="46800" numCol="1" rtlCol="0" anchor="ctr" anchorCtr="0" compatLnSpc="1">
-            <a:prstTxWarp prst="textNoShape">
-              <a:avLst/>
-            </a:prstTxWarp>
-            <a:spAutoFit/>
-          </a:bodyPr>
-          <a:lstStyle/>
-          <a:p>
-            <a:pPr marL="0" marR="0" indent="0" algn="ctr" defTabSz="914400" rtl="0" eaLnBrk="1" fontAlgn="base" latinLnBrk="0" hangingPunct="1">
-              <a:lnSpc>
-                <a:spcPct val="100000"/>
-              </a:lnSpc>
-              <a:spcBef>
-                <a:spcPct val="50000"/>
-              </a:spcBef>
-              <a:spcAft>
-                <a:spcPct val="0"/>
-              </a:spcAft>
-              <a:buClrTx/>
-              <a:buSzTx/>
-              <a:buFontTx/>
-              <a:buNone/>
-              <a:tabLst/>
-            </a:pPr>
-            <a:endParaRPr kumimoji="0" lang="fr-FR" sz="2400" b="0" i="0" u="none" strike="noStrike" cap="none" normalizeH="0" baseline="0" smtClean="0">
-              <a:ln>
-                <a:noFill/>
-              </a:ln>
-              <a:solidFill>
-                <a:schemeClr val="tx1"/>
-              </a:solidFill>
-              <a:effectLst/>
-              <a:latin typeface="Comic Sans MS" pitchFamily="66" charset="0"/>
-            </a:endParaRPr>
-          </a:p>
-        </p:txBody>
-      </p:sp>
-      <p:sp>
-        <p:nvSpPr>
-          <p:cNvPr id="3" name="ZoneTexte 2"/>
-          <p:cNvSpPr txBox="1"/>
-          <p:nvPr/>
-        </p:nvSpPr>
-        <p:spPr>
-          <a:xfrm>
-            <a:off x="855785" y="4466492"/>
-            <a:ext cx="7514492" cy="830997"/>
-          </a:xfrm>
-          <a:prstGeom prst="rect">
-            <a:avLst/>
-          </a:prstGeom>
-          <a:solidFill>
-            <a:schemeClr val="bg1"/>
-          </a:solidFill>
-        </p:spPr>
-        <p:txBody>
-          <a:bodyPr wrap="square" rtlCol="0">
-            <a:spAutoFit/>
-          </a:bodyPr>
-          <a:lstStyle/>
-          <a:p>
-            <a:r>
-              <a:rPr lang="fr-FR" dirty="0" smtClean="0">
-                <a:latin typeface="Courier New" panose="02070309020205020404" pitchFamily="49" charset="0"/>
-                <a:cs typeface="Courier New" panose="02070309020205020404" pitchFamily="49" charset="0"/>
-              </a:rPr>
-              <a:t>'spam'.</a:t>
-            </a:r>
-            <a:r>
-              <a:rPr lang="fr-FR" dirty="0" err="1" smtClean="0">
-                <a:latin typeface="Courier New" panose="02070309020205020404" pitchFamily="49" charset="0"/>
-                <a:cs typeface="Courier New" panose="02070309020205020404" pitchFamily="49" charset="0"/>
-              </a:rPr>
-              <a:t>upper</a:t>
-            </a:r>
-            <a:r>
-              <a:rPr lang="fr-FR" dirty="0">
-                <a:latin typeface="Courier New" panose="02070309020205020404" pitchFamily="49" charset="0"/>
-                <a:cs typeface="Courier New" panose="02070309020205020404" pitchFamily="49" charset="0"/>
-              </a:rPr>
-              <a:t>()</a:t>
-            </a:r>
-          </a:p>
-          <a:p>
-            <a:endParaRPr lang="fr-FR" dirty="0">
-              <a:latin typeface="Courier New" panose="02070309020205020404" pitchFamily="49" charset="0"/>
-              <a:cs typeface="Courier New" panose="02070309020205020404" pitchFamily="49" charset="0"/>
-            </a:endParaRPr>
-          </a:p>
-        </p:txBody>
-      </p:sp>
-      <p:sp>
-        <p:nvSpPr>
-          <p:cNvPr id="10" name="ZoneTexte 9"/>
-          <p:cNvSpPr txBox="1"/>
-          <p:nvPr/>
-        </p:nvSpPr>
-        <p:spPr>
-          <a:xfrm>
-            <a:off x="984738" y="351550"/>
-            <a:ext cx="5061438" cy="461665"/>
-          </a:xfrm>
-          <a:prstGeom prst="rect">
-            <a:avLst/>
-          </a:prstGeom>
-          <a:noFill/>
-        </p:spPr>
-        <p:txBody>
-          <a:bodyPr wrap="square" rtlCol="0">
-            <a:spAutoFit/>
-          </a:bodyPr>
-          <a:lstStyle/>
-          <a:p>
-            <a:r>
-              <a:rPr lang="fr-FR" dirty="0" smtClean="0">
-                <a:latin typeface="Calibri" panose="020F0502020204030204" pitchFamily="34" charset="0"/>
-              </a:rPr>
-              <a:t>Objet de type chaîne de caractères</a:t>
-            </a:r>
-            <a:endParaRPr lang="fr-FR" dirty="0">
-              <a:latin typeface="Calibri" panose="020F0502020204030204" pitchFamily="34" charset="0"/>
-            </a:endParaRPr>
-          </a:p>
-        </p:txBody>
-      </p:sp>
-      <p:sp>
-        <p:nvSpPr>
-          <p:cNvPr id="13" name="ZoneTexte 12"/>
-          <p:cNvSpPr txBox="1"/>
-          <p:nvPr/>
-        </p:nvSpPr>
-        <p:spPr>
-          <a:xfrm>
-            <a:off x="1069730" y="1080239"/>
-            <a:ext cx="2341684" cy="830997"/>
-          </a:xfrm>
-          <a:prstGeom prst="rect">
-            <a:avLst/>
-          </a:prstGeom>
-          <a:noFill/>
-        </p:spPr>
-        <p:txBody>
-          <a:bodyPr wrap="square" rtlCol="0">
-            <a:spAutoFit/>
-          </a:bodyPr>
-          <a:lstStyle/>
-          <a:p>
-            <a:r>
-              <a:rPr lang="fr-FR" u="sng" dirty="0" smtClean="0">
-                <a:latin typeface="Calibri" panose="020F0502020204030204" pitchFamily="34" charset="0"/>
-              </a:rPr>
-              <a:t>Information:</a:t>
-            </a:r>
-          </a:p>
-          <a:p>
-            <a:r>
-              <a:rPr lang="fr-FR" dirty="0" smtClean="0">
-                <a:latin typeface="Calibri" panose="020F0502020204030204" pitchFamily="34" charset="0"/>
-              </a:rPr>
-              <a:t>'spam'</a:t>
-            </a:r>
-            <a:endParaRPr lang="fr-FR" dirty="0">
-              <a:latin typeface="Calibri" panose="020F0502020204030204" pitchFamily="34" charset="0"/>
-            </a:endParaRPr>
-          </a:p>
-        </p:txBody>
-      </p:sp>
-      <p:sp>
-        <p:nvSpPr>
-          <p:cNvPr id="14" name="ZoneTexte 13"/>
-          <p:cNvSpPr txBox="1"/>
-          <p:nvPr/>
-        </p:nvSpPr>
-        <p:spPr>
-          <a:xfrm>
-            <a:off x="1069242" y="1875119"/>
-            <a:ext cx="2341684" cy="1200329"/>
-          </a:xfrm>
-          <a:prstGeom prst="rect">
-            <a:avLst/>
-          </a:prstGeom>
-          <a:noFill/>
-        </p:spPr>
-        <p:txBody>
-          <a:bodyPr wrap="square" rtlCol="0">
-            <a:spAutoFit/>
-          </a:bodyPr>
-          <a:lstStyle/>
-          <a:p>
-            <a:r>
-              <a:rPr lang="fr-FR" u="sng" dirty="0" smtClean="0">
-                <a:latin typeface="Calibri" panose="020F0502020204030204" pitchFamily="34" charset="0"/>
-              </a:rPr>
-              <a:t>Méthodes</a:t>
-            </a:r>
-            <a:r>
-              <a:rPr lang="fr-FR" dirty="0" smtClean="0">
-                <a:latin typeface="Calibri" panose="020F0502020204030204" pitchFamily="34" charset="0"/>
-              </a:rPr>
-              <a:t>:</a:t>
-            </a:r>
-          </a:p>
-          <a:p>
-            <a:r>
-              <a:rPr lang="fr-FR" dirty="0" smtClean="0">
-                <a:latin typeface="Calibri" panose="020F0502020204030204" pitchFamily="34" charset="0"/>
-              </a:rPr>
-              <a:t>…</a:t>
-            </a:r>
-          </a:p>
-          <a:p>
-            <a:r>
-              <a:rPr lang="fr-FR" dirty="0" err="1" smtClean="0">
-                <a:latin typeface="Calibri" panose="020F0502020204030204" pitchFamily="34" charset="0"/>
-              </a:rPr>
-              <a:t>upper</a:t>
-            </a:r>
-            <a:r>
-              <a:rPr lang="fr-FR" dirty="0" smtClean="0">
-                <a:latin typeface="Calibri" panose="020F0502020204030204" pitchFamily="34" charset="0"/>
-              </a:rPr>
-              <a:t>()</a:t>
-            </a:r>
-            <a:endParaRPr lang="fr-FR" dirty="0">
-              <a:latin typeface="Calibri" panose="020F0502020204030204" pitchFamily="34" charset="0"/>
-            </a:endParaRPr>
-          </a:p>
-        </p:txBody>
-      </p:sp>
-      <p:cxnSp>
-        <p:nvCxnSpPr>
-          <p:cNvPr id="16" name="Connecteur droit avec flèche 15"/>
-          <p:cNvCxnSpPr/>
-          <p:nvPr/>
-        </p:nvCxnSpPr>
-        <p:spPr bwMode="auto">
-          <a:xfrm flipH="1">
-            <a:off x="2145323" y="4214445"/>
-            <a:ext cx="386862" cy="504093"/>
-          </a:xfrm>
-          <a:prstGeom prst="straightConnector1">
-            <a:avLst/>
-          </a:prstGeom>
-          <a:noFill/>
-          <a:ln w="53975" cap="flat" cmpd="sng" algn="ctr">
-            <a:solidFill>
-              <a:srgbClr val="FF0000"/>
-            </a:solidFill>
-            <a:prstDash val="solid"/>
-            <a:round/>
-            <a:headEnd type="none" w="med" len="med"/>
-            <a:tailEnd type="triangle" w="med" len="med"/>
-          </a:ln>
-          <a:effectLst/>
-        </p:spPr>
-      </p:cxnSp>
-      <p:sp>
-        <p:nvSpPr>
-          <p:cNvPr id="17" name="ZoneTexte 16"/>
-          <p:cNvSpPr txBox="1"/>
-          <p:nvPr/>
-        </p:nvSpPr>
-        <p:spPr>
-          <a:xfrm>
-            <a:off x="855785" y="4466491"/>
-            <a:ext cx="7514492" cy="830997"/>
-          </a:xfrm>
-          <a:prstGeom prst="rect">
-            <a:avLst/>
-          </a:prstGeom>
-          <a:noFill/>
-        </p:spPr>
-        <p:txBody>
-          <a:bodyPr wrap="square" rtlCol="0">
-            <a:spAutoFit/>
-          </a:bodyPr>
-          <a:lstStyle/>
-          <a:p>
-            <a:r>
-              <a:rPr lang="fr-FR" dirty="0" smtClean="0">
-                <a:latin typeface="Courier New" panose="02070309020205020404" pitchFamily="49" charset="0"/>
-                <a:cs typeface="Courier New" panose="02070309020205020404" pitchFamily="49" charset="0"/>
-              </a:rPr>
-              <a:t>'spam'</a:t>
-            </a:r>
-            <a:endParaRPr lang="fr-FR" dirty="0">
-              <a:latin typeface="Courier New" panose="02070309020205020404" pitchFamily="49" charset="0"/>
-              <a:cs typeface="Courier New" panose="02070309020205020404" pitchFamily="49" charset="0"/>
-            </a:endParaRPr>
-          </a:p>
-          <a:p>
-            <a:endParaRPr lang="fr-FR" dirty="0">
-              <a:latin typeface="Courier New" panose="02070309020205020404" pitchFamily="49" charset="0"/>
-              <a:cs typeface="Courier New" panose="02070309020205020404" pitchFamily="49" charset="0"/>
-            </a:endParaRPr>
-          </a:p>
-        </p:txBody>
-      </p:sp>
-      <p:sp>
-        <p:nvSpPr>
-          <p:cNvPr id="18" name="ZoneTexte 17"/>
-          <p:cNvSpPr txBox="1"/>
-          <p:nvPr/>
-        </p:nvSpPr>
-        <p:spPr>
-          <a:xfrm>
-            <a:off x="855785" y="5000255"/>
-            <a:ext cx="7514492" cy="830997"/>
-          </a:xfrm>
-          <a:prstGeom prst="rect">
-            <a:avLst/>
-          </a:prstGeom>
-          <a:noFill/>
-        </p:spPr>
-        <p:txBody>
-          <a:bodyPr wrap="square" rtlCol="0">
-            <a:spAutoFit/>
-          </a:bodyPr>
-          <a:lstStyle/>
-          <a:p>
-            <a:r>
-              <a:rPr lang="fr-FR" dirty="0" smtClean="0">
-                <a:latin typeface="Courier New" panose="02070309020205020404" pitchFamily="49" charset="0"/>
-                <a:cs typeface="Courier New" panose="02070309020205020404" pitchFamily="49" charset="0"/>
-              </a:rPr>
-              <a:t>'SPAM'</a:t>
-            </a:r>
-            <a:endParaRPr lang="fr-FR" dirty="0">
-              <a:latin typeface="Courier New" panose="02070309020205020404" pitchFamily="49" charset="0"/>
-              <a:cs typeface="Courier New" panose="02070309020205020404" pitchFamily="49" charset="0"/>
-            </a:endParaRPr>
-          </a:p>
-          <a:p>
-            <a:endParaRPr lang="fr-FR" dirty="0">
-              <a:latin typeface="Courier New" panose="02070309020205020404" pitchFamily="49" charset="0"/>
-              <a:cs typeface="Courier New" panose="02070309020205020404" pitchFamily="49" charset="0"/>
-            </a:endParaRPr>
-          </a:p>
-        </p:txBody>
-      </p:sp>
-    </p:spTree>
-    <p:extLst>
-      <p:ext uri="{BB962C8B-B14F-4D97-AF65-F5344CB8AC3E}">
-        <p14:creationId xmlns:p14="http://schemas.microsoft.com/office/powerpoint/2010/main" val="3072409533"/>
-      </p:ext>
-    </p:extLst>
-  </p:cSld>
-  <p:clrMapOvr>
-    <a:masterClrMapping/>
-  </p:clrMapOvr>
-  <p:timing>
-    <p:tnLst>
-      <p:par>
-        <p:cTn id="1" dur="indefinite" restart="never" nodeType="tmRoot">
-          <p:childTnLst>
-            <p:seq concurrent="1" nextAc="seek">
-              <p:cTn id="2" dur="indefinite" nodeType="mainSeq">
-                <p:childTnLst>
-                  <p:par>
-                    <p:cTn id="3" fill="hold">
-                      <p:stCondLst>
-                        <p:cond delay="indefinite"/>
-                      </p:stCondLst>
-                      <p:childTnLst>
-                        <p:par>
-                          <p:cTn id="4" fill="hold">
-                            <p:stCondLst>
-                              <p:cond delay="0"/>
-                            </p:stCondLst>
-                            <p:childTnLst>
-                              <p:par>
-                                <p:cTn id="5" presetID="10" presetClass="entr" presetSubtype="0" fill="hold" grpId="0" nodeType="clickEffect">
-                                  <p:stCondLst>
-                                    <p:cond delay="0"/>
-                                  </p:stCondLst>
-                                  <p:childTnLst>
-                                    <p:set>
-                                      <p:cBhvr>
-                                        <p:cTn id="6" dur="1" fill="hold">
-                                          <p:stCondLst>
-                                            <p:cond delay="0"/>
-                                          </p:stCondLst>
-                                        </p:cTn>
-                                        <p:tgtEl>
-                                          <p:spTgt spid="17"/>
-                                        </p:tgtEl>
-                                        <p:attrNameLst>
-                                          <p:attrName>style.visibility</p:attrName>
-                                        </p:attrNameLst>
-                                      </p:cBhvr>
-                                      <p:to>
-                                        <p:strVal val="visible"/>
-                                      </p:to>
-                                    </p:set>
-                                    <p:animEffect transition="in" filter="fade">
-                                      <p:cBhvr>
-                                        <p:cTn id="7" dur="500"/>
-                                        <p:tgtEl>
-                                          <p:spTgt spid="17"/>
-                                        </p:tgtEl>
-                                      </p:cBhvr>
-                                    </p:animEffect>
-                                  </p:childTnLst>
-                                </p:cTn>
-                              </p:par>
-                            </p:childTnLst>
-                          </p:cTn>
-                        </p:par>
-                      </p:childTnLst>
-                    </p:cTn>
-                  </p:par>
-                  <p:par>
-                    <p:cTn id="8" fill="hold">
-                      <p:stCondLst>
-                        <p:cond delay="indefinite"/>
-                      </p:stCondLst>
-                      <p:childTnLst>
-                        <p:par>
-                          <p:cTn id="9" fill="hold">
-                            <p:stCondLst>
-                              <p:cond delay="0"/>
-                            </p:stCondLst>
-                            <p:childTnLst>
-                              <p:par>
-                                <p:cTn id="10" presetID="10" presetClass="entr" presetSubtype="0" fill="hold" grpId="0" nodeType="clickEffect">
-                                  <p:stCondLst>
-                                    <p:cond delay="0"/>
-                                  </p:stCondLst>
-                                  <p:childTnLst>
-                                    <p:set>
-                                      <p:cBhvr>
-                                        <p:cTn id="11" dur="1" fill="hold">
-                                          <p:stCondLst>
-                                            <p:cond delay="0"/>
-                                          </p:stCondLst>
-                                        </p:cTn>
-                                        <p:tgtEl>
-                                          <p:spTgt spid="5"/>
-                                        </p:tgtEl>
-                                        <p:attrNameLst>
-                                          <p:attrName>style.visibility</p:attrName>
-                                        </p:attrNameLst>
-                                      </p:cBhvr>
-                                      <p:to>
-                                        <p:strVal val="visible"/>
-                                      </p:to>
-                                    </p:set>
-                                    <p:animEffect transition="in" filter="fade">
-                                      <p:cBhvr>
-                                        <p:cTn id="12" dur="500"/>
-                                        <p:tgtEl>
-                                          <p:spTgt spid="5"/>
-                                        </p:tgtEl>
-                                      </p:cBhvr>
-                                    </p:animEffect>
-                                  </p:childTnLst>
-                                </p:cTn>
-                              </p:par>
-                              <p:par>
-                                <p:cTn id="13" presetID="10" presetClass="entr" presetSubtype="0" fill="hold" grpId="0" nodeType="withEffect">
-                                  <p:stCondLst>
-                                    <p:cond delay="0"/>
-                                  </p:stCondLst>
-                                  <p:childTnLst>
-                                    <p:set>
-                                      <p:cBhvr>
-                                        <p:cTn id="14" dur="1" fill="hold">
-                                          <p:stCondLst>
-                                            <p:cond delay="0"/>
-                                          </p:stCondLst>
-                                        </p:cTn>
-                                        <p:tgtEl>
-                                          <p:spTgt spid="10"/>
-                                        </p:tgtEl>
-                                        <p:attrNameLst>
-                                          <p:attrName>style.visibility</p:attrName>
-                                        </p:attrNameLst>
-                                      </p:cBhvr>
-                                      <p:to>
-                                        <p:strVal val="visible"/>
-                                      </p:to>
-                                    </p:set>
-                                    <p:animEffect transition="in" filter="fade">
-                                      <p:cBhvr>
-                                        <p:cTn id="15" dur="500"/>
-                                        <p:tgtEl>
-                                          <p:spTgt spid="10"/>
-                                        </p:tgtEl>
-                                      </p:cBhvr>
-                                    </p:animEffect>
-                                  </p:childTnLst>
-                                </p:cTn>
-                              </p:par>
-                              <p:par>
-                                <p:cTn id="16" presetID="10" presetClass="entr" presetSubtype="0" fill="hold" grpId="0" nodeType="withEffect">
-                                  <p:stCondLst>
-                                    <p:cond delay="0"/>
-                                  </p:stCondLst>
-                                  <p:childTnLst>
-                                    <p:set>
-                                      <p:cBhvr>
-                                        <p:cTn id="17" dur="1" fill="hold">
-                                          <p:stCondLst>
-                                            <p:cond delay="0"/>
-                                          </p:stCondLst>
-                                        </p:cTn>
-                                        <p:tgtEl>
-                                          <p:spTgt spid="13"/>
-                                        </p:tgtEl>
-                                        <p:attrNameLst>
-                                          <p:attrName>style.visibility</p:attrName>
-                                        </p:attrNameLst>
-                                      </p:cBhvr>
-                                      <p:to>
-                                        <p:strVal val="visible"/>
-                                      </p:to>
-                                    </p:set>
-                                    <p:animEffect transition="in" filter="fade">
-                                      <p:cBhvr>
-                                        <p:cTn id="18" dur="500"/>
-                                        <p:tgtEl>
-                                          <p:spTgt spid="13"/>
-                                        </p:tgtEl>
-                                      </p:cBhvr>
-                                    </p:animEffect>
-                                  </p:childTnLst>
-                                </p:cTn>
-                              </p:par>
-                              <p:par>
-                                <p:cTn id="19" presetID="10" presetClass="entr" presetSubtype="0" fill="hold" grpId="0" nodeType="withEffect">
-                                  <p:stCondLst>
-                                    <p:cond delay="0"/>
-                                  </p:stCondLst>
-                                  <p:childTnLst>
-                                    <p:set>
-                                      <p:cBhvr>
-                                        <p:cTn id="20" dur="1" fill="hold">
-                                          <p:stCondLst>
-                                            <p:cond delay="0"/>
-                                          </p:stCondLst>
-                                        </p:cTn>
-                                        <p:tgtEl>
-                                          <p:spTgt spid="14"/>
-                                        </p:tgtEl>
-                                        <p:attrNameLst>
-                                          <p:attrName>style.visibility</p:attrName>
-                                        </p:attrNameLst>
-                                      </p:cBhvr>
-                                      <p:to>
-                                        <p:strVal val="visible"/>
-                                      </p:to>
-                                    </p:set>
-                                    <p:animEffect transition="in" filter="fade">
-                                      <p:cBhvr>
-                                        <p:cTn id="21" dur="500"/>
-                                        <p:tgtEl>
-                                          <p:spTgt spid="14"/>
-                                        </p:tgtEl>
-                                      </p:cBhvr>
-                                    </p:animEffect>
-                                  </p:childTnLst>
-                                </p:cTn>
-                              </p:par>
-                            </p:childTnLst>
-                          </p:cTn>
-                        </p:par>
-                      </p:childTnLst>
-                    </p:cTn>
-                  </p:par>
-                  <p:par>
-                    <p:cTn id="22" fill="hold">
-                      <p:stCondLst>
-                        <p:cond delay="indefinite"/>
-                      </p:stCondLst>
-                      <p:childTnLst>
-                        <p:par>
-                          <p:cTn id="23" fill="hold">
-                            <p:stCondLst>
-                              <p:cond delay="0"/>
-                            </p:stCondLst>
-                            <p:childTnLst>
-                              <p:par>
-                                <p:cTn id="24" presetID="10" presetClass="entr" presetSubtype="0" fill="hold" nodeType="clickEffect">
-                                  <p:stCondLst>
-                                    <p:cond delay="0"/>
-                                  </p:stCondLst>
-                                  <p:childTnLst>
-                                    <p:set>
-                                      <p:cBhvr>
-                                        <p:cTn id="25" dur="1" fill="hold">
-                                          <p:stCondLst>
-                                            <p:cond delay="0"/>
-                                          </p:stCondLst>
-                                        </p:cTn>
-                                        <p:tgtEl>
-                                          <p:spTgt spid="3">
-                                            <p:txEl>
-                                              <p:pRg st="0" end="0"/>
-                                            </p:txEl>
-                                          </p:spTgt>
-                                        </p:tgtEl>
-                                        <p:attrNameLst>
-                                          <p:attrName>style.visibility</p:attrName>
-                                        </p:attrNameLst>
-                                      </p:cBhvr>
-                                      <p:to>
-                                        <p:strVal val="visible"/>
-                                      </p:to>
-                                    </p:set>
-                                    <p:animEffect transition="in" filter="fade">
-                                      <p:cBhvr>
-                                        <p:cTn id="26" dur="500"/>
-                                        <p:tgtEl>
-                                          <p:spTgt spid="3">
-                                            <p:txEl>
-                                              <p:pRg st="0" end="0"/>
-                                            </p:txEl>
-                                          </p:spTgt>
-                                        </p:tgtEl>
-                                      </p:cBhvr>
-                                    </p:animEffect>
-                                  </p:childTnLst>
-                                </p:cTn>
-                              </p:par>
-                            </p:childTnLst>
-                          </p:cTn>
-                        </p:par>
-                      </p:childTnLst>
-                    </p:cTn>
-                  </p:par>
-                  <p:par>
-                    <p:cTn id="27" fill="hold">
-                      <p:stCondLst>
-                        <p:cond delay="indefinite"/>
-                      </p:stCondLst>
-                      <p:childTnLst>
-                        <p:par>
-                          <p:cTn id="28" fill="hold">
-                            <p:stCondLst>
-                              <p:cond delay="0"/>
-                            </p:stCondLst>
-                            <p:childTnLst>
-                              <p:par>
-                                <p:cTn id="29" presetID="10" presetClass="entr" presetSubtype="0" fill="hold" nodeType="clickEffect">
-                                  <p:stCondLst>
-                                    <p:cond delay="0"/>
-                                  </p:stCondLst>
-                                  <p:childTnLst>
-                                    <p:set>
-                                      <p:cBhvr>
-                                        <p:cTn id="30" dur="1" fill="hold">
-                                          <p:stCondLst>
-                                            <p:cond delay="0"/>
-                                          </p:stCondLst>
-                                        </p:cTn>
-                                        <p:tgtEl>
-                                          <p:spTgt spid="16"/>
-                                        </p:tgtEl>
-                                        <p:attrNameLst>
-                                          <p:attrName>style.visibility</p:attrName>
-                                        </p:attrNameLst>
-                                      </p:cBhvr>
-                                      <p:to>
-                                        <p:strVal val="visible"/>
-                                      </p:to>
-                                    </p:set>
-                                    <p:animEffect transition="in" filter="fade">
-                                      <p:cBhvr>
-                                        <p:cTn id="31" dur="500"/>
-                                        <p:tgtEl>
-                                          <p:spTgt spid="16"/>
-                                        </p:tgtEl>
-                                      </p:cBhvr>
-                                    </p:animEffect>
-                                  </p:childTnLst>
-                                </p:cTn>
-                              </p:par>
-                            </p:childTnLst>
-                          </p:cTn>
-                        </p:par>
-                      </p:childTnLst>
-                    </p:cTn>
-                  </p:par>
-                  <p:par>
-                    <p:cTn id="32" fill="hold">
-                      <p:stCondLst>
-                        <p:cond delay="indefinite"/>
-                      </p:stCondLst>
-                      <p:childTnLst>
-                        <p:par>
-                          <p:cTn id="33" fill="hold">
-                            <p:stCondLst>
-                              <p:cond delay="0"/>
-                            </p:stCondLst>
-                            <p:childTnLst>
-                              <p:par>
-                                <p:cTn id="34" presetID="10" presetClass="entr" presetSubtype="0" fill="hold" grpId="0" nodeType="clickEffect">
-                                  <p:stCondLst>
-                                    <p:cond delay="0"/>
-                                  </p:stCondLst>
-                                  <p:childTnLst>
-                                    <p:set>
-                                      <p:cBhvr>
-                                        <p:cTn id="35" dur="1" fill="hold">
-                                          <p:stCondLst>
-                                            <p:cond delay="0"/>
-                                          </p:stCondLst>
-                                        </p:cTn>
-                                        <p:tgtEl>
-                                          <p:spTgt spid="18"/>
-                                        </p:tgtEl>
-                                        <p:attrNameLst>
-                                          <p:attrName>style.visibility</p:attrName>
-                                        </p:attrNameLst>
-                                      </p:cBhvr>
-                                      <p:to>
-                                        <p:strVal val="visible"/>
-                                      </p:to>
-                                    </p:set>
-                                    <p:animEffect transition="in" filter="fade">
-                                      <p:cBhvr>
-                                        <p:cTn id="36" dur="500"/>
-                                        <p:tgtEl>
-                                          <p:spTgt spid="18"/>
-                                        </p:tgtEl>
-                                      </p:cBhvr>
-                                    </p:animEffect>
-                                  </p:childTnLst>
-                                </p:cTn>
-                              </p:par>
-                            </p:childTnLst>
-                          </p:cTn>
-                        </p:par>
-                      </p:childTnLst>
-                    </p:cTn>
-                  </p:par>
-                </p:childTnLst>
-              </p:cTn>
-              <p:prevCondLst>
-                <p:cond evt="onPrev" delay="0">
-                  <p:tgtEl>
-                    <p:sldTgt/>
-                  </p:tgtEl>
-                </p:cond>
-              </p:prevCondLst>
-              <p:nextCondLst>
-                <p:cond evt="onNext" delay="0">
-                  <p:tgtEl>
-                    <p:sldTgt/>
-                  </p:tgtEl>
-                </p:cond>
-              </p:nextCondLst>
-            </p:seq>
-          </p:childTnLst>
-        </p:cTn>
-      </p:par>
-    </p:tnLst>
-    <p:bldLst>
-      <p:bldP spid="5" grpId="0" animBg="1"/>
-      <p:bldP spid="10" grpId="0"/>
-      <p:bldP spid="13" grpId="0"/>
-      <p:bldP spid="14" grpId="0"/>
-      <p:bldP spid="17" grpId="0"/>
-      <p:bldP spid="18" grpId="0"/>
-    </p:bldLst>
-  </p:timing>
-</p:sld>
-</file>
-
-<file path=ppt/slides/slide8.xml><?xml version="1.0" encoding="utf-8"?>
-<p:sld xmlns:a="http://schemas.openxmlformats.org/drawingml/2006/main" xmlns:r="http://schemas.openxmlformats.org/officeDocument/2006/relationships" xmlns:p="http://schemas.openxmlformats.org/presentationml/2006/main">
-  <p:cSld>
-    <p:spTree>
-      <p:nvGrpSpPr>
-        <p:cNvPr id="1" name=""/>
-        <p:cNvGrpSpPr/>
-        <p:nvPr/>
-      </p:nvGrpSpPr>
-      <p:grpSpPr>
-        <a:xfrm>
-          <a:off x="0" y="0"/>
-          <a:ext cx="0" cy="0"/>
-          <a:chOff x="0" y="0"/>
-          <a:chExt cx="0" cy="0"/>
-        </a:xfrm>
-      </p:grpSpPr>
-      <p:sp>
-        <p:nvSpPr>
-          <p:cNvPr id="2" name="Titre 1"/>
-          <p:cNvSpPr>
-            <a:spLocks noGrp="1"/>
-          </p:cNvSpPr>
-          <p:nvPr>
-            <p:ph type="title"/>
-          </p:nvPr>
-        </p:nvSpPr>
-        <p:spPr/>
-        <p:txBody>
-          <a:bodyPr/>
-          <a:lstStyle/>
-          <a:p>
-            <a:r>
-              <a:rPr lang="fr-FR" dirty="0" smtClean="0"/>
-              <a:t>En Python, tout est un </a:t>
-            </a:r>
-            <a:r>
-              <a:rPr lang="fr-FR" dirty="0" smtClean="0"/>
-              <a:t>objet (30s)</a:t>
-            </a:r>
-            <a:endParaRPr lang="fr-FR" dirty="0"/>
-          </a:p>
-        </p:txBody>
-      </p:sp>
-      <p:sp>
-        <p:nvSpPr>
-          <p:cNvPr id="3" name="Espace réservé du contenu 2"/>
-          <p:cNvSpPr>
-            <a:spLocks noGrp="1"/>
-          </p:cNvSpPr>
-          <p:nvPr>
-            <p:ph idx="1"/>
-          </p:nvPr>
-        </p:nvSpPr>
-        <p:spPr/>
-        <p:txBody>
-          <a:bodyPr/>
-          <a:lstStyle/>
-          <a:p>
-            <a:r>
-              <a:rPr lang="fr-FR" sz="2800" dirty="0" smtClean="0"/>
-              <a:t>En python tout est un objet, ce qui </a:t>
-            </a:r>
-            <a:r>
-              <a:rPr lang="fr-FR" sz="2800" dirty="0" smtClean="0"/>
-              <a:t>simplifie et réduit considérablement le temps de développement de programmes</a:t>
-            </a:r>
-            <a:endParaRPr lang="fr-FR" sz="2800" dirty="0" smtClean="0"/>
-          </a:p>
-          <a:p>
-            <a:r>
-              <a:rPr lang="fr-FR" sz="2800" dirty="0" smtClean="0"/>
-              <a:t>On accède à tous les objets par leur référence en </a:t>
-            </a:r>
-            <a:r>
-              <a:rPr lang="fr-FR" sz="2800" dirty="0" smtClean="0"/>
-              <a:t>mémoire, mais </a:t>
-            </a:r>
-            <a:r>
-              <a:rPr lang="fr-FR" sz="2800" dirty="0" smtClean="0"/>
-              <a:t>on ne manipule jamais directement </a:t>
-            </a:r>
-            <a:r>
-              <a:rPr lang="fr-FR" sz="2800" dirty="0" smtClean="0"/>
-              <a:t>ces références. On </a:t>
-            </a:r>
-            <a:r>
-              <a:rPr lang="fr-FR" sz="2800" dirty="0" smtClean="0"/>
-              <a:t>utilise </a:t>
-            </a:r>
-            <a:r>
-              <a:rPr lang="fr-FR" sz="2800" dirty="0" smtClean="0"/>
-              <a:t>à la place </a:t>
-            </a:r>
-            <a:r>
-              <a:rPr lang="fr-FR" sz="2800" dirty="0" smtClean="0"/>
-              <a:t>l’affectation à une </a:t>
-            </a:r>
-            <a:r>
-              <a:rPr lang="fr-FR" sz="2800" dirty="0" smtClean="0"/>
-              <a:t>variable, c’est-à-dire que l’on utilise le signe égal pour affecter un objet à une variable, par exemple a=1 signifie que l’on affecte l’objet entier 1 à </a:t>
-            </a:r>
-            <a:r>
-              <a:rPr lang="fr-FR" sz="2800" dirty="0" smtClean="0"/>
-              <a:t>la variable a.</a:t>
-            </a:r>
-            <a:r>
-              <a:rPr lang="fr-FR" sz="2800" dirty="0" smtClean="0"/>
-              <a:t> Regardons maintenant plus en </a:t>
-            </a:r>
-            <a:r>
-              <a:rPr lang="fr-FR" sz="2800" dirty="0" smtClean="0"/>
-              <a:t>détail </a:t>
-            </a:r>
-            <a:r>
-              <a:rPr lang="fr-FR" sz="2800" dirty="0" smtClean="0"/>
-              <a:t>cette notion de variable…</a:t>
-            </a:r>
-            <a:endParaRPr lang="fr-FR" sz="2800" dirty="0"/>
-          </a:p>
-        </p:txBody>
-      </p:sp>
-      <p:sp>
-        <p:nvSpPr>
-          <p:cNvPr id="4" name="ZoneTexte 3"/>
-          <p:cNvSpPr txBox="1"/>
-          <p:nvPr/>
-        </p:nvSpPr>
-        <p:spPr>
-          <a:xfrm>
-            <a:off x="0" y="92076"/>
-            <a:ext cx="1537855" cy="400110"/>
-          </a:xfrm>
-          <a:prstGeom prst="rect">
-            <a:avLst/>
-          </a:prstGeom>
-          <a:noFill/>
-          <a:ln>
-            <a:solidFill>
-              <a:srgbClr val="FF0000"/>
-            </a:solidFill>
-          </a:ln>
-        </p:spPr>
-        <p:txBody>
-          <a:bodyPr wrap="square" rtlCol="0">
-            <a:spAutoFit/>
-          </a:bodyPr>
-          <a:lstStyle/>
-          <a:p>
-            <a:r>
-              <a:rPr lang="fr-FR" sz="2000" dirty="0" smtClean="0">
-                <a:solidFill>
-                  <a:srgbClr val="FF0000"/>
-                </a:solidFill>
-                <a:latin typeface="Calibri" panose="020F0502020204030204" pitchFamily="34" charset="0"/>
-              </a:rPr>
-              <a:t>prompteur</a:t>
-            </a:r>
-            <a:endParaRPr lang="fr-FR" sz="2000" dirty="0">
-              <a:solidFill>
-                <a:srgbClr val="FF0000"/>
-              </a:solidFill>
-              <a:latin typeface="Calibri" panose="020F0502020204030204" pitchFamily="34" charset="0"/>
-            </a:endParaRPr>
-          </a:p>
-        </p:txBody>
-      </p:sp>
-    </p:spTree>
-    <p:extLst>
-      <p:ext uri="{BB962C8B-B14F-4D97-AF65-F5344CB8AC3E}">
-        <p14:creationId xmlns:p14="http://schemas.microsoft.com/office/powerpoint/2010/main" val="567329468"/>
-      </p:ext>
-    </p:extLst>
-  </p:cSld>
-  <p:clrMapOvr>
-    <a:masterClrMapping/>
-  </p:clrMapOvr>
-  <p:timing>
-    <p:tnLst>
-      <p:par>
-        <p:cTn id="1" dur="indefinite" restart="never" nodeType="tmRoot"/>
-      </p:par>
-    </p:tnLst>
-  </p:timing>
-</p:sld>
-</file>
-
 <file path=ppt/slides/slide9.xml><?xml version="1.0" encoding="utf-8"?>
 <p:sld xmlns:a="http://schemas.openxmlformats.org/drawingml/2006/main" xmlns:r="http://schemas.openxmlformats.org/officeDocument/2006/relationships" xmlns:p="http://schemas.openxmlformats.org/presentationml/2006/main">
   <p:cSld>
@@ -8607,12 +8780,12 @@
           <a:lstStyle/>
           <a:p>
             <a:r>
+              <a:rPr lang="fr-FR" dirty="0"/>
+              <a:t>Typage </a:t>
+            </a:r>
+            <a:r>
               <a:rPr lang="fr-FR" dirty="0" smtClean="0"/>
-              <a:t>Notion de </a:t>
-            </a:r>
-            <a:r>
-              <a:rPr lang="fr-FR" dirty="0" smtClean="0"/>
-              <a:t>variables (50s)</a:t>
+              <a:t>dynamique (30s)</a:t>
             </a:r>
             <a:endParaRPr lang="fr-FR" dirty="0"/>
           </a:p>
@@ -8628,181 +8801,35 @@
             <p:ph idx="1"/>
           </p:nvPr>
         </p:nvSpPr>
-        <p:spPr>
-          <a:xfrm>
-            <a:off x="457200" y="1600200"/>
-            <a:ext cx="8686800" cy="4525963"/>
-          </a:xfrm>
-        </p:spPr>
+        <p:spPr/>
         <p:txBody>
           <a:bodyPr/>
           <a:lstStyle/>
           <a:p>
             <a:r>
-              <a:rPr lang="fr-FR" sz="2400" dirty="0" smtClean="0"/>
-              <a:t>Une variable est un nom que l’on donne à un objet pour le retrouver en mémoire</a:t>
-            </a:r>
-          </a:p>
-          <a:p>
-            <a:pPr lvl="1"/>
-            <a:r>
-              <a:rPr lang="fr-FR" sz="2000" dirty="0"/>
-              <a:t>Il y a </a:t>
-            </a:r>
-            <a:r>
-              <a:rPr lang="fr-FR" sz="2000" dirty="0" smtClean="0"/>
-              <a:t>trois règles </a:t>
-            </a:r>
-            <a:r>
-              <a:rPr lang="fr-FR" sz="2000" dirty="0"/>
-              <a:t>importantes pour le nom d’une </a:t>
-            </a:r>
-            <a:r>
-              <a:rPr lang="fr-FR" sz="2000" dirty="0" smtClean="0"/>
-              <a:t>variable en Python</a:t>
-            </a:r>
-            <a:endParaRPr lang="fr-FR" sz="2000" dirty="0"/>
-          </a:p>
-          <a:p>
-            <a:pPr lvl="2"/>
-            <a:r>
-              <a:rPr lang="fr-FR" sz="1800" dirty="0" smtClean="0"/>
-              <a:t>Une variable peut être </a:t>
-            </a:r>
-            <a:r>
-              <a:rPr lang="fr-FR" sz="1800" dirty="0" smtClean="0"/>
-              <a:t>composée </a:t>
-            </a:r>
-            <a:r>
-              <a:rPr lang="fr-FR" sz="1800" dirty="0"/>
-              <a:t>de tirets bas </a:t>
-            </a:r>
-            <a:r>
-              <a:rPr lang="fr-FR" sz="1800" dirty="0" smtClean="0"/>
-              <a:t>et d’une </a:t>
-            </a:r>
-            <a:r>
-              <a:rPr lang="fr-FR" sz="1800" dirty="0" smtClean="0"/>
-              <a:t>suite quelconque de caractères </a:t>
-            </a:r>
-            <a:r>
-              <a:rPr lang="fr-FR" sz="1800" dirty="0" smtClean="0"/>
-              <a:t>alphanumériques, c’est-à-dire les lettres de l’alphabet en minuscule, en majuscule et les chiffres de 0 à 9</a:t>
-            </a:r>
-          </a:p>
-          <a:p>
-            <a:pPr lvl="2"/>
-            <a:r>
-              <a:rPr lang="fr-FR" sz="1800" dirty="0" smtClean="0"/>
-              <a:t>Une </a:t>
-            </a:r>
-            <a:r>
-              <a:rPr lang="fr-FR" sz="1800" dirty="0"/>
-              <a:t>variable commence soit par une lettre soit pas un tiret bas, mais jamais par un chiffre </a:t>
-            </a:r>
-          </a:p>
-          <a:p>
-            <a:pPr lvl="2"/>
-            <a:r>
-              <a:rPr lang="fr-FR" sz="1800" dirty="0" smtClean="0"/>
-              <a:t>Les majuscules et minuscules sont prises en </a:t>
-            </a:r>
-            <a:r>
-              <a:rPr lang="fr-FR" sz="1800" dirty="0" smtClean="0"/>
-              <a:t>compte, donc </a:t>
-            </a:r>
-            <a:r>
-              <a:rPr lang="fr-FR" sz="1800" dirty="0" err="1"/>
-              <a:t>Ma_variable</a:t>
-            </a:r>
-            <a:r>
-              <a:rPr lang="fr-FR" sz="1800" dirty="0"/>
-              <a:t> est différent de </a:t>
-            </a:r>
-            <a:r>
-              <a:rPr lang="fr-FR" sz="1800" dirty="0" err="1" smtClean="0"/>
-              <a:t>ma_variable</a:t>
-            </a:r>
-            <a:endParaRPr lang="fr-FR" sz="1800" dirty="0" smtClean="0"/>
-          </a:p>
-          <a:p>
-            <a:r>
-              <a:rPr lang="fr-FR" sz="2400" dirty="0" smtClean="0"/>
-              <a:t>Il est recommandé d’utiliser des noms explicites de variable, de tout écrire en minuscule, et de séparer les mots par des tirets bas. Par exemple, </a:t>
-            </a:r>
-            <a:r>
-              <a:rPr lang="fr-FR" sz="2400" dirty="0" err="1" smtClean="0"/>
-              <a:t>moyenne_age_francais</a:t>
-            </a:r>
-            <a:r>
-              <a:rPr lang="fr-FR" sz="2400" dirty="0" smtClean="0"/>
-              <a:t> est un bon nom de variable, meilleur de </a:t>
-            </a:r>
-            <a:r>
-              <a:rPr lang="fr-FR" sz="2400" dirty="0" err="1" smtClean="0"/>
-              <a:t>moy</a:t>
-            </a:r>
-            <a:r>
-              <a:rPr lang="fr-FR" sz="2400" dirty="0" err="1" smtClean="0"/>
-              <a:t>_age_f</a:t>
-            </a:r>
-            <a:r>
-              <a:rPr lang="fr-FR" sz="2400" dirty="0" smtClean="0"/>
-              <a:t> et bien meilleur que simplement x</a:t>
-            </a:r>
-            <a:endParaRPr lang="fr-FR" sz="2400" dirty="0" smtClean="0"/>
-          </a:p>
-        </p:txBody>
-      </p:sp>
-      <p:sp>
-        <p:nvSpPr>
-          <p:cNvPr id="4" name="ZoneTexte 3"/>
-          <p:cNvSpPr txBox="1"/>
-          <p:nvPr/>
-        </p:nvSpPr>
-        <p:spPr>
-          <a:xfrm>
-            <a:off x="0" y="92076"/>
-            <a:ext cx="1537855" cy="400110"/>
-          </a:xfrm>
-          <a:prstGeom prst="rect">
-            <a:avLst/>
-          </a:prstGeom>
-          <a:noFill/>
-          <a:ln>
-            <a:solidFill>
-              <a:srgbClr val="FF0000"/>
-            </a:solidFill>
-          </a:ln>
-        </p:spPr>
-        <p:txBody>
-          <a:bodyPr wrap="square" rtlCol="0">
-            <a:spAutoFit/>
-          </a:bodyPr>
-          <a:lstStyle/>
-          <a:p>
-            <a:r>
-              <a:rPr lang="fr-FR" sz="2000" dirty="0" smtClean="0">
-                <a:solidFill>
-                  <a:srgbClr val="FF0000"/>
-                </a:solidFill>
-                <a:latin typeface="Calibri" panose="020F0502020204030204" pitchFamily="34" charset="0"/>
-              </a:rPr>
-              <a:t>prompteur</a:t>
-            </a:r>
-            <a:endParaRPr lang="fr-FR" sz="2000" dirty="0">
-              <a:solidFill>
-                <a:srgbClr val="FF0000"/>
-              </a:solidFill>
-              <a:latin typeface="Calibri" panose="020F0502020204030204" pitchFamily="34" charset="0"/>
-            </a:endParaRPr>
+              <a:rPr lang="fr-FR" sz="2800" dirty="0" smtClean="0"/>
+              <a:t>Le typage dynamique est une notion essentielle du Python et nous verrons dans la suite qu’il offre beaucoup de flexibilité et facilite grandement l’écriture des programmes. </a:t>
+            </a:r>
+          </a:p>
+          <a:p>
+            <a:r>
+              <a:rPr lang="fr-FR" sz="2800" dirty="0" smtClean="0"/>
+              <a:t>Dans cette vidéo, nous avons introduit la notion d’objet avec les variables et le typage dynamique. Dans la prochaine vidéo, nous introduirons les types de base,  et </a:t>
+            </a:r>
+            <a:r>
+              <a:rPr lang="fr-FR" sz="2800" dirty="0"/>
+              <a:t>les techniques de factorisation de code que sont les boucles, les fonctions et les modules</a:t>
+            </a:r>
+          </a:p>
+          <a:p>
+            <a:endParaRPr lang="fr-FR" sz="2800" dirty="0"/>
           </a:p>
         </p:txBody>
       </p:sp>
     </p:spTree>
     <p:extLst>
       <p:ext uri="{BB962C8B-B14F-4D97-AF65-F5344CB8AC3E}">
-        <p14:creationId xmlns:p14="http://schemas.microsoft.com/office/powerpoint/2010/main" val="2819011811"/>
+        <p14:creationId xmlns:p14="http://schemas.microsoft.com/office/powerpoint/2010/main" val="118494192"/>
       </p:ext>
     </p:extLst>
   </p:cSld>

</xml_diff>